<commit_message>
PPTX update with mailbox/memento/coverage
</commit_message>
<xml_diff>
--- a/Presentaties/Iteratie 2/SWOP Presentatie 2 Inhoud.pptx
+++ b/Presentaties/Iteratie 2/SWOP Presentatie 2 Inhoud.pptx
@@ -11,8 +11,8 @@
     <p:sldId id="267" r:id="rId5"/>
     <p:sldId id="276" r:id="rId6"/>
     <p:sldId id="277" r:id="rId7"/>
-    <p:sldId id="278" r:id="rId8"/>
-    <p:sldId id="279" r:id="rId9"/>
+    <p:sldId id="279" r:id="rId8"/>
+    <p:sldId id="278" r:id="rId9"/>
     <p:sldId id="259" r:id="rId10"/>
     <p:sldId id="270" r:id="rId11"/>
     <p:sldId id="274" r:id="rId12"/>
@@ -120,7 +120,7 @@
   </p:defaultTextStyle>
   <p:extLst>
     <p:ext uri="{EFAFB233-063F-42B5-8137-9DF3F51BA10A}">
-      <p15:sldGuideLst xmlns="" xmlns:p15="http://schemas.microsoft.com/office/powerpoint/2012/main">
+      <p15:sldGuideLst xmlns:p15="http://schemas.microsoft.com/office/powerpoint/2012/main">
         <p15:guide id="1" orient="horz" pos="2160">
           <p15:clr>
             <a:srgbClr val="A4A3A4"/>
@@ -362,7 +362,7 @@
             <a:fld id="{91663F60-0288-4BD7-9F87-79CFFEA98662}" type="slidenum">
               <a:rPr lang="nl-BE" smtClean="0"/>
               <a:pPr/>
-              <a:t>‹Nr.›</a:t>
+              <a:t>‹#›</a:t>
             </a:fld>
             <a:endParaRPr lang="nl-BE"/>
           </a:p>
@@ -371,7 +371,7 @@
     </p:spTree>
     <p:extLst>
       <p:ext uri="{BB962C8B-B14F-4D97-AF65-F5344CB8AC3E}">
-        <p14:creationId xmlns:p14="http://schemas.microsoft.com/office/powerpoint/2010/main" xmlns="" val="3963083300"/>
+        <p14:creationId xmlns:p14="http://schemas.microsoft.com/office/powerpoint/2010/main" val="3963083300"/>
       </p:ext>
     </p:extLst>
   </p:cSld>
@@ -537,7 +537,7 @@
             <a:fld id="{91663F60-0288-4BD7-9F87-79CFFEA98662}" type="slidenum">
               <a:rPr lang="nl-BE" smtClean="0"/>
               <a:pPr/>
-              <a:t>‹Nr.›</a:t>
+              <a:t>‹#›</a:t>
             </a:fld>
             <a:endParaRPr lang="nl-BE"/>
           </a:p>
@@ -546,7 +546,7 @@
     </p:spTree>
     <p:extLst>
       <p:ext uri="{BB962C8B-B14F-4D97-AF65-F5344CB8AC3E}">
-        <p14:creationId xmlns:p14="http://schemas.microsoft.com/office/powerpoint/2010/main" xmlns="" val="1367293728"/>
+        <p14:creationId xmlns:p14="http://schemas.microsoft.com/office/powerpoint/2010/main" val="1367293728"/>
       </p:ext>
     </p:extLst>
   </p:cSld>
@@ -722,7 +722,7 @@
             <a:fld id="{91663F60-0288-4BD7-9F87-79CFFEA98662}" type="slidenum">
               <a:rPr lang="nl-BE" smtClean="0"/>
               <a:pPr/>
-              <a:t>‹Nr.›</a:t>
+              <a:t>‹#›</a:t>
             </a:fld>
             <a:endParaRPr lang="nl-BE"/>
           </a:p>
@@ -731,7 +731,7 @@
     </p:spTree>
     <p:extLst>
       <p:ext uri="{BB962C8B-B14F-4D97-AF65-F5344CB8AC3E}">
-        <p14:creationId xmlns:p14="http://schemas.microsoft.com/office/powerpoint/2010/main" xmlns="" val="3320721104"/>
+        <p14:creationId xmlns:p14="http://schemas.microsoft.com/office/powerpoint/2010/main" val="3320721104"/>
       </p:ext>
     </p:extLst>
   </p:cSld>
@@ -897,7 +897,7 @@
             <a:fld id="{91663F60-0288-4BD7-9F87-79CFFEA98662}" type="slidenum">
               <a:rPr lang="nl-BE" smtClean="0"/>
               <a:pPr/>
-              <a:t>‹Nr.›</a:t>
+              <a:t>‹#›</a:t>
             </a:fld>
             <a:endParaRPr lang="nl-BE"/>
           </a:p>
@@ -906,7 +906,7 @@
     </p:spTree>
     <p:extLst>
       <p:ext uri="{BB962C8B-B14F-4D97-AF65-F5344CB8AC3E}">
-        <p14:creationId xmlns:p14="http://schemas.microsoft.com/office/powerpoint/2010/main" xmlns="" val="1971972017"/>
+        <p14:creationId xmlns:p14="http://schemas.microsoft.com/office/powerpoint/2010/main" val="1971972017"/>
       </p:ext>
     </p:extLst>
   </p:cSld>
@@ -1148,7 +1148,7 @@
             <a:fld id="{91663F60-0288-4BD7-9F87-79CFFEA98662}" type="slidenum">
               <a:rPr lang="nl-BE" smtClean="0"/>
               <a:pPr/>
-              <a:t>‹Nr.›</a:t>
+              <a:t>‹#›</a:t>
             </a:fld>
             <a:endParaRPr lang="nl-BE"/>
           </a:p>
@@ -1157,7 +1157,7 @@
     </p:spTree>
     <p:extLst>
       <p:ext uri="{BB962C8B-B14F-4D97-AF65-F5344CB8AC3E}">
-        <p14:creationId xmlns:p14="http://schemas.microsoft.com/office/powerpoint/2010/main" xmlns="" val="1541596771"/>
+        <p14:creationId xmlns:p14="http://schemas.microsoft.com/office/powerpoint/2010/main" val="1541596771"/>
       </p:ext>
     </p:extLst>
   </p:cSld>
@@ -1441,7 +1441,7 @@
             <a:fld id="{91663F60-0288-4BD7-9F87-79CFFEA98662}" type="slidenum">
               <a:rPr lang="nl-BE" smtClean="0"/>
               <a:pPr/>
-              <a:t>‹Nr.›</a:t>
+              <a:t>‹#›</a:t>
             </a:fld>
             <a:endParaRPr lang="nl-BE"/>
           </a:p>
@@ -1450,7 +1450,7 @@
     </p:spTree>
     <p:extLst>
       <p:ext uri="{BB962C8B-B14F-4D97-AF65-F5344CB8AC3E}">
-        <p14:creationId xmlns:p14="http://schemas.microsoft.com/office/powerpoint/2010/main" xmlns="" val="1047982118"/>
+        <p14:creationId xmlns:p14="http://schemas.microsoft.com/office/powerpoint/2010/main" val="1047982118"/>
       </p:ext>
     </p:extLst>
   </p:cSld>
@@ -1868,7 +1868,7 @@
             <a:fld id="{91663F60-0288-4BD7-9F87-79CFFEA98662}" type="slidenum">
               <a:rPr lang="nl-BE" smtClean="0"/>
               <a:pPr/>
-              <a:t>‹Nr.›</a:t>
+              <a:t>‹#›</a:t>
             </a:fld>
             <a:endParaRPr lang="nl-BE"/>
           </a:p>
@@ -1877,7 +1877,7 @@
     </p:spTree>
     <p:extLst>
       <p:ext uri="{BB962C8B-B14F-4D97-AF65-F5344CB8AC3E}">
-        <p14:creationId xmlns:p14="http://schemas.microsoft.com/office/powerpoint/2010/main" xmlns="" val="2185725893"/>
+        <p14:creationId xmlns:p14="http://schemas.microsoft.com/office/powerpoint/2010/main" val="2185725893"/>
       </p:ext>
     </p:extLst>
   </p:cSld>
@@ -1991,7 +1991,7 @@
             <a:fld id="{91663F60-0288-4BD7-9F87-79CFFEA98662}" type="slidenum">
               <a:rPr lang="nl-BE" smtClean="0"/>
               <a:pPr/>
-              <a:t>‹Nr.›</a:t>
+              <a:t>‹#›</a:t>
             </a:fld>
             <a:endParaRPr lang="nl-BE"/>
           </a:p>
@@ -2000,7 +2000,7 @@
     </p:spTree>
     <p:extLst>
       <p:ext uri="{BB962C8B-B14F-4D97-AF65-F5344CB8AC3E}">
-        <p14:creationId xmlns:p14="http://schemas.microsoft.com/office/powerpoint/2010/main" xmlns="" val="1565659618"/>
+        <p14:creationId xmlns:p14="http://schemas.microsoft.com/office/powerpoint/2010/main" val="1565659618"/>
       </p:ext>
     </p:extLst>
   </p:cSld>
@@ -2091,7 +2091,7 @@
             <a:fld id="{91663F60-0288-4BD7-9F87-79CFFEA98662}" type="slidenum">
               <a:rPr lang="nl-BE" smtClean="0"/>
               <a:pPr/>
-              <a:t>‹Nr.›</a:t>
+              <a:t>‹#›</a:t>
             </a:fld>
             <a:endParaRPr lang="nl-BE"/>
           </a:p>
@@ -2100,7 +2100,7 @@
     </p:spTree>
     <p:extLst>
       <p:ext uri="{BB962C8B-B14F-4D97-AF65-F5344CB8AC3E}">
-        <p14:creationId xmlns:p14="http://schemas.microsoft.com/office/powerpoint/2010/main" xmlns="" val="2302775655"/>
+        <p14:creationId xmlns:p14="http://schemas.microsoft.com/office/powerpoint/2010/main" val="2302775655"/>
       </p:ext>
     </p:extLst>
   </p:cSld>
@@ -2373,7 +2373,7 @@
             <a:fld id="{91663F60-0288-4BD7-9F87-79CFFEA98662}" type="slidenum">
               <a:rPr lang="nl-BE" smtClean="0"/>
               <a:pPr/>
-              <a:t>‹Nr.›</a:t>
+              <a:t>‹#›</a:t>
             </a:fld>
             <a:endParaRPr lang="nl-BE"/>
           </a:p>
@@ -2382,7 +2382,7 @@
     </p:spTree>
     <p:extLst>
       <p:ext uri="{BB962C8B-B14F-4D97-AF65-F5344CB8AC3E}">
-        <p14:creationId xmlns:p14="http://schemas.microsoft.com/office/powerpoint/2010/main" xmlns="" val="2384358470"/>
+        <p14:creationId xmlns:p14="http://schemas.microsoft.com/office/powerpoint/2010/main" val="2384358470"/>
       </p:ext>
     </p:extLst>
   </p:cSld>
@@ -2631,7 +2631,7 @@
             <a:fld id="{91663F60-0288-4BD7-9F87-79CFFEA98662}" type="slidenum">
               <a:rPr lang="nl-BE" smtClean="0"/>
               <a:pPr/>
-              <a:t>‹Nr.›</a:t>
+              <a:t>‹#›</a:t>
             </a:fld>
             <a:endParaRPr lang="nl-BE"/>
           </a:p>
@@ -2640,7 +2640,7 @@
     </p:spTree>
     <p:extLst>
       <p:ext uri="{BB962C8B-B14F-4D97-AF65-F5344CB8AC3E}">
-        <p14:creationId xmlns:p14="http://schemas.microsoft.com/office/powerpoint/2010/main" xmlns="" val="221485852"/>
+        <p14:creationId xmlns:p14="http://schemas.microsoft.com/office/powerpoint/2010/main" val="221485852"/>
       </p:ext>
     </p:extLst>
   </p:cSld>
@@ -2909,7 +2909,7 @@
             <a:fld id="{91663F60-0288-4BD7-9F87-79CFFEA98662}" type="slidenum">
               <a:rPr lang="nl-BE" smtClean="0"/>
               <a:pPr/>
-              <a:t>‹Nr.›</a:t>
+              <a:t>‹#›</a:t>
             </a:fld>
             <a:endParaRPr lang="nl-BE"/>
           </a:p>
@@ -2918,7 +2918,7 @@
     </p:spTree>
     <p:extLst>
       <p:ext uri="{BB962C8B-B14F-4D97-AF65-F5344CB8AC3E}">
-        <p14:creationId xmlns:p14="http://schemas.microsoft.com/office/powerpoint/2010/main" xmlns="" val="2268232388"/>
+        <p14:creationId xmlns:p14="http://schemas.microsoft.com/office/powerpoint/2010/main" val="2268232388"/>
       </p:ext>
     </p:extLst>
   </p:cSld>
@@ -3547,7 +3547,7 @@
     </p:spTree>
     <p:extLst>
       <p:ext uri="{BB962C8B-B14F-4D97-AF65-F5344CB8AC3E}">
-        <p14:creationId xmlns:p14="http://schemas.microsoft.com/office/powerpoint/2010/main" xmlns="" val="1089514898"/>
+        <p14:creationId xmlns:p14="http://schemas.microsoft.com/office/powerpoint/2010/main" val="1089514898"/>
       </p:ext>
     </p:extLst>
   </p:cSld>
@@ -3745,7 +3745,7 @@
     </p:spTree>
     <p:extLst>
       <p:ext uri="{BB962C8B-B14F-4D97-AF65-F5344CB8AC3E}">
-        <p14:creationId xmlns:p14="http://schemas.microsoft.com/office/powerpoint/2010/main" xmlns="" val="674970378"/>
+        <p14:creationId xmlns:p14="http://schemas.microsoft.com/office/powerpoint/2010/main" val="674970378"/>
       </p:ext>
     </p:extLst>
   </p:cSld>
@@ -3910,7 +3910,7 @@
     </p:spTree>
     <p:extLst>
       <p:ext uri="{BB962C8B-B14F-4D97-AF65-F5344CB8AC3E}">
-        <p14:creationId xmlns:p14="http://schemas.microsoft.com/office/powerpoint/2010/main" xmlns="" val="996989477"/>
+        <p14:creationId xmlns:p14="http://schemas.microsoft.com/office/powerpoint/2010/main" val="996989477"/>
       </p:ext>
     </p:extLst>
   </p:cSld>
@@ -3960,31 +3960,10 @@
         <p:spPr/>
         <p:txBody>
           <a:bodyPr>
-            <a:normAutofit fontScale="90000"/>
+            <a:normAutofit/>
           </a:bodyPr>
           <a:lstStyle/>
           <a:p>
-            <a:r>
-              <a:rPr lang="nl-BE" sz="3600" cap="small" dirty="0" err="1" smtClean="0">
-                <a:ln w="18415" cmpd="sng">
-                  <a:solidFill>
-                    <a:schemeClr val="tx1">
-                      <a:alpha val="0"/>
-                    </a:schemeClr>
-                  </a:solidFill>
-                  <a:prstDash val="solid"/>
-                </a:ln>
-                <a:effectLst>
-                  <a:outerShdw blurRad="25400" dir="3600000" algn="tl" rotWithShape="0">
-                    <a:srgbClr val="000000">
-                      <a:alpha val="70000"/>
-                    </a:srgbClr>
-                  </a:outerShdw>
-                </a:effectLst>
-                <a:latin typeface="Sitka Text" pitchFamily="2" charset="0"/>
-              </a:rPr>
-              <a:t>Testing</a:t>
-            </a:r>
             <a:r>
               <a:rPr lang="nl-BE" sz="3600" cap="small" dirty="0" smtClean="0">
                 <a:ln w="18415" cmpd="sng">
@@ -4004,7 +3983,28 @@
                 </a:effectLst>
                 <a:latin typeface="Sitka Text" pitchFamily="2" charset="0"/>
               </a:rPr>
-              <a:t> approach TODO UPDATE (screenshot)</a:t>
+              <a:t>Testing </a:t>
+            </a:r>
+            <a:r>
+              <a:rPr lang="nl-BE" sz="3600" cap="small" dirty="0" smtClean="0">
+                <a:ln w="18415" cmpd="sng">
+                  <a:solidFill>
+                    <a:schemeClr val="tx1">
+                      <a:alpha val="0"/>
+                    </a:schemeClr>
+                  </a:solidFill>
+                  <a:prstDash val="solid"/>
+                </a:ln>
+                <a:effectLst>
+                  <a:outerShdw blurRad="25400" dir="3600000" algn="tl" rotWithShape="0">
+                    <a:srgbClr val="000000">
+                      <a:alpha val="70000"/>
+                    </a:srgbClr>
+                  </a:outerShdw>
+                </a:effectLst>
+                <a:latin typeface="Sitka Text" pitchFamily="2" charset="0"/>
+              </a:rPr>
+              <a:t>approach</a:t>
             </a:r>
             <a:endParaRPr lang="nl-BE" sz="3600" cap="small" dirty="0">
               <a:ln w="18415" cmpd="sng">
@@ -4029,7 +4029,7 @@
       </p:sp>
       <p:pic>
         <p:nvPicPr>
-          <p:cNvPr id="4" name="Content Placeholder 3"/>
+          <p:cNvPr id="7" name="Content Placeholder 6"/>
           <p:cNvPicPr>
             <a:picLocks noGrp="1" noChangeAspect="1"/>
           </p:cNvPicPr>
@@ -4038,10 +4038,10 @@
           </p:nvPr>
         </p:nvPicPr>
         <p:blipFill>
-          <a:blip r:embed="rId2" cstate="print">
+          <a:blip r:embed="rId2">
             <a:extLst>
               <a:ext uri="{28A0092B-C50C-407E-A947-70E740481C1C}">
-                <a14:useLocalDpi xmlns:a14="http://schemas.microsoft.com/office/drawing/2010/main" xmlns="" val="0"/>
+                <a14:useLocalDpi xmlns:a14="http://schemas.microsoft.com/office/drawing/2010/main" val="0"/>
               </a:ext>
             </a:extLst>
           </a:blip>
@@ -4051,28 +4051,15 @@
         </p:blipFill>
         <p:spPr>
           <a:xfrm>
-            <a:off x="126294" y="1268760"/>
-            <a:ext cx="8891411" cy="5400600"/>
+            <a:off x="324176" y="1484784"/>
+            <a:ext cx="8495647" cy="4896544"/>
           </a:xfrm>
-          <a:prstGeom prst="rect">
-            <a:avLst/>
-          </a:prstGeom>
-          <a:ln>
-            <a:noFill/>
-          </a:ln>
-          <a:effectLst>
-            <a:outerShdw blurRad="292100" dist="139700" dir="2700000" algn="tl" rotWithShape="0">
-              <a:srgbClr val="333333">
-                <a:alpha val="65000"/>
-              </a:srgbClr>
-            </a:outerShdw>
-          </a:effectLst>
         </p:spPr>
       </p:pic>
     </p:spTree>
     <p:extLst>
       <p:ext uri="{BB962C8B-B14F-4D97-AF65-F5344CB8AC3E}">
-        <p14:creationId xmlns:p14="http://schemas.microsoft.com/office/powerpoint/2010/main" xmlns="" val="3176464878"/>
+        <p14:creationId xmlns:p14="http://schemas.microsoft.com/office/powerpoint/2010/main" val="3176464878"/>
       </p:ext>
     </p:extLst>
   </p:cSld>
@@ -4180,7 +4167,7 @@
           <a:blip r:embed="rId2" cstate="print">
             <a:extLst>
               <a:ext uri="{28A0092B-C50C-407E-A947-70E740481C1C}">
-                <a14:useLocalDpi xmlns:a14="http://schemas.microsoft.com/office/drawing/2010/main" xmlns="" val="0"/>
+                <a14:useLocalDpi xmlns:a14="http://schemas.microsoft.com/office/drawing/2010/main" val="0"/>
               </a:ext>
             </a:extLst>
           </a:blip>
@@ -4198,7 +4185,7 @@
           <a:noFill/>
           <a:extLst>
             <a:ext uri="{909E8E84-426E-40DD-AFC4-6F175D3DCCD1}">
-              <a14:hiddenFill xmlns:a14="http://schemas.microsoft.com/office/drawing/2010/main" xmlns="">
+              <a14:hiddenFill xmlns:a14="http://schemas.microsoft.com/office/drawing/2010/main">
                 <a:solidFill>
                   <a:srgbClr val="FFFFFF"/>
                 </a:solidFill>
@@ -4210,7 +4197,7 @@
     </p:spTree>
     <p:extLst>
       <p:ext uri="{BB962C8B-B14F-4D97-AF65-F5344CB8AC3E}">
-        <p14:creationId xmlns:p14="http://schemas.microsoft.com/office/powerpoint/2010/main" xmlns="" val="3405605565"/>
+        <p14:creationId xmlns:p14="http://schemas.microsoft.com/office/powerpoint/2010/main" val="3405605565"/>
       </p:ext>
     </p:extLst>
   </p:cSld>
@@ -4641,8 +4628,77 @@
                 </a:effectLst>
                 <a:latin typeface="Sitka Banner" pitchFamily="2" charset="0"/>
               </a:rPr>
-              <a:t> 	Individual Work: 	Study: </a:t>
-            </a:r>
+              <a:t> </a:t>
+            </a:r>
+            <a:r>
+              <a:rPr lang="nl-BE" sz="2400" dirty="0" smtClean="0">
+                <a:solidFill>
+                  <a:schemeClr val="accent4">
+                    <a:lumMod val="50000"/>
+                  </a:schemeClr>
+                </a:solidFill>
+                <a:effectLst>
+                  <a:outerShdw blurRad="76200" dist="38100" dir="5400000" algn="t" rotWithShape="0">
+                    <a:prstClr val="black">
+                      <a:alpha val="27000"/>
+                    </a:prstClr>
+                  </a:outerShdw>
+                </a:effectLst>
+                <a:latin typeface="Sitka Banner" pitchFamily="2" charset="0"/>
+              </a:rPr>
+              <a:t>31h</a:t>
+            </a:r>
+            <a:r>
+              <a:rPr lang="nl-BE" sz="2400" dirty="0" smtClean="0">
+                <a:solidFill>
+                  <a:schemeClr val="accent4">
+                    <a:lumMod val="50000"/>
+                  </a:schemeClr>
+                </a:solidFill>
+                <a:effectLst>
+                  <a:outerShdw blurRad="76200" dist="38100" dir="5400000" algn="t" rotWithShape="0">
+                    <a:prstClr val="black">
+                      <a:alpha val="27000"/>
+                    </a:prstClr>
+                  </a:outerShdw>
+                </a:effectLst>
+                <a:latin typeface="Sitka Banner" pitchFamily="2" charset="0"/>
+              </a:rPr>
+              <a:t>	Individual Work: 	</a:t>
+            </a:r>
+            <a:r>
+              <a:rPr lang="nl-BE" sz="2400" dirty="0" smtClean="0">
+                <a:solidFill>
+                  <a:schemeClr val="accent4">
+                    <a:lumMod val="50000"/>
+                  </a:schemeClr>
+                </a:solidFill>
+                <a:effectLst>
+                  <a:outerShdw blurRad="76200" dist="38100" dir="5400000" algn="t" rotWithShape="0">
+                    <a:prstClr val="black">
+                      <a:alpha val="27000"/>
+                    </a:prstClr>
+                  </a:outerShdw>
+                </a:effectLst>
+                <a:latin typeface="Sitka Banner" pitchFamily="2" charset="0"/>
+              </a:rPr>
+              <a:t>Study:  </a:t>
+            </a:r>
+            <a:endParaRPr lang="nl-BE" sz="2400" dirty="0" smtClean="0">
+              <a:solidFill>
+                <a:schemeClr val="accent4">
+                  <a:lumMod val="50000"/>
+                </a:schemeClr>
+              </a:solidFill>
+              <a:effectLst>
+                <a:outerShdw blurRad="76200" dist="38100" dir="5400000" algn="t" rotWithShape="0">
+                  <a:prstClr val="black">
+                    <a:alpha val="27000"/>
+                  </a:prstClr>
+                </a:outerShdw>
+              </a:effectLst>
+              <a:latin typeface="Sitka Banner" pitchFamily="2" charset="0"/>
+            </a:endParaRPr>
           </a:p>
           <a:p>
             <a:pPr marL="0" indent="0">
@@ -4655,7 +4711,7 @@
     </p:spTree>
     <p:extLst>
       <p:ext uri="{BB962C8B-B14F-4D97-AF65-F5344CB8AC3E}">
-        <p14:creationId xmlns:p14="http://schemas.microsoft.com/office/powerpoint/2010/main" xmlns="" val="1581702792"/>
+        <p14:creationId xmlns:p14="http://schemas.microsoft.com/office/powerpoint/2010/main" val="1581702792"/>
       </p:ext>
     </p:extLst>
   </p:cSld>
@@ -4702,7 +4758,7 @@
             <p:ph idx="1"/>
             <p:extLst>
               <p:ext uri="{D42A27DB-BD31-4B8C-83A1-F6EECF244321}">
-                <p14:modId xmlns:p14="http://schemas.microsoft.com/office/powerpoint/2010/main" xmlns="" val="1687304960"/>
+                <p14:modId xmlns:p14="http://schemas.microsoft.com/office/powerpoint/2010/main" val="3072315139"/>
               </p:ext>
             </p:extLst>
           </p:nvPr>
@@ -4721,28 +4777,28 @@
                 <a:gridCol w="2057400">
                   <a:extLst>
                     <a:ext uri="{9D8B030D-6E8A-4147-A177-3AD203B41FA5}">
-                      <a16:colId xmlns="" xmlns:a16="http://schemas.microsoft.com/office/drawing/2014/main" val="4022630451"/>
+                      <a16:colId xmlns:a16="http://schemas.microsoft.com/office/drawing/2014/main" val="4022630451"/>
                     </a:ext>
                   </a:extLst>
                 </a:gridCol>
                 <a:gridCol w="2057400">
                   <a:extLst>
                     <a:ext uri="{9D8B030D-6E8A-4147-A177-3AD203B41FA5}">
-                      <a16:colId xmlns="" xmlns:a16="http://schemas.microsoft.com/office/drawing/2014/main" val="1276862258"/>
+                      <a16:colId xmlns:a16="http://schemas.microsoft.com/office/drawing/2014/main" val="1276862258"/>
                     </a:ext>
                   </a:extLst>
                 </a:gridCol>
                 <a:gridCol w="2057400">
                   <a:extLst>
                     <a:ext uri="{9D8B030D-6E8A-4147-A177-3AD203B41FA5}">
-                      <a16:colId xmlns="" xmlns:a16="http://schemas.microsoft.com/office/drawing/2014/main" val="670422697"/>
+                      <a16:colId xmlns:a16="http://schemas.microsoft.com/office/drawing/2014/main" val="670422697"/>
                     </a:ext>
                   </a:extLst>
                 </a:gridCol>
                 <a:gridCol w="2057400">
                   <a:extLst>
                     <a:ext uri="{9D8B030D-6E8A-4147-A177-3AD203B41FA5}">
-                      <a16:colId xmlns="" xmlns:a16="http://schemas.microsoft.com/office/drawing/2014/main" val="3836214712"/>
+                      <a16:colId xmlns:a16="http://schemas.microsoft.com/office/drawing/2014/main" val="3836214712"/>
                     </a:ext>
                   </a:extLst>
                 </a:gridCol>
@@ -4814,7 +4870,7 @@
                 </a:tc>
                 <a:extLst>
                   <a:ext uri="{0D108BD9-81ED-4DB2-BD59-A6C34878D82A}">
-                    <a16:rowId xmlns="" xmlns:a16="http://schemas.microsoft.com/office/drawing/2014/main" val="2789307922"/>
+                    <a16:rowId xmlns:a16="http://schemas.microsoft.com/office/drawing/2014/main" val="2789307922"/>
                   </a:ext>
                 </a:extLst>
               </a:tr>
@@ -4914,24 +4970,27 @@
                       </a:r>
                       <a:r>
                         <a:rPr lang="en-GB" cap="small" baseline="0" dirty="0" smtClean="0"/>
-                        <a:t> INVULLEN (</a:t>
+                        <a:t> </a:t>
+                      </a:r>
+                      <a:r>
+                        <a:rPr lang="en-GB" cap="small" baseline="0" dirty="0" smtClean="0"/>
+                        <a:t>INVULLEN (</a:t>
                       </a:r>
                       <a:r>
                         <a:rPr lang="en-GB" cap="small" baseline="0" dirty="0" err="1" smtClean="0"/>
                         <a:t>Doorschuiven</a:t>
                       </a:r>
                       <a:r>
-                        <a:rPr lang="en-GB" cap="small" baseline="0" smtClean="0"/>
+                        <a:rPr lang="en-GB" cap="small" baseline="0" dirty="0" smtClean="0"/>
                         <a:t>)</a:t>
                       </a:r>
-                      <a:endParaRPr lang="en-GB" cap="small" dirty="0"/>
                     </a:p>
                   </a:txBody>
                   <a:tcPr/>
                 </a:tc>
                 <a:extLst>
                   <a:ext uri="{0D108BD9-81ED-4DB2-BD59-A6C34878D82A}">
-                    <a16:rowId xmlns="" xmlns:a16="http://schemas.microsoft.com/office/drawing/2014/main" val="3498730236"/>
+                    <a16:rowId xmlns:a16="http://schemas.microsoft.com/office/drawing/2014/main" val="3498730236"/>
                   </a:ext>
                 </a:extLst>
               </a:tr>
@@ -5002,7 +5061,7 @@
                 </a:tc>
                 <a:extLst>
                   <a:ext uri="{0D108BD9-81ED-4DB2-BD59-A6C34878D82A}">
-                    <a16:rowId xmlns="" xmlns:a16="http://schemas.microsoft.com/office/drawing/2014/main" val="4013628509"/>
+                    <a16:rowId xmlns:a16="http://schemas.microsoft.com/office/drawing/2014/main" val="4013628509"/>
                   </a:ext>
                 </a:extLst>
               </a:tr>
@@ -5077,7 +5136,7 @@
                 </a:tc>
                 <a:extLst>
                   <a:ext uri="{0D108BD9-81ED-4DB2-BD59-A6C34878D82A}">
-                    <a16:rowId xmlns="" xmlns:a16="http://schemas.microsoft.com/office/drawing/2014/main" val="1545046261"/>
+                    <a16:rowId xmlns:a16="http://schemas.microsoft.com/office/drawing/2014/main" val="1545046261"/>
                   </a:ext>
                 </a:extLst>
               </a:tr>
@@ -5168,7 +5227,7 @@
     </p:spTree>
     <p:extLst>
       <p:ext uri="{BB962C8B-B14F-4D97-AF65-F5344CB8AC3E}">
-        <p14:creationId xmlns:p14="http://schemas.microsoft.com/office/powerpoint/2010/main" xmlns="" val="152465229"/>
+        <p14:creationId xmlns:p14="http://schemas.microsoft.com/office/powerpoint/2010/main" val="152465229"/>
       </p:ext>
     </p:extLst>
   </p:cSld>
@@ -5305,7 +5364,7 @@
           <a:noFill/>
           <a:extLst>
             <a:ext uri="{909E8E84-426E-40DD-AFC4-6F175D3DCCD1}">
-              <a14:hiddenFill xmlns:a14="http://schemas.microsoft.com/office/drawing/2010/main" xmlns="">
+              <a14:hiddenFill xmlns:a14="http://schemas.microsoft.com/office/drawing/2010/main">
                 <a:solidFill>
                   <a:srgbClr val="FFFFFF"/>
                 </a:solidFill>
@@ -5439,7 +5498,7 @@
     </p:spTree>
     <p:extLst>
       <p:ext uri="{BB962C8B-B14F-4D97-AF65-F5344CB8AC3E}">
-        <p14:creationId xmlns:p14="http://schemas.microsoft.com/office/powerpoint/2010/main" xmlns="" val="439526893"/>
+        <p14:creationId xmlns:p14="http://schemas.microsoft.com/office/powerpoint/2010/main" val="439526893"/>
       </p:ext>
     </p:extLst>
   </p:cSld>
@@ -5616,7 +5675,7 @@
         </p:spPr>
         <p:txBody>
           <a:bodyPr>
-            <a:normAutofit/>
+            <a:normAutofit lnSpcReduction="10000"/>
           </a:bodyPr>
           <a:lstStyle/>
           <a:p>
@@ -5709,32 +5768,17 @@
               <a:rPr lang="nl-BE" sz="2800" dirty="0" smtClean="0">
                 <a:latin typeface="Sitka Display" pitchFamily="2" charset="0"/>
               </a:rPr>
-              <a:t>Uitleg over design </a:t>
-            </a:r>
-            <a:r>
-              <a:rPr lang="nl-BE" sz="2800" dirty="0" err="1" smtClean="0">
-                <a:latin typeface="Sitka Display" pitchFamily="2" charset="0"/>
-              </a:rPr>
-              <a:t>patterns</a:t>
+              <a:t>Uitleg over design patterns: Observer, Memento, </a:t>
             </a:r>
             <a:r>
               <a:rPr lang="nl-BE" sz="2800" dirty="0" smtClean="0">
                 <a:latin typeface="Sitka Display" pitchFamily="2" charset="0"/>
               </a:rPr>
-              <a:t>: </a:t>
-            </a:r>
-            <a:r>
-              <a:rPr lang="nl-BE" sz="2800" dirty="0" err="1" smtClean="0">
-                <a:latin typeface="Sitka Display" pitchFamily="2" charset="0"/>
-              </a:rPr>
-              <a:t>Observer</a:t>
-            </a:r>
-            <a:r>
-              <a:rPr lang="nl-BE" sz="2800" dirty="0" smtClean="0">
-                <a:latin typeface="Sitka Display" pitchFamily="2" charset="0"/>
-              </a:rPr>
-              <a:t>, Memento, Stat</a:t>
-            </a:r>
+              <a:t>Stat + Strat ?</a:t>
+            </a:r>
+            <a:endParaRPr lang="nl-BE" sz="2800" dirty="0" smtClean="0">
+              <a:latin typeface="Sitka Display" pitchFamily="2" charset="0"/>
+            </a:endParaRPr>
           </a:p>
           <a:p>
             <a:pPr marL="0" indent="0">
@@ -5835,7 +5879,7 @@
     </p:spTree>
     <p:extLst>
       <p:ext uri="{BB962C8B-B14F-4D97-AF65-F5344CB8AC3E}">
-        <p14:creationId xmlns:p14="http://schemas.microsoft.com/office/powerpoint/2010/main" xmlns="" val="983478496"/>
+        <p14:creationId xmlns:p14="http://schemas.microsoft.com/office/powerpoint/2010/main" val="983478496"/>
       </p:ext>
     </p:extLst>
   </p:cSld>
@@ -6037,7 +6081,7 @@
             </a:clrChange>
             <a:extLst>
               <a:ext uri="{28A0092B-C50C-407E-A947-70E740481C1C}">
-                <a14:useLocalDpi xmlns:a14="http://schemas.microsoft.com/office/drawing/2010/main" xmlns="" val="0"/>
+                <a14:useLocalDpi xmlns:a14="http://schemas.microsoft.com/office/drawing/2010/main" val="0"/>
               </a:ext>
             </a:extLst>
           </a:blip>
@@ -6057,7 +6101,7 @@
           <a:noFill/>
           <a:extLst>
             <a:ext uri="{909E8E84-426E-40DD-AFC4-6F175D3DCCD1}">
-              <a14:hiddenFill xmlns:a14="http://schemas.microsoft.com/office/drawing/2010/main" xmlns="">
+              <a14:hiddenFill xmlns:a14="http://schemas.microsoft.com/office/drawing/2010/main">
                 <a:solidFill>
                   <a:srgbClr val="FFFFFF"/>
                 </a:solidFill>
@@ -6214,7 +6258,7 @@
     </p:spTree>
     <p:extLst>
       <p:ext uri="{BB962C8B-B14F-4D97-AF65-F5344CB8AC3E}">
-        <p14:creationId xmlns:p14="http://schemas.microsoft.com/office/powerpoint/2010/main" xmlns="" val="4089071672"/>
+        <p14:creationId xmlns:p14="http://schemas.microsoft.com/office/powerpoint/2010/main" val="4089071672"/>
       </p:ext>
     </p:extLst>
   </p:cSld>
@@ -6304,7 +6348,7 @@
     </p:spTree>
     <p:extLst>
       <p:ext uri="{BB962C8B-B14F-4D97-AF65-F5344CB8AC3E}">
-        <p14:creationId xmlns:p14="http://schemas.microsoft.com/office/powerpoint/2010/main" xmlns="" val="2544111520"/>
+        <p14:creationId xmlns:p14="http://schemas.microsoft.com/office/powerpoint/2010/main" val="2544111520"/>
       </p:ext>
     </p:extLst>
   </p:cSld>
@@ -6389,7 +6433,7 @@
     </p:spTree>
     <p:extLst>
       <p:ext uri="{BB962C8B-B14F-4D97-AF65-F5344CB8AC3E}">
-        <p14:creationId xmlns:p14="http://schemas.microsoft.com/office/powerpoint/2010/main" xmlns="" val="378156031"/>
+        <p14:creationId xmlns:p14="http://schemas.microsoft.com/office/powerpoint/2010/main" val="378156031"/>
       </p:ext>
     </p:extLst>
   </p:cSld>
@@ -6436,35 +6480,45 @@
           <a:p>
             <a:r>
               <a:rPr lang="nl-BE" dirty="0" smtClean="0"/>
-              <a:t>Uitleg memento</a:t>
+              <a:t>Mailbox system</a:t>
             </a:r>
             <a:endParaRPr lang="nl-BE" dirty="0"/>
           </a:p>
         </p:txBody>
       </p:sp>
-      <p:sp>
-        <p:nvSpPr>
-          <p:cNvPr id="3" name="Tijdelijke aanduiding voor inhoud 2"/>
-          <p:cNvSpPr>
-            <a:spLocks noGrp="1"/>
-          </p:cNvSpPr>
+      <p:pic>
+        <p:nvPicPr>
+          <p:cNvPr id="6" name="Content Placeholder 5"/>
+          <p:cNvPicPr>
+            <a:picLocks noGrp="1" noChangeAspect="1"/>
+          </p:cNvPicPr>
           <p:nvPr>
             <p:ph idx="1"/>
           </p:nvPr>
-        </p:nvSpPr>
-        <p:spPr/>
-        <p:txBody>
-          <a:bodyPr/>
-          <a:lstStyle/>
-          <a:p>
-            <a:endParaRPr lang="nl-BE"/>
-          </a:p>
-        </p:txBody>
-      </p:sp>
+        </p:nvPicPr>
+        <p:blipFill>
+          <a:blip r:embed="rId2">
+            <a:extLst>
+              <a:ext uri="{28A0092B-C50C-407E-A947-70E740481C1C}">
+                <a14:useLocalDpi xmlns:a14="http://schemas.microsoft.com/office/drawing/2010/main" val="0"/>
+              </a:ext>
+            </a:extLst>
+          </a:blip>
+          <a:stretch>
+            <a:fillRect/>
+          </a:stretch>
+        </p:blipFill>
+        <p:spPr>
+          <a:xfrm>
+            <a:off x="1043608" y="1268760"/>
+            <a:ext cx="6840760" cy="5555696"/>
+          </a:xfrm>
+        </p:spPr>
+      </p:pic>
     </p:spTree>
     <p:extLst>
       <p:ext uri="{BB962C8B-B14F-4D97-AF65-F5344CB8AC3E}">
-        <p14:creationId xmlns:p14="http://schemas.microsoft.com/office/powerpoint/2010/main" xmlns="" val="1968202226"/>
+        <p14:creationId xmlns:p14="http://schemas.microsoft.com/office/powerpoint/2010/main" val="1319242908"/>
       </p:ext>
     </p:extLst>
   </p:cSld>
@@ -6511,39 +6565,45 @@
           <a:p>
             <a:r>
               <a:rPr lang="nl-BE" dirty="0" smtClean="0"/>
-              <a:t>Uitleg </a:t>
-            </a:r>
-            <a:r>
-              <a:rPr lang="nl-BE" dirty="0" err="1" smtClean="0"/>
-              <a:t>Observer</a:t>
+              <a:t>Undo mechanism</a:t>
             </a:r>
             <a:endParaRPr lang="nl-BE" dirty="0"/>
           </a:p>
         </p:txBody>
       </p:sp>
-      <p:sp>
-        <p:nvSpPr>
-          <p:cNvPr id="3" name="Tijdelijke aanduiding voor inhoud 2"/>
-          <p:cNvSpPr>
-            <a:spLocks noGrp="1"/>
-          </p:cNvSpPr>
+      <p:pic>
+        <p:nvPicPr>
+          <p:cNvPr id="4" name="Content Placeholder 3"/>
+          <p:cNvPicPr>
+            <a:picLocks noGrp="1" noChangeAspect="1"/>
+          </p:cNvPicPr>
           <p:nvPr>
             <p:ph idx="1"/>
           </p:nvPr>
-        </p:nvSpPr>
-        <p:spPr/>
-        <p:txBody>
-          <a:bodyPr/>
-          <a:lstStyle/>
-          <a:p>
-            <a:endParaRPr lang="nl-BE"/>
-          </a:p>
-        </p:txBody>
-      </p:sp>
+        </p:nvPicPr>
+        <p:blipFill>
+          <a:blip r:embed="rId2">
+            <a:extLst>
+              <a:ext uri="{28A0092B-C50C-407E-A947-70E740481C1C}">
+                <a14:useLocalDpi xmlns:a14="http://schemas.microsoft.com/office/drawing/2010/main" val="0"/>
+              </a:ext>
+            </a:extLst>
+          </a:blip>
+          <a:stretch>
+            <a:fillRect/>
+          </a:stretch>
+        </p:blipFill>
+        <p:spPr>
+          <a:xfrm>
+            <a:off x="1259632" y="1196752"/>
+            <a:ext cx="6336704" cy="5553417"/>
+          </a:xfrm>
+        </p:spPr>
+      </p:pic>
     </p:spTree>
     <p:extLst>
       <p:ext uri="{BB962C8B-B14F-4D97-AF65-F5344CB8AC3E}">
-        <p14:creationId xmlns:p14="http://schemas.microsoft.com/office/powerpoint/2010/main" xmlns="" val="1319242908"/>
+        <p14:creationId xmlns:p14="http://schemas.microsoft.com/office/powerpoint/2010/main" val="1968202226"/>
       </p:ext>
     </p:extLst>
   </p:cSld>
@@ -6609,28 +6669,7 @@
                 </a:effectLst>
                 <a:latin typeface="Sitka Text" pitchFamily="2" charset="0"/>
               </a:rPr>
-              <a:t>Extensibility of </a:t>
-            </a:r>
-            <a:r>
-              <a:rPr lang="nl-BE" sz="3600" cap="small" dirty="0" smtClean="0">
-                <a:ln w="18415" cmpd="sng">
-                  <a:solidFill>
-                    <a:schemeClr val="tx1">
-                      <a:alpha val="0"/>
-                    </a:schemeClr>
-                  </a:solidFill>
-                  <a:prstDash val="solid"/>
-                </a:ln>
-                <a:effectLst>
-                  <a:outerShdw blurRad="25400" dir="3600000" algn="tl" rotWithShape="0">
-                    <a:srgbClr val="000000">
-                      <a:alpha val="70000"/>
-                    </a:srgbClr>
-                  </a:outerShdw>
-                </a:effectLst>
-                <a:latin typeface="Sitka Text" pitchFamily="2" charset="0"/>
-              </a:rPr>
-              <a:t>the system:</a:t>
+              <a:t>Extensibility of the system:</a:t>
             </a:r>
             <a:endParaRPr lang="nl-BE" sz="3600" cap="small" dirty="0">
               <a:ln w="18415" cmpd="sng">
@@ -6701,13 +6740,7 @@
               <a:rPr lang="en-US" sz="2400" dirty="0" err="1" smtClean="0">
                 <a:latin typeface="Sitka Display" pitchFamily="2" charset="0"/>
               </a:rPr>
-              <a:t>I</a:t>
-            </a:r>
-            <a:r>
-              <a:rPr lang="en-US" sz="2400" dirty="0" err="1" smtClean="0">
-                <a:latin typeface="Sitka Display" pitchFamily="2" charset="0"/>
-              </a:rPr>
-              <a:t>nitializer</a:t>
+              <a:t>Initializer</a:t>
             </a:r>
             <a:endParaRPr lang="en-US" sz="2400" dirty="0" smtClean="0">
               <a:latin typeface="Sitka Display" pitchFamily="2" charset="0"/>
@@ -6757,9 +6790,6 @@
               </a:rPr>
               <a:t>It was easy to implement the changes from iteration 2 -&gt; great extensibility of our code from iteration 1</a:t>
             </a:r>
-            <a:endParaRPr lang="en-US" sz="2400" dirty="0" smtClean="0">
-              <a:latin typeface="Sitka Display" pitchFamily="2" charset="0"/>
-            </a:endParaRPr>
           </a:p>
           <a:p>
             <a:endParaRPr lang="en-US" sz="2400" dirty="0"/>
@@ -6769,7 +6799,7 @@
     </p:spTree>
     <p:extLst>
       <p:ext uri="{BB962C8B-B14F-4D97-AF65-F5344CB8AC3E}">
-        <p14:creationId xmlns:p14="http://schemas.microsoft.com/office/powerpoint/2010/main" xmlns="" val="2444210159"/>
+        <p14:creationId xmlns:p14="http://schemas.microsoft.com/office/powerpoint/2010/main" val="2444210159"/>
       </p:ext>
     </p:extLst>
   </p:cSld>

</xml_diff>

<commit_message>
Presentatie deel Tags added
</commit_message>
<xml_diff>
--- a/Presentaties/Iteratie 2/SWOP Presentatie 2 Inhoud.pptx
+++ b/Presentaties/Iteratie 2/SWOP Presentatie 2 Inhoud.pptx
@@ -8,18 +8,21 @@
     <p:sldId id="256" r:id="rId2"/>
     <p:sldId id="257" r:id="rId3"/>
     <p:sldId id="258" r:id="rId4"/>
-    <p:sldId id="267" r:id="rId5"/>
-    <p:sldId id="276" r:id="rId6"/>
-    <p:sldId id="277" r:id="rId7"/>
-    <p:sldId id="279" r:id="rId8"/>
-    <p:sldId id="278" r:id="rId9"/>
-    <p:sldId id="259" r:id="rId10"/>
-    <p:sldId id="270" r:id="rId11"/>
-    <p:sldId id="274" r:id="rId12"/>
-    <p:sldId id="260" r:id="rId13"/>
-    <p:sldId id="261" r:id="rId14"/>
-    <p:sldId id="262" r:id="rId15"/>
-    <p:sldId id="275" r:id="rId16"/>
+    <p:sldId id="280" r:id="rId5"/>
+    <p:sldId id="281" r:id="rId6"/>
+    <p:sldId id="282" r:id="rId7"/>
+    <p:sldId id="283" r:id="rId8"/>
+    <p:sldId id="284" r:id="rId9"/>
+    <p:sldId id="277" r:id="rId10"/>
+    <p:sldId id="279" r:id="rId11"/>
+    <p:sldId id="278" r:id="rId12"/>
+    <p:sldId id="259" r:id="rId13"/>
+    <p:sldId id="270" r:id="rId14"/>
+    <p:sldId id="274" r:id="rId15"/>
+    <p:sldId id="260" r:id="rId16"/>
+    <p:sldId id="261" r:id="rId17"/>
+    <p:sldId id="262" r:id="rId18"/>
+    <p:sldId id="275" r:id="rId19"/>
   </p:sldIdLst>
   <p:sldSz cx="9144000" cy="6858000" type="screen4x3"/>
   <p:notesSz cx="6858000" cy="9144000"/>
@@ -319,7 +322,7 @@
             <a:fld id="{0F5E03E0-8FDD-4F94-8780-E28EA23ED5EC}" type="datetimeFigureOut">
               <a:rPr lang="nl-BE" smtClean="0"/>
               <a:pPr/>
-              <a:t>19/04/2016</a:t>
+              <a:t>19/04/16</a:t>
             </a:fld>
             <a:endParaRPr lang="nl-BE"/>
           </a:p>
@@ -362,7 +365,7 @@
             <a:fld id="{91663F60-0288-4BD7-9F87-79CFFEA98662}" type="slidenum">
               <a:rPr lang="nl-BE" smtClean="0"/>
               <a:pPr/>
-              <a:t>‹#›</a:t>
+              <a:t>‹nr.›</a:t>
             </a:fld>
             <a:endParaRPr lang="nl-BE"/>
           </a:p>
@@ -494,7 +497,7 @@
             <a:fld id="{0F5E03E0-8FDD-4F94-8780-E28EA23ED5EC}" type="datetimeFigureOut">
               <a:rPr lang="nl-BE" smtClean="0"/>
               <a:pPr/>
-              <a:t>19/04/2016</a:t>
+              <a:t>19/04/16</a:t>
             </a:fld>
             <a:endParaRPr lang="nl-BE"/>
           </a:p>
@@ -537,7 +540,7 @@
             <a:fld id="{91663F60-0288-4BD7-9F87-79CFFEA98662}" type="slidenum">
               <a:rPr lang="nl-BE" smtClean="0"/>
               <a:pPr/>
-              <a:t>‹#›</a:t>
+              <a:t>‹nr.›</a:t>
             </a:fld>
             <a:endParaRPr lang="nl-BE"/>
           </a:p>
@@ -679,7 +682,7 @@
             <a:fld id="{0F5E03E0-8FDD-4F94-8780-E28EA23ED5EC}" type="datetimeFigureOut">
               <a:rPr lang="nl-BE" smtClean="0"/>
               <a:pPr/>
-              <a:t>19/04/2016</a:t>
+              <a:t>19/04/16</a:t>
             </a:fld>
             <a:endParaRPr lang="nl-BE"/>
           </a:p>
@@ -722,7 +725,7 @@
             <a:fld id="{91663F60-0288-4BD7-9F87-79CFFEA98662}" type="slidenum">
               <a:rPr lang="nl-BE" smtClean="0"/>
               <a:pPr/>
-              <a:t>‹#›</a:t>
+              <a:t>‹nr.›</a:t>
             </a:fld>
             <a:endParaRPr lang="nl-BE"/>
           </a:p>
@@ -854,7 +857,7 @@
             <a:fld id="{0F5E03E0-8FDD-4F94-8780-E28EA23ED5EC}" type="datetimeFigureOut">
               <a:rPr lang="nl-BE" smtClean="0"/>
               <a:pPr/>
-              <a:t>19/04/2016</a:t>
+              <a:t>19/04/16</a:t>
             </a:fld>
             <a:endParaRPr lang="nl-BE"/>
           </a:p>
@@ -897,7 +900,7 @@
             <a:fld id="{91663F60-0288-4BD7-9F87-79CFFEA98662}" type="slidenum">
               <a:rPr lang="nl-BE" smtClean="0"/>
               <a:pPr/>
-              <a:t>‹#›</a:t>
+              <a:t>‹nr.›</a:t>
             </a:fld>
             <a:endParaRPr lang="nl-BE"/>
           </a:p>
@@ -1105,7 +1108,7 @@
             <a:fld id="{0F5E03E0-8FDD-4F94-8780-E28EA23ED5EC}" type="datetimeFigureOut">
               <a:rPr lang="nl-BE" smtClean="0"/>
               <a:pPr/>
-              <a:t>19/04/2016</a:t>
+              <a:t>19/04/16</a:t>
             </a:fld>
             <a:endParaRPr lang="nl-BE"/>
           </a:p>
@@ -1148,7 +1151,7 @@
             <a:fld id="{91663F60-0288-4BD7-9F87-79CFFEA98662}" type="slidenum">
               <a:rPr lang="nl-BE" smtClean="0"/>
               <a:pPr/>
-              <a:t>‹#›</a:t>
+              <a:t>‹nr.›</a:t>
             </a:fld>
             <a:endParaRPr lang="nl-BE"/>
           </a:p>
@@ -1398,7 +1401,7 @@
             <a:fld id="{0F5E03E0-8FDD-4F94-8780-E28EA23ED5EC}" type="datetimeFigureOut">
               <a:rPr lang="nl-BE" smtClean="0"/>
               <a:pPr/>
-              <a:t>19/04/2016</a:t>
+              <a:t>19/04/16</a:t>
             </a:fld>
             <a:endParaRPr lang="nl-BE"/>
           </a:p>
@@ -1441,7 +1444,7 @@
             <a:fld id="{91663F60-0288-4BD7-9F87-79CFFEA98662}" type="slidenum">
               <a:rPr lang="nl-BE" smtClean="0"/>
               <a:pPr/>
-              <a:t>‹#›</a:t>
+              <a:t>‹nr.›</a:t>
             </a:fld>
             <a:endParaRPr lang="nl-BE"/>
           </a:p>
@@ -1825,7 +1828,7 @@
             <a:fld id="{0F5E03E0-8FDD-4F94-8780-E28EA23ED5EC}" type="datetimeFigureOut">
               <a:rPr lang="nl-BE" smtClean="0"/>
               <a:pPr/>
-              <a:t>19/04/2016</a:t>
+              <a:t>19/04/16</a:t>
             </a:fld>
             <a:endParaRPr lang="nl-BE"/>
           </a:p>
@@ -1868,7 +1871,7 @@
             <a:fld id="{91663F60-0288-4BD7-9F87-79CFFEA98662}" type="slidenum">
               <a:rPr lang="nl-BE" smtClean="0"/>
               <a:pPr/>
-              <a:t>‹#›</a:t>
+              <a:t>‹nr.›</a:t>
             </a:fld>
             <a:endParaRPr lang="nl-BE"/>
           </a:p>
@@ -1948,7 +1951,7 @@
             <a:fld id="{0F5E03E0-8FDD-4F94-8780-E28EA23ED5EC}" type="datetimeFigureOut">
               <a:rPr lang="nl-BE" smtClean="0"/>
               <a:pPr/>
-              <a:t>19/04/2016</a:t>
+              <a:t>19/04/16</a:t>
             </a:fld>
             <a:endParaRPr lang="nl-BE"/>
           </a:p>
@@ -1991,7 +1994,7 @@
             <a:fld id="{91663F60-0288-4BD7-9F87-79CFFEA98662}" type="slidenum">
               <a:rPr lang="nl-BE" smtClean="0"/>
               <a:pPr/>
-              <a:t>‹#›</a:t>
+              <a:t>‹nr.›</a:t>
             </a:fld>
             <a:endParaRPr lang="nl-BE"/>
           </a:p>
@@ -2048,7 +2051,7 @@
             <a:fld id="{0F5E03E0-8FDD-4F94-8780-E28EA23ED5EC}" type="datetimeFigureOut">
               <a:rPr lang="nl-BE" smtClean="0"/>
               <a:pPr/>
-              <a:t>19/04/2016</a:t>
+              <a:t>19/04/16</a:t>
             </a:fld>
             <a:endParaRPr lang="nl-BE"/>
           </a:p>
@@ -2091,7 +2094,7 @@
             <a:fld id="{91663F60-0288-4BD7-9F87-79CFFEA98662}" type="slidenum">
               <a:rPr lang="nl-BE" smtClean="0"/>
               <a:pPr/>
-              <a:t>‹#›</a:t>
+              <a:t>‹nr.›</a:t>
             </a:fld>
             <a:endParaRPr lang="nl-BE"/>
           </a:p>
@@ -2330,7 +2333,7 @@
             <a:fld id="{0F5E03E0-8FDD-4F94-8780-E28EA23ED5EC}" type="datetimeFigureOut">
               <a:rPr lang="nl-BE" smtClean="0"/>
               <a:pPr/>
-              <a:t>19/04/2016</a:t>
+              <a:t>19/04/16</a:t>
             </a:fld>
             <a:endParaRPr lang="nl-BE"/>
           </a:p>
@@ -2373,7 +2376,7 @@
             <a:fld id="{91663F60-0288-4BD7-9F87-79CFFEA98662}" type="slidenum">
               <a:rPr lang="nl-BE" smtClean="0"/>
               <a:pPr/>
-              <a:t>‹#›</a:t>
+              <a:t>‹nr.›</a:t>
             </a:fld>
             <a:endParaRPr lang="nl-BE"/>
           </a:p>
@@ -2588,7 +2591,7 @@
             <a:fld id="{0F5E03E0-8FDD-4F94-8780-E28EA23ED5EC}" type="datetimeFigureOut">
               <a:rPr lang="nl-BE" smtClean="0"/>
               <a:pPr/>
-              <a:t>19/04/2016</a:t>
+              <a:t>19/04/16</a:t>
             </a:fld>
             <a:endParaRPr lang="nl-BE"/>
           </a:p>
@@ -2631,7 +2634,7 @@
             <a:fld id="{91663F60-0288-4BD7-9F87-79CFFEA98662}" type="slidenum">
               <a:rPr lang="nl-BE" smtClean="0"/>
               <a:pPr/>
-              <a:t>‹#›</a:t>
+              <a:t>‹nr.›</a:t>
             </a:fld>
             <a:endParaRPr lang="nl-BE"/>
           </a:p>
@@ -2830,7 +2833,7 @@
             <a:fld id="{0F5E03E0-8FDD-4F94-8780-E28EA23ED5EC}" type="datetimeFigureOut">
               <a:rPr lang="nl-BE" smtClean="0"/>
               <a:pPr/>
-              <a:t>19/04/2016</a:t>
+              <a:t>19/04/16</a:t>
             </a:fld>
             <a:endParaRPr lang="nl-BE"/>
           </a:p>
@@ -2909,7 +2912,7 @@
             <a:fld id="{91663F60-0288-4BD7-9F87-79CFFEA98662}" type="slidenum">
               <a:rPr lang="nl-BE" smtClean="0"/>
               <a:pPr/>
-              <a:t>‹#›</a:t>
+              <a:t>‹nr.›</a:t>
             </a:fld>
             <a:endParaRPr lang="nl-BE"/>
           </a:p>
@@ -3596,6 +3599,379 @@
         </p:nvSpPr>
         <p:spPr/>
         <p:txBody>
+          <a:bodyPr/>
+          <a:lstStyle/>
+          <a:p>
+            <a:r>
+              <a:rPr lang="nl-BE" dirty="0" smtClean="0"/>
+              <a:t>Mailbox system</a:t>
+            </a:r>
+            <a:endParaRPr lang="nl-BE" dirty="0"/>
+          </a:p>
+        </p:txBody>
+      </p:sp>
+      <p:pic>
+        <p:nvPicPr>
+          <p:cNvPr id="6" name="Content Placeholder 5"/>
+          <p:cNvPicPr>
+            <a:picLocks noGrp="1" noChangeAspect="1"/>
+          </p:cNvPicPr>
+          <p:nvPr>
+            <p:ph idx="1"/>
+          </p:nvPr>
+        </p:nvPicPr>
+        <p:blipFill>
+          <a:blip r:embed="rId2">
+            <a:extLst>
+              <a:ext uri="{28A0092B-C50C-407E-A947-70E740481C1C}">
+                <a14:useLocalDpi xmlns:a14="http://schemas.microsoft.com/office/drawing/2010/main" val="0"/>
+              </a:ext>
+            </a:extLst>
+          </a:blip>
+          <a:stretch>
+            <a:fillRect/>
+          </a:stretch>
+        </p:blipFill>
+        <p:spPr>
+          <a:xfrm>
+            <a:off x="1043608" y="1268760"/>
+            <a:ext cx="6840760" cy="5555696"/>
+          </a:xfrm>
+        </p:spPr>
+      </p:pic>
+    </p:spTree>
+    <p:extLst>
+      <p:ext uri="{BB962C8B-B14F-4D97-AF65-F5344CB8AC3E}">
+        <p14:creationId xmlns:p14="http://schemas.microsoft.com/office/powerpoint/2010/main" val="1319242908"/>
+      </p:ext>
+    </p:extLst>
+  </p:cSld>
+  <p:clrMapOvr>
+    <a:masterClrMapping/>
+  </p:clrMapOvr>
+  <p:transition>
+    <p:fade/>
+  </p:transition>
+</p:sld>
+</file>
+
+<file path=ppt/slides/slide11.xml><?xml version="1.0" encoding="utf-8"?>
+<p:sld xmlns:a="http://schemas.openxmlformats.org/drawingml/2006/main" xmlns:r="http://schemas.openxmlformats.org/officeDocument/2006/relationships" xmlns:p="http://schemas.openxmlformats.org/presentationml/2006/main">
+  <p:cSld>
+    <p:spTree>
+      <p:nvGrpSpPr>
+        <p:cNvPr id="1" name=""/>
+        <p:cNvGrpSpPr/>
+        <p:nvPr/>
+      </p:nvGrpSpPr>
+      <p:grpSpPr>
+        <a:xfrm>
+          <a:off x="0" y="0"/>
+          <a:ext cx="0" cy="0"/>
+          <a:chOff x="0" y="0"/>
+          <a:chExt cx="0" cy="0"/>
+        </a:xfrm>
+      </p:grpSpPr>
+      <p:sp>
+        <p:nvSpPr>
+          <p:cNvPr id="2" name="Titel 1"/>
+          <p:cNvSpPr>
+            <a:spLocks noGrp="1"/>
+          </p:cNvSpPr>
+          <p:nvPr>
+            <p:ph type="title"/>
+          </p:nvPr>
+        </p:nvSpPr>
+        <p:spPr/>
+        <p:txBody>
+          <a:bodyPr/>
+          <a:lstStyle/>
+          <a:p>
+            <a:r>
+              <a:rPr lang="nl-BE" dirty="0" smtClean="0"/>
+              <a:t>Undo mechanism</a:t>
+            </a:r>
+            <a:endParaRPr lang="nl-BE" dirty="0"/>
+          </a:p>
+        </p:txBody>
+      </p:sp>
+      <p:pic>
+        <p:nvPicPr>
+          <p:cNvPr id="4" name="Content Placeholder 3"/>
+          <p:cNvPicPr>
+            <a:picLocks noGrp="1" noChangeAspect="1"/>
+          </p:cNvPicPr>
+          <p:nvPr>
+            <p:ph idx="1"/>
+          </p:nvPr>
+        </p:nvPicPr>
+        <p:blipFill>
+          <a:blip r:embed="rId2">
+            <a:extLst>
+              <a:ext uri="{28A0092B-C50C-407E-A947-70E740481C1C}">
+                <a14:useLocalDpi xmlns:a14="http://schemas.microsoft.com/office/drawing/2010/main" val="0"/>
+              </a:ext>
+            </a:extLst>
+          </a:blip>
+          <a:stretch>
+            <a:fillRect/>
+          </a:stretch>
+        </p:blipFill>
+        <p:spPr>
+          <a:xfrm>
+            <a:off x="1259632" y="1196752"/>
+            <a:ext cx="6336704" cy="5553417"/>
+          </a:xfrm>
+        </p:spPr>
+      </p:pic>
+    </p:spTree>
+    <p:extLst>
+      <p:ext uri="{BB962C8B-B14F-4D97-AF65-F5344CB8AC3E}">
+        <p14:creationId xmlns:p14="http://schemas.microsoft.com/office/powerpoint/2010/main" val="1968202226"/>
+      </p:ext>
+    </p:extLst>
+  </p:cSld>
+  <p:clrMapOvr>
+    <a:masterClrMapping/>
+  </p:clrMapOvr>
+  <p:transition>
+    <p:fade/>
+  </p:transition>
+</p:sld>
+</file>
+
+<file path=ppt/slides/slide12.xml><?xml version="1.0" encoding="utf-8"?>
+<p:sld xmlns:a="http://schemas.openxmlformats.org/drawingml/2006/main" xmlns:r="http://schemas.openxmlformats.org/officeDocument/2006/relationships" xmlns:p="http://schemas.openxmlformats.org/presentationml/2006/main">
+  <p:cSld>
+    <p:spTree>
+      <p:nvGrpSpPr>
+        <p:cNvPr id="1" name=""/>
+        <p:cNvGrpSpPr/>
+        <p:nvPr/>
+      </p:nvGrpSpPr>
+      <p:grpSpPr>
+        <a:xfrm>
+          <a:off x="0" y="0"/>
+          <a:ext cx="0" cy="0"/>
+          <a:chOff x="0" y="0"/>
+          <a:chExt cx="0" cy="0"/>
+        </a:xfrm>
+      </p:grpSpPr>
+      <p:sp>
+        <p:nvSpPr>
+          <p:cNvPr id="2" name="Titel 1"/>
+          <p:cNvSpPr>
+            <a:spLocks noGrp="1"/>
+          </p:cNvSpPr>
+          <p:nvPr>
+            <p:ph type="title"/>
+          </p:nvPr>
+        </p:nvSpPr>
+        <p:spPr/>
+        <p:txBody>
+          <a:bodyPr>
+            <a:normAutofit/>
+          </a:bodyPr>
+          <a:lstStyle/>
+          <a:p>
+            <a:r>
+              <a:rPr lang="nl-BE" sz="3600" cap="small" dirty="0" smtClean="0">
+                <a:ln w="18415" cmpd="sng">
+                  <a:solidFill>
+                    <a:schemeClr val="tx1">
+                      <a:alpha val="0"/>
+                    </a:schemeClr>
+                  </a:solidFill>
+                  <a:prstDash val="solid"/>
+                </a:ln>
+                <a:effectLst>
+                  <a:outerShdw blurRad="25400" dir="3600000" algn="tl" rotWithShape="0">
+                    <a:srgbClr val="000000">
+                      <a:alpha val="70000"/>
+                    </a:srgbClr>
+                  </a:outerShdw>
+                </a:effectLst>
+                <a:latin typeface="Sitka Text" pitchFamily="2" charset="0"/>
+              </a:rPr>
+              <a:t>Extensibility of the system:</a:t>
+            </a:r>
+            <a:endParaRPr lang="nl-BE" sz="3600" cap="small" dirty="0">
+              <a:ln w="18415" cmpd="sng">
+                <a:solidFill>
+                  <a:schemeClr val="tx1">
+                    <a:alpha val="0"/>
+                  </a:schemeClr>
+                </a:solidFill>
+                <a:prstDash val="solid"/>
+              </a:ln>
+              <a:effectLst>
+                <a:outerShdw blurRad="25400" dir="3600000" algn="tl" rotWithShape="0">
+                  <a:srgbClr val="000000">
+                    <a:alpha val="70000"/>
+                  </a:srgbClr>
+                </a:outerShdw>
+              </a:effectLst>
+              <a:latin typeface="Sitka Text" pitchFamily="2" charset="0"/>
+            </a:endParaRPr>
+          </a:p>
+        </p:txBody>
+      </p:sp>
+      <p:sp>
+        <p:nvSpPr>
+          <p:cNvPr id="3" name="Tijdelijke aanduiding voor inhoud 2"/>
+          <p:cNvSpPr>
+            <a:spLocks noGrp="1"/>
+          </p:cNvSpPr>
+          <p:nvPr>
+            <p:ph idx="1"/>
+          </p:nvPr>
+        </p:nvSpPr>
+        <p:spPr>
+          <a:xfrm>
+            <a:off x="539552" y="1844824"/>
+            <a:ext cx="8229600" cy="4525963"/>
+          </a:xfrm>
+        </p:spPr>
+        <p:txBody>
+          <a:bodyPr>
+            <a:normAutofit/>
+          </a:bodyPr>
+          <a:lstStyle/>
+          <a:p>
+            <a:r>
+              <a:rPr lang="en-US" sz="2400" dirty="0" smtClean="0">
+                <a:latin typeface="Sitka Display" pitchFamily="2" charset="0"/>
+              </a:rPr>
+              <a:t>It’s easier to add use cases than last time</a:t>
+            </a:r>
+          </a:p>
+          <a:p>
+            <a:r>
+              <a:rPr lang="en-US" sz="2400" dirty="0" smtClean="0">
+                <a:latin typeface="Sitka Display" pitchFamily="2" charset="0"/>
+              </a:rPr>
+              <a:t>UI is still completely independent </a:t>
+            </a:r>
+          </a:p>
+          <a:p>
+            <a:r>
+              <a:rPr lang="en-US" sz="2400" dirty="0" smtClean="0">
+                <a:latin typeface="Sitka Display" pitchFamily="2" charset="0"/>
+              </a:rPr>
+              <a:t>Interface for the </a:t>
+            </a:r>
+            <a:r>
+              <a:rPr lang="en-US" sz="2400" dirty="0" err="1" smtClean="0">
+                <a:latin typeface="Sitka Display" pitchFamily="2" charset="0"/>
+              </a:rPr>
+              <a:t>Initializer</a:t>
+            </a:r>
+            <a:endParaRPr lang="en-US" sz="2400" dirty="0" smtClean="0">
+              <a:latin typeface="Sitka Display" pitchFamily="2" charset="0"/>
+            </a:endParaRPr>
+          </a:p>
+          <a:p>
+            <a:r>
+              <a:rPr lang="en-US" sz="2400" dirty="0" smtClean="0">
+                <a:latin typeface="Sitka Display" pitchFamily="2" charset="0"/>
+              </a:rPr>
+              <a:t>Adding constraints concerning tag</a:t>
+            </a:r>
+          </a:p>
+          <a:p>
+            <a:r>
+              <a:rPr lang="en-US" sz="2400" dirty="0" smtClean="0">
+                <a:latin typeface="Sitka Display" pitchFamily="2" charset="0"/>
+              </a:rPr>
+              <a:t>Adding new registration types = adding new observers</a:t>
+            </a:r>
+          </a:p>
+          <a:p>
+            <a:r>
+              <a:rPr lang="en-US" sz="2400" dirty="0" smtClean="0">
+                <a:latin typeface="Sitka Display" pitchFamily="2" charset="0"/>
+              </a:rPr>
+              <a:t>Search methods for bug reports</a:t>
+            </a:r>
+          </a:p>
+          <a:p>
+            <a:r>
+              <a:rPr lang="en-US" sz="2400" dirty="0" smtClean="0">
+                <a:latin typeface="Sitka Display" pitchFamily="2" charset="0"/>
+              </a:rPr>
+              <a:t>Adding new objects that could be undone</a:t>
+            </a:r>
+          </a:p>
+          <a:p>
+            <a:endParaRPr lang="en-US" sz="2400" dirty="0" smtClean="0">
+              <a:latin typeface="Sitka Display" pitchFamily="2" charset="0"/>
+            </a:endParaRPr>
+          </a:p>
+          <a:p>
+            <a:r>
+              <a:rPr lang="en-US" sz="2400" dirty="0" smtClean="0">
+                <a:latin typeface="Sitka Display" pitchFamily="2" charset="0"/>
+              </a:rPr>
+              <a:t>It was easy to implement the changes from iteration 2 -&gt; great extensibility of our code from iteration 1</a:t>
+            </a:r>
+          </a:p>
+          <a:p>
+            <a:endParaRPr lang="en-US" sz="2400" dirty="0"/>
+          </a:p>
+        </p:txBody>
+      </p:sp>
+    </p:spTree>
+    <p:extLst>
+      <p:ext uri="{BB962C8B-B14F-4D97-AF65-F5344CB8AC3E}">
+        <p14:creationId xmlns:p14="http://schemas.microsoft.com/office/powerpoint/2010/main" val="2444210159"/>
+      </p:ext>
+    </p:extLst>
+  </p:cSld>
+  <p:clrMapOvr>
+    <a:masterClrMapping/>
+  </p:clrMapOvr>
+  <p:transition>
+    <p:fade/>
+  </p:transition>
+  <p:timing>
+    <p:tnLst>
+      <p:par>
+        <p:cTn id="1" dur="indefinite" restart="never" nodeType="tmRoot"/>
+      </p:par>
+    </p:tnLst>
+  </p:timing>
+</p:sld>
+</file>
+
+<file path=ppt/slides/slide13.xml><?xml version="1.0" encoding="utf-8"?>
+<p:sld xmlns:a="http://schemas.openxmlformats.org/drawingml/2006/main" xmlns:r="http://schemas.openxmlformats.org/officeDocument/2006/relationships" xmlns:p="http://schemas.openxmlformats.org/presentationml/2006/main">
+  <p:cSld>
+    <p:spTree>
+      <p:nvGrpSpPr>
+        <p:cNvPr id="1" name=""/>
+        <p:cNvGrpSpPr/>
+        <p:nvPr/>
+      </p:nvGrpSpPr>
+      <p:grpSpPr>
+        <a:xfrm>
+          <a:off x="0" y="0"/>
+          <a:ext cx="0" cy="0"/>
+          <a:chOff x="0" y="0"/>
+          <a:chExt cx="0" cy="0"/>
+        </a:xfrm>
+      </p:grpSpPr>
+      <p:sp>
+        <p:nvSpPr>
+          <p:cNvPr id="2" name="Titel 1"/>
+          <p:cNvSpPr>
+            <a:spLocks noGrp="1"/>
+          </p:cNvSpPr>
+          <p:nvPr>
+            <p:ph type="title"/>
+          </p:nvPr>
+        </p:nvSpPr>
+        <p:spPr/>
+        <p:txBody>
           <a:bodyPr>
             <a:normAutofit/>
           </a:bodyPr>
@@ -3765,7 +4141,7 @@
 </p:sld>
 </file>
 
-<file path=ppt/slides/slide11.xml><?xml version="1.0" encoding="utf-8"?>
+<file path=ppt/slides/slide14.xml><?xml version="1.0" encoding="utf-8"?>
 <p:sld xmlns:a="http://schemas.openxmlformats.org/drawingml/2006/main" xmlns:r="http://schemas.openxmlformats.org/officeDocument/2006/relationships" xmlns:p="http://schemas.openxmlformats.org/presentationml/2006/main">
   <p:cSld>
     <p:spTree>
@@ -3930,7 +4306,7 @@
 </p:sld>
 </file>
 
-<file path=ppt/slides/slide12.xml><?xml version="1.0" encoding="utf-8"?>
+<file path=ppt/slides/slide15.xml><?xml version="1.0" encoding="utf-8"?>
 <p:sld xmlns:a="http://schemas.openxmlformats.org/drawingml/2006/main" xmlns:r="http://schemas.openxmlformats.org/officeDocument/2006/relationships" xmlns:p="http://schemas.openxmlformats.org/presentationml/2006/main">
   <p:cSld>
     <p:spTree>
@@ -3983,28 +4359,7 @@
                 </a:effectLst>
                 <a:latin typeface="Sitka Text" pitchFamily="2" charset="0"/>
               </a:rPr>
-              <a:t>Testing </a:t>
-            </a:r>
-            <a:r>
-              <a:rPr lang="nl-BE" sz="3600" cap="small" dirty="0" smtClean="0">
-                <a:ln w="18415" cmpd="sng">
-                  <a:solidFill>
-                    <a:schemeClr val="tx1">
-                      <a:alpha val="0"/>
-                    </a:schemeClr>
-                  </a:solidFill>
-                  <a:prstDash val="solid"/>
-                </a:ln>
-                <a:effectLst>
-                  <a:outerShdw blurRad="25400" dir="3600000" algn="tl" rotWithShape="0">
-                    <a:srgbClr val="000000">
-                      <a:alpha val="70000"/>
-                    </a:srgbClr>
-                  </a:outerShdw>
-                </a:effectLst>
-                <a:latin typeface="Sitka Text" pitchFamily="2" charset="0"/>
-              </a:rPr>
-              <a:t>approach</a:t>
+              <a:t>Testing approach</a:t>
             </a:r>
             <a:endParaRPr lang="nl-BE" sz="3600" cap="small" dirty="0">
               <a:ln w="18415" cmpd="sng">
@@ -4079,7 +4434,7 @@
 </p:sld>
 </file>
 
-<file path=ppt/slides/slide13.xml><?xml version="1.0" encoding="utf-8"?>
+<file path=ppt/slides/slide16.xml><?xml version="1.0" encoding="utf-8"?>
 <p:sld xmlns:a="http://schemas.openxmlformats.org/drawingml/2006/main" xmlns:r="http://schemas.openxmlformats.org/officeDocument/2006/relationships" xmlns:p="http://schemas.openxmlformats.org/presentationml/2006/main">
   <p:cSld>
     <p:spTree>
@@ -4217,7 +4572,7 @@
 </p:sld>
 </file>
 
-<file path=ppt/slides/slide14.xml><?xml version="1.0" encoding="utf-8"?>
+<file path=ppt/slides/slide17.xml><?xml version="1.0" encoding="utf-8"?>
 <p:sld xmlns:a="http://schemas.openxmlformats.org/drawingml/2006/main" xmlns:r="http://schemas.openxmlformats.org/officeDocument/2006/relationships" xmlns:p="http://schemas.openxmlformats.org/presentationml/2006/main">
   <p:cSld>
     <p:spTree>
@@ -4628,77 +4983,8 @@
                 </a:effectLst>
                 <a:latin typeface="Sitka Banner" pitchFamily="2" charset="0"/>
               </a:rPr>
-              <a:t> </a:t>
-            </a:r>
-            <a:r>
-              <a:rPr lang="nl-BE" sz="2400" dirty="0" smtClean="0">
-                <a:solidFill>
-                  <a:schemeClr val="accent4">
-                    <a:lumMod val="50000"/>
-                  </a:schemeClr>
-                </a:solidFill>
-                <a:effectLst>
-                  <a:outerShdw blurRad="76200" dist="38100" dir="5400000" algn="t" rotWithShape="0">
-                    <a:prstClr val="black">
-                      <a:alpha val="27000"/>
-                    </a:prstClr>
-                  </a:outerShdw>
-                </a:effectLst>
-                <a:latin typeface="Sitka Banner" pitchFamily="2" charset="0"/>
-              </a:rPr>
-              <a:t>31h</a:t>
-            </a:r>
-            <a:r>
-              <a:rPr lang="nl-BE" sz="2400" dirty="0" smtClean="0">
-                <a:solidFill>
-                  <a:schemeClr val="accent4">
-                    <a:lumMod val="50000"/>
-                  </a:schemeClr>
-                </a:solidFill>
-                <a:effectLst>
-                  <a:outerShdw blurRad="76200" dist="38100" dir="5400000" algn="t" rotWithShape="0">
-                    <a:prstClr val="black">
-                      <a:alpha val="27000"/>
-                    </a:prstClr>
-                  </a:outerShdw>
-                </a:effectLst>
-                <a:latin typeface="Sitka Banner" pitchFamily="2" charset="0"/>
-              </a:rPr>
-              <a:t>	Individual Work: 	</a:t>
-            </a:r>
-            <a:r>
-              <a:rPr lang="nl-BE" sz="2400" dirty="0" smtClean="0">
-                <a:solidFill>
-                  <a:schemeClr val="accent4">
-                    <a:lumMod val="50000"/>
-                  </a:schemeClr>
-                </a:solidFill>
-                <a:effectLst>
-                  <a:outerShdw blurRad="76200" dist="38100" dir="5400000" algn="t" rotWithShape="0">
-                    <a:prstClr val="black">
-                      <a:alpha val="27000"/>
-                    </a:prstClr>
-                  </a:outerShdw>
-                </a:effectLst>
-                <a:latin typeface="Sitka Banner" pitchFamily="2" charset="0"/>
-              </a:rPr>
-              <a:t>Study:  </a:t>
-            </a:r>
-            <a:endParaRPr lang="nl-BE" sz="2400" dirty="0" smtClean="0">
-              <a:solidFill>
-                <a:schemeClr val="accent4">
-                  <a:lumMod val="50000"/>
-                </a:schemeClr>
-              </a:solidFill>
-              <a:effectLst>
-                <a:outerShdw blurRad="76200" dist="38100" dir="5400000" algn="t" rotWithShape="0">
-                  <a:prstClr val="black">
-                    <a:alpha val="27000"/>
-                  </a:prstClr>
-                </a:outerShdw>
-              </a:effectLst>
-              <a:latin typeface="Sitka Banner" pitchFamily="2" charset="0"/>
-            </a:endParaRPr>
+              <a:t> 31h	Individual Work: 	Study:  </a:t>
+            </a:r>
           </a:p>
           <a:p>
             <a:pPr marL="0" indent="0">
@@ -4731,7 +5017,7 @@
 </p:sld>
 </file>
 
-<file path=ppt/slides/slide15.xml><?xml version="1.0" encoding="utf-8"?>
+<file path=ppt/slides/slide18.xml><?xml version="1.0" encoding="utf-8"?>
 <p:sld xmlns:a="http://schemas.openxmlformats.org/drawingml/2006/main" xmlns:r="http://schemas.openxmlformats.org/officeDocument/2006/relationships" xmlns:p="http://schemas.openxmlformats.org/presentationml/2006/main">
   <p:cSld>
     <p:spTree>
@@ -4777,28 +5063,28 @@
                 <a:gridCol w="2057400">
                   <a:extLst>
                     <a:ext uri="{9D8B030D-6E8A-4147-A177-3AD203B41FA5}">
-                      <a16:colId xmlns:a16="http://schemas.microsoft.com/office/drawing/2014/main" val="4022630451"/>
+                      <a16:colId xmlns:a16="http://schemas.microsoft.com/office/drawing/2014/main" xmlns="" val="4022630451"/>
                     </a:ext>
                   </a:extLst>
                 </a:gridCol>
                 <a:gridCol w="2057400">
                   <a:extLst>
                     <a:ext uri="{9D8B030D-6E8A-4147-A177-3AD203B41FA5}">
-                      <a16:colId xmlns:a16="http://schemas.microsoft.com/office/drawing/2014/main" val="1276862258"/>
+                      <a16:colId xmlns:a16="http://schemas.microsoft.com/office/drawing/2014/main" xmlns="" val="1276862258"/>
                     </a:ext>
                   </a:extLst>
                 </a:gridCol>
                 <a:gridCol w="2057400">
                   <a:extLst>
                     <a:ext uri="{9D8B030D-6E8A-4147-A177-3AD203B41FA5}">
-                      <a16:colId xmlns:a16="http://schemas.microsoft.com/office/drawing/2014/main" val="670422697"/>
+                      <a16:colId xmlns:a16="http://schemas.microsoft.com/office/drawing/2014/main" xmlns="" val="670422697"/>
                     </a:ext>
                   </a:extLst>
                 </a:gridCol>
                 <a:gridCol w="2057400">
                   <a:extLst>
                     <a:ext uri="{9D8B030D-6E8A-4147-A177-3AD203B41FA5}">
-                      <a16:colId xmlns:a16="http://schemas.microsoft.com/office/drawing/2014/main" val="3836214712"/>
+                      <a16:colId xmlns:a16="http://schemas.microsoft.com/office/drawing/2014/main" xmlns="" val="3836214712"/>
                     </a:ext>
                   </a:extLst>
                 </a:gridCol>
@@ -4870,7 +5156,7 @@
                 </a:tc>
                 <a:extLst>
                   <a:ext uri="{0D108BD9-81ED-4DB2-BD59-A6C34878D82A}">
-                    <a16:rowId xmlns:a16="http://schemas.microsoft.com/office/drawing/2014/main" val="2789307922"/>
+                    <a16:rowId xmlns:a16="http://schemas.microsoft.com/office/drawing/2014/main" xmlns="" val="2789307922"/>
                   </a:ext>
                 </a:extLst>
               </a:tr>
@@ -4970,11 +5256,7 @@
                       </a:r>
                       <a:r>
                         <a:rPr lang="en-GB" cap="small" baseline="0" dirty="0" smtClean="0"/>
-                        <a:t> </a:t>
-                      </a:r>
-                      <a:r>
-                        <a:rPr lang="en-GB" cap="small" baseline="0" dirty="0" smtClean="0"/>
-                        <a:t>INVULLEN (</a:t>
+                        <a:t> INVULLEN (</a:t>
                       </a:r>
                       <a:r>
                         <a:rPr lang="en-GB" cap="small" baseline="0" dirty="0" err="1" smtClean="0"/>
@@ -4990,7 +5272,7 @@
                 </a:tc>
                 <a:extLst>
                   <a:ext uri="{0D108BD9-81ED-4DB2-BD59-A6C34878D82A}">
-                    <a16:rowId xmlns:a16="http://schemas.microsoft.com/office/drawing/2014/main" val="3498730236"/>
+                    <a16:rowId xmlns:a16="http://schemas.microsoft.com/office/drawing/2014/main" xmlns="" val="3498730236"/>
                   </a:ext>
                 </a:extLst>
               </a:tr>
@@ -5061,7 +5343,7 @@
                 </a:tc>
                 <a:extLst>
                   <a:ext uri="{0D108BD9-81ED-4DB2-BD59-A6C34878D82A}">
-                    <a16:rowId xmlns:a16="http://schemas.microsoft.com/office/drawing/2014/main" val="4013628509"/>
+                    <a16:rowId xmlns:a16="http://schemas.microsoft.com/office/drawing/2014/main" xmlns="" val="4013628509"/>
                   </a:ext>
                 </a:extLst>
               </a:tr>
@@ -5136,7 +5418,7 @@
                 </a:tc>
                 <a:extLst>
                   <a:ext uri="{0D108BD9-81ED-4DB2-BD59-A6C34878D82A}">
-                    <a16:rowId xmlns:a16="http://schemas.microsoft.com/office/drawing/2014/main" val="1545046261"/>
+                    <a16:rowId xmlns:a16="http://schemas.microsoft.com/office/drawing/2014/main" xmlns="" val="1545046261"/>
                   </a:ext>
                 </a:extLst>
               </a:tr>
@@ -5768,17 +6050,8 @@
               <a:rPr lang="nl-BE" sz="2800" dirty="0" smtClean="0">
                 <a:latin typeface="Sitka Display" pitchFamily="2" charset="0"/>
               </a:rPr>
-              <a:t>Uitleg over design patterns: Observer, Memento, </a:t>
-            </a:r>
-            <a:r>
-              <a:rPr lang="nl-BE" sz="2800" dirty="0" smtClean="0">
-                <a:latin typeface="Sitka Display" pitchFamily="2" charset="0"/>
-              </a:rPr>
-              <a:t>Stat + Strat ?</a:t>
-            </a:r>
-            <a:endParaRPr lang="nl-BE" sz="2800" dirty="0" smtClean="0">
-              <a:latin typeface="Sitka Display" pitchFamily="2" charset="0"/>
-            </a:endParaRPr>
+              <a:t>Uitleg over design patterns: Observer, Memento, Stat + Strat ?</a:t>
+            </a:r>
           </a:p>
           <a:p>
             <a:pPr marL="0" indent="0">
@@ -5918,7 +6191,7 @@
       </p:grpSpPr>
       <p:sp>
         <p:nvSpPr>
-          <p:cNvPr id="2" name="Titel 1"/>
+          <p:cNvPr id="4" name="Titel 3"/>
           <p:cNvSpPr>
             <a:spLocks noGrp="1"/>
           </p:cNvSpPr>
@@ -5934,7 +6207,7 @@
           <a:lstStyle/>
           <a:p>
             <a:r>
-              <a:rPr lang="nl-BE" sz="3600" cap="small" dirty="0" err="1" smtClean="0">
+              <a:rPr lang="nl-NL" sz="3600" cap="small" dirty="0">
                 <a:ln w="18415" cmpd="sng">
                   <a:solidFill>
                     <a:schemeClr val="tx1">
@@ -5952,10 +6225,10 @@
                 </a:effectLst>
                 <a:latin typeface="Sitka Text" pitchFamily="2" charset="0"/>
               </a:rPr>
-              <a:t>Usage</a:t>
-            </a:r>
-            <a:r>
-              <a:rPr lang="nl-BE" sz="3600" cap="small" dirty="0" smtClean="0">
+              <a:t>State </a:t>
+            </a:r>
+            <a:r>
+              <a:rPr lang="nl-NL" sz="3600" cap="small" dirty="0" err="1">
                 <a:ln w="18415" cmpd="sng">
                   <a:solidFill>
                     <a:schemeClr val="tx1">
@@ -5973,72 +6246,9 @@
                 </a:effectLst>
                 <a:latin typeface="Sitka Text" pitchFamily="2" charset="0"/>
               </a:rPr>
-              <a:t> of </a:t>
-            </a:r>
-            <a:r>
-              <a:rPr lang="nl-BE" sz="3600" cap="small" dirty="0" err="1" smtClean="0">
-                <a:ln w="18415" cmpd="sng">
-                  <a:solidFill>
-                    <a:schemeClr val="tx1">
-                      <a:alpha val="0"/>
-                    </a:schemeClr>
-                  </a:solidFill>
-                  <a:prstDash val="solid"/>
-                </a:ln>
-                <a:effectLst>
-                  <a:outerShdw blurRad="25400" dir="3600000" algn="tl" rotWithShape="0">
-                    <a:srgbClr val="000000">
-                      <a:alpha val="70000"/>
-                    </a:srgbClr>
-                  </a:outerShdw>
-                </a:effectLst>
-                <a:latin typeface="Sitka Text" pitchFamily="2" charset="0"/>
-              </a:rPr>
-              <a:t>the</a:t>
-            </a:r>
-            <a:r>
-              <a:rPr lang="nl-BE" sz="3600" cap="small" dirty="0" smtClean="0">
-                <a:ln w="18415" cmpd="sng">
-                  <a:solidFill>
-                    <a:schemeClr val="tx1">
-                      <a:alpha val="0"/>
-                    </a:schemeClr>
-                  </a:solidFill>
-                  <a:prstDash val="solid"/>
-                </a:ln>
-                <a:effectLst>
-                  <a:outerShdw blurRad="25400" dir="3600000" algn="tl" rotWithShape="0">
-                    <a:srgbClr val="000000">
-                      <a:alpha val="70000"/>
-                    </a:srgbClr>
-                  </a:outerShdw>
-                </a:effectLst>
-                <a:latin typeface="Sitka Text" pitchFamily="2" charset="0"/>
-              </a:rPr>
-              <a:t> domain </a:t>
-            </a:r>
-            <a:r>
-              <a:rPr lang="nl-BE" sz="3600" cap="small" dirty="0" err="1" smtClean="0">
-                <a:ln w="18415" cmpd="sng">
-                  <a:solidFill>
-                    <a:schemeClr val="tx1">
-                      <a:alpha val="0"/>
-                    </a:schemeClr>
-                  </a:solidFill>
-                  <a:prstDash val="solid"/>
-                </a:ln>
-                <a:effectLst>
-                  <a:outerShdw blurRad="25400" dir="3600000" algn="tl" rotWithShape="0">
-                    <a:srgbClr val="000000">
-                      <a:alpha val="70000"/>
-                    </a:srgbClr>
-                  </a:outerShdw>
-                </a:effectLst>
-                <a:latin typeface="Sitka Text" pitchFamily="2" charset="0"/>
-              </a:rPr>
-              <a:t>layer</a:t>
-            </a:r>
-            <a:endParaRPr lang="nl-BE" sz="3600" cap="small" dirty="0">
+              <a:t>Pattern</a:t>
+            </a:r>
+            <a:endParaRPr lang="nl-NL" sz="3600" cap="small" dirty="0">
               <a:ln w="18415" cmpd="sng">
                 <a:solidFill>
                   <a:schemeClr val="tx1">
@@ -6059,76 +6269,21 @@
           </a:p>
         </p:txBody>
       </p:sp>
-      <p:pic>
-        <p:nvPicPr>
-          <p:cNvPr id="3074" name="Picture 2" descr="C:\Users\Laurens\Documents\IntelliJ Projects\SWOP2016\presentatie\Diagram Images\Puntje 2\AssignmentServices.png"/>
-          <p:cNvPicPr>
-            <a:picLocks noChangeAspect="1" noChangeArrowheads="1"/>
-          </p:cNvPicPr>
+      <p:sp>
+        <p:nvSpPr>
+          <p:cNvPr id="6" name="Tekstvak 5"/>
+          <p:cNvSpPr txBox="1"/>
           <p:nvPr/>
-        </p:nvPicPr>
-        <p:blipFill>
-          <a:blip r:embed="rId2" cstate="print">
-            <a:clrChange>
-              <a:clrFrom>
-                <a:srgbClr val="FFFFFF"/>
-              </a:clrFrom>
-              <a:clrTo>
-                <a:srgbClr val="FFFFFF">
-                  <a:alpha val="0"/>
-                </a:srgbClr>
-              </a:clrTo>
-            </a:clrChange>
-            <a:extLst>
-              <a:ext uri="{28A0092B-C50C-407E-A947-70E740481C1C}">
-                <a14:useLocalDpi xmlns:a14="http://schemas.microsoft.com/office/drawing/2010/main" val="0"/>
-              </a:ext>
-            </a:extLst>
-          </a:blip>
-          <a:srcRect/>
-          <a:stretch>
-            <a:fillRect/>
-          </a:stretch>
-        </p:blipFill>
-        <p:spPr bwMode="auto">
+        </p:nvSpPr>
+        <p:spPr>
           <a:xfrm>
-            <a:off x="2682799" y="1225704"/>
-            <a:ext cx="6482161" cy="5615136"/>
+            <a:off x="3484364" y="2775347"/>
+            <a:ext cx="2175272" cy="461665"/>
           </a:xfrm>
           <a:prstGeom prst="rect">
             <a:avLst/>
           </a:prstGeom>
           <a:noFill/>
-          <a:extLst>
-            <a:ext uri="{909E8E84-426E-40DD-AFC4-6F175D3DCCD1}">
-              <a14:hiddenFill xmlns:a14="http://schemas.microsoft.com/office/drawing/2010/main">
-                <a:solidFill>
-                  <a:srgbClr val="FFFFFF"/>
-                </a:solidFill>
-              </a14:hiddenFill>
-            </a:ext>
-          </a:extLst>
-        </p:spPr>
-      </p:pic>
-      <p:sp>
-        <p:nvSpPr>
-          <p:cNvPr id="5" name="Tekstvak 2"/>
-          <p:cNvSpPr txBox="1"/>
-          <p:nvPr/>
-        </p:nvSpPr>
-        <p:spPr>
-          <a:xfrm>
-            <a:off x="251520" y="3745999"/>
-            <a:ext cx="3312368" cy="941189"/>
-          </a:xfrm>
-          <a:prstGeom prst="roundRect">
-            <a:avLst>
-              <a:gd name="adj" fmla="val 4768"/>
-            </a:avLst>
-          </a:prstGeom>
-          <a:noFill/>
-          <a:ln w="6350"/>
-          <a:effectLst/>
         </p:spPr>
         <p:style>
           <a:lnRef idx="2">
@@ -6150,115 +6305,56 @@
           </a:bodyPr>
           <a:lstStyle/>
           <a:p>
-            <a:pPr>
-              <a:buFont typeface="Arial" pitchFamily="34" charset="0"/>
-              <a:buChar char="•"/>
-            </a:pPr>
-            <a:r>
-              <a:rPr lang="nl-BE" dirty="0" smtClean="0"/>
-              <a:t> </a:t>
-            </a:r>
-            <a:r>
-              <a:rPr lang="nl-BE" dirty="0" smtClean="0">
-                <a:latin typeface="Sitka Display" pitchFamily="2" charset="0"/>
-                <a:sym typeface="Wingdings" panose="05000000000000000000" pitchFamily="2" charset="2"/>
-              </a:rPr>
-              <a:t>Deze slide gebruiken als </a:t>
-            </a:r>
-            <a:r>
-              <a:rPr lang="nl-BE" dirty="0" err="1" smtClean="0">
-                <a:latin typeface="Sitka Display" pitchFamily="2" charset="0"/>
-                <a:sym typeface="Wingdings" panose="05000000000000000000" pitchFamily="2" charset="2"/>
-              </a:rPr>
-              <a:t>recap</a:t>
-            </a:r>
-            <a:r>
-              <a:rPr lang="nl-BE" dirty="0" smtClean="0">
-                <a:latin typeface="Sitka Display" pitchFamily="2" charset="0"/>
-                <a:sym typeface="Wingdings" panose="05000000000000000000" pitchFamily="2" charset="2"/>
-              </a:rPr>
-              <a:t> voor tag implementatie</a:t>
-            </a:r>
-          </a:p>
-          <a:p>
-            <a:pPr>
-              <a:buFont typeface="Arial" pitchFamily="34" charset="0"/>
-              <a:buChar char="•"/>
-            </a:pPr>
-            <a:r>
-              <a:rPr lang="nl-BE" b="1" dirty="0" smtClean="0">
-                <a:latin typeface="Sitka Display" pitchFamily="2" charset="0"/>
-                <a:sym typeface="Wingdings" panose="05000000000000000000" pitchFamily="2" charset="2"/>
-              </a:rPr>
-              <a:t>Hierna: uitleg over state </a:t>
-            </a:r>
-            <a:r>
-              <a:rPr lang="nl-BE" b="1" dirty="0" err="1" smtClean="0">
-                <a:latin typeface="Sitka Display" pitchFamily="2" charset="0"/>
-                <a:sym typeface="Wingdings" panose="05000000000000000000" pitchFamily="2" charset="2"/>
-              </a:rPr>
-              <a:t>pattern</a:t>
-            </a:r>
-            <a:r>
-              <a:rPr lang="nl-BE" b="1" dirty="0" smtClean="0">
-                <a:latin typeface="Sitka Display" pitchFamily="2" charset="0"/>
-                <a:sym typeface="Wingdings" panose="05000000000000000000" pitchFamily="2" charset="2"/>
-              </a:rPr>
-              <a:t> voor tag</a:t>
-            </a:r>
-          </a:p>
-        </p:txBody>
-      </p:sp>
-      <p:sp>
-        <p:nvSpPr>
-          <p:cNvPr id="3" name="Rechthoek 2"/>
-          <p:cNvSpPr/>
+            <a:pPr algn="ctr"/>
+            <a:r>
+              <a:rPr lang="nl-NL" sz="2400" b="1" dirty="0"/>
+              <a:t>Tags zijn STATES</a:t>
+            </a:r>
+          </a:p>
+        </p:txBody>
+      </p:sp>
+      <p:sp>
+        <p:nvSpPr>
+          <p:cNvPr id="7" name="Tekstvak 6"/>
+          <p:cNvSpPr txBox="1"/>
           <p:nvPr/>
         </p:nvSpPr>
         <p:spPr>
           <a:xfrm>
-            <a:off x="2483768" y="2852936"/>
-            <a:ext cx="1368152" cy="792088"/>
+            <a:off x="2487810" y="4050507"/>
+            <a:ext cx="4168378" cy="646331"/>
           </a:xfrm>
           <a:prstGeom prst="rect">
             <a:avLst/>
           </a:prstGeom>
           <a:noFill/>
-          <a:ln w="76200">
-            <a:solidFill>
-              <a:srgbClr val="FF0000"/>
-            </a:solidFill>
-          </a:ln>
         </p:spPr>
-        <p:style>
-          <a:lnRef idx="2">
-            <a:schemeClr val="accent2">
-              <a:shade val="50000"/>
-            </a:schemeClr>
-          </a:lnRef>
-          <a:fillRef idx="1">
-            <a:schemeClr val="accent2"/>
-          </a:fillRef>
-          <a:effectRef idx="0">
-            <a:schemeClr val="accent2"/>
-          </a:effectRef>
-          <a:fontRef idx="minor">
-            <a:schemeClr val="lt1"/>
-          </a:fontRef>
-        </p:style>
-        <p:txBody>
-          <a:bodyPr rtlCol="0" anchor="ctr"/>
+        <p:txBody>
+          <a:bodyPr wrap="square" rtlCol="0">
+            <a:spAutoFit/>
+          </a:bodyPr>
           <a:lstStyle/>
           <a:p>
             <a:pPr algn="ctr"/>
-            <a:endParaRPr lang="nl-BE"/>
+            <a:r>
+              <a:rPr lang="nl-NL" dirty="0"/>
+              <a:t>Het gedrag van </a:t>
+            </a:r>
+            <a:r>
+              <a:rPr lang="nl-NL" dirty="0" err="1"/>
+              <a:t>Bugreport</a:t>
+            </a:r>
+            <a:r>
+              <a:rPr lang="nl-NL" dirty="0"/>
+              <a:t> is afhankelijk van de tag die toegekend is.</a:t>
+            </a:r>
           </a:p>
         </p:txBody>
       </p:sp>
     </p:spTree>
     <p:extLst>
       <p:ext uri="{BB962C8B-B14F-4D97-AF65-F5344CB8AC3E}">
-        <p14:creationId xmlns:p14="http://schemas.microsoft.com/office/powerpoint/2010/main" val="4089071672"/>
+        <p14:creationId xmlns:p14="http://schemas.microsoft.com/office/powerpoint/2010/main" val="467284758"/>
       </p:ext>
     </p:extLst>
   </p:cSld>
@@ -6268,13 +6364,6 @@
   <p:transition>
     <p:fade/>
   </p:transition>
-  <p:timing>
-    <p:tnLst>
-      <p:par>
-        <p:cTn id="1" dur="indefinite" restart="never" nodeType="tmRoot"/>
-      </p:par>
-    </p:tnLst>
-  </p:timing>
 </p:sld>
 </file>
 
@@ -6307,48 +6396,143 @@
         </p:nvSpPr>
         <p:spPr/>
         <p:txBody>
-          <a:bodyPr/>
+          <a:bodyPr>
+            <a:normAutofit/>
+          </a:bodyPr>
           <a:lstStyle/>
           <a:p>
             <a:r>
-              <a:rPr lang="nl-BE" dirty="0" err="1" smtClean="0"/>
-              <a:t>Insert</a:t>
-            </a:r>
-            <a:r>
-              <a:rPr lang="nl-BE" dirty="0" smtClean="0"/>
-              <a:t> uitleg over state </a:t>
-            </a:r>
-            <a:r>
-              <a:rPr lang="nl-BE" dirty="0" err="1" smtClean="0"/>
-              <a:t>here</a:t>
-            </a:r>
-            <a:endParaRPr lang="nl-BE" dirty="0"/>
-          </a:p>
-        </p:txBody>
-      </p:sp>
-      <p:sp>
-        <p:nvSpPr>
-          <p:cNvPr id="3" name="Tijdelijke aanduiding voor inhoud 2"/>
-          <p:cNvSpPr>
-            <a:spLocks noGrp="1"/>
-          </p:cNvSpPr>
-          <p:nvPr>
-            <p:ph idx="1"/>
-          </p:nvPr>
-        </p:nvSpPr>
-        <p:spPr/>
-        <p:txBody>
-          <a:bodyPr/>
+              <a:rPr lang="nl-BE" sz="3600" cap="small" dirty="0" smtClean="0">
+                <a:ln w="18415" cmpd="sng">
+                  <a:solidFill>
+                    <a:schemeClr val="tx1">
+                      <a:alpha val="0"/>
+                    </a:schemeClr>
+                  </a:solidFill>
+                  <a:prstDash val="solid"/>
+                </a:ln>
+                <a:effectLst>
+                  <a:outerShdw blurRad="25400" dir="3600000" algn="tl" rotWithShape="0">
+                    <a:srgbClr val="000000">
+                      <a:alpha val="70000"/>
+                    </a:srgbClr>
+                  </a:outerShdw>
+                </a:effectLst>
+                <a:latin typeface="Sitka Text" pitchFamily="2" charset="0"/>
+              </a:rPr>
+              <a:t>Usage of the domain layer</a:t>
+            </a:r>
+            <a:endParaRPr lang="nl-BE" sz="3600" cap="small" dirty="0">
+              <a:ln w="18415" cmpd="sng">
+                <a:solidFill>
+                  <a:schemeClr val="tx1">
+                    <a:alpha val="0"/>
+                  </a:schemeClr>
+                </a:solidFill>
+                <a:prstDash val="solid"/>
+              </a:ln>
+              <a:effectLst>
+                <a:outerShdw blurRad="25400" dir="3600000" algn="tl" rotWithShape="0">
+                  <a:srgbClr val="000000">
+                    <a:alpha val="70000"/>
+                  </a:srgbClr>
+                </a:outerShdw>
+              </a:effectLst>
+              <a:latin typeface="Sitka Text" pitchFamily="2" charset="0"/>
+            </a:endParaRPr>
+          </a:p>
+        </p:txBody>
+      </p:sp>
+      <p:pic>
+        <p:nvPicPr>
+          <p:cNvPr id="6" name="Afbeelding 5"/>
+          <p:cNvPicPr>
+            <a:picLocks noChangeAspect="1"/>
+          </p:cNvPicPr>
+          <p:nvPr/>
+        </p:nvPicPr>
+        <p:blipFill>
+          <a:blip r:embed="rId2">
+            <a:clrChange>
+              <a:clrFrom>
+                <a:srgbClr val="FFFFFF"/>
+              </a:clrFrom>
+              <a:clrTo>
+                <a:srgbClr val="FFFFFF">
+                  <a:alpha val="0"/>
+                </a:srgbClr>
+              </a:clrTo>
+            </a:clrChange>
+            <a:extLst>
+              <a:ext uri="{28A0092B-C50C-407E-A947-70E740481C1C}">
+                <a14:useLocalDpi xmlns:a14="http://schemas.microsoft.com/office/drawing/2010/main" val="0"/>
+              </a:ext>
+            </a:extLst>
+          </a:blip>
+          <a:stretch>
+            <a:fillRect/>
+          </a:stretch>
+        </p:blipFill>
+        <p:spPr>
+          <a:xfrm>
+            <a:off x="1489119" y="1170722"/>
+            <a:ext cx="6165761" cy="5687278"/>
+          </a:xfrm>
+          <a:prstGeom prst="rect">
+            <a:avLst/>
+          </a:prstGeom>
+        </p:spPr>
+      </p:pic>
+      <p:sp>
+        <p:nvSpPr>
+          <p:cNvPr id="7" name="Rechthoek 6"/>
+          <p:cNvSpPr/>
+          <p:nvPr/>
+        </p:nvSpPr>
+        <p:spPr>
+          <a:xfrm>
+            <a:off x="2339752" y="3284984"/>
+            <a:ext cx="1656184" cy="576064"/>
+          </a:xfrm>
+          <a:prstGeom prst="rect">
+            <a:avLst/>
+          </a:prstGeom>
+          <a:noFill/>
+          <a:ln>
+            <a:solidFill>
+              <a:srgbClr val="FF0000"/>
+            </a:solidFill>
+          </a:ln>
+        </p:spPr>
+        <p:style>
+          <a:lnRef idx="2">
+            <a:schemeClr val="accent1">
+              <a:shade val="50000"/>
+            </a:schemeClr>
+          </a:lnRef>
+          <a:fillRef idx="1">
+            <a:schemeClr val="accent1"/>
+          </a:fillRef>
+          <a:effectRef idx="0">
+            <a:schemeClr val="accent1"/>
+          </a:effectRef>
+          <a:fontRef idx="minor">
+            <a:schemeClr val="lt1"/>
+          </a:fontRef>
+        </p:style>
+        <p:txBody>
+          <a:bodyPr rtlCol="0" anchor="ctr"/>
           <a:lstStyle/>
           <a:p>
-            <a:endParaRPr lang="nl-BE"/>
+            <a:pPr algn="ctr"/>
+            <a:endParaRPr lang="nl-NL"/>
           </a:p>
         </p:txBody>
       </p:sp>
     </p:spTree>
     <p:extLst>
       <p:ext uri="{BB962C8B-B14F-4D97-AF65-F5344CB8AC3E}">
-        <p14:creationId xmlns:p14="http://schemas.microsoft.com/office/powerpoint/2010/main" val="2544111520"/>
+        <p14:creationId xmlns:p14="http://schemas.microsoft.com/office/powerpoint/2010/main" val="307230627"/>
       </p:ext>
     </p:extLst>
   </p:cSld>
@@ -6358,6 +6542,13 @@
   <p:transition>
     <p:fade/>
   </p:transition>
+  <p:timing>
+    <p:tnLst>
+      <p:par>
+        <p:cTn id="1" dur="indefinite" restart="never" nodeType="tmRoot"/>
+      </p:par>
+    </p:tnLst>
+  </p:timing>
 </p:sld>
 </file>
 
@@ -6390,50 +6581,177 @@
         </p:nvSpPr>
         <p:spPr/>
         <p:txBody>
-          <a:bodyPr>
-            <a:normAutofit fontScale="90000"/>
+          <a:bodyPr/>
+          <a:lstStyle/>
+          <a:p>
+            <a:r>
+              <a:rPr lang="nl-BE" sz="3600" cap="small" dirty="0">
+                <a:ln w="18415" cmpd="sng">
+                  <a:solidFill>
+                    <a:schemeClr val="tx1">
+                      <a:alpha val="0"/>
+                    </a:schemeClr>
+                  </a:solidFill>
+                  <a:prstDash val="solid"/>
+                </a:ln>
+                <a:effectLst>
+                  <a:outerShdw blurRad="25400" dir="3600000" algn="tl" rotWithShape="0">
+                    <a:srgbClr val="000000">
+                      <a:alpha val="70000"/>
+                    </a:srgbClr>
+                  </a:outerShdw>
+                </a:effectLst>
+                <a:latin typeface="Sitka Text" pitchFamily="2" charset="0"/>
+              </a:rPr>
+              <a:t>State</a:t>
+            </a:r>
+            <a:r>
+              <a:rPr lang="nl-BE" dirty="0" smtClean="0"/>
+              <a:t> </a:t>
+            </a:r>
+            <a:r>
+              <a:rPr lang="nl-BE" sz="3600" cap="small" dirty="0">
+                <a:ln w="18415" cmpd="sng">
+                  <a:solidFill>
+                    <a:schemeClr val="tx1">
+                      <a:alpha val="0"/>
+                    </a:schemeClr>
+                  </a:solidFill>
+                  <a:prstDash val="solid"/>
+                </a:ln>
+                <a:effectLst>
+                  <a:outerShdw blurRad="25400" dir="3600000" algn="tl" rotWithShape="0">
+                    <a:srgbClr val="000000">
+                      <a:alpha val="70000"/>
+                    </a:srgbClr>
+                  </a:outerShdw>
+                </a:effectLst>
+                <a:latin typeface="Sitka Text" pitchFamily="2" charset="0"/>
+              </a:rPr>
+              <a:t>pattern: Abstract</a:t>
+            </a:r>
+          </a:p>
+        </p:txBody>
+      </p:sp>
+      <p:pic>
+        <p:nvPicPr>
+          <p:cNvPr id="4" name="Tijdelijke aanduiding voor inhoud 3"/>
+          <p:cNvPicPr>
+            <a:picLocks noGrp="1" noChangeAspect="1"/>
+          </p:cNvPicPr>
+          <p:nvPr>
+            <p:ph idx="1"/>
+          </p:nvPr>
+        </p:nvPicPr>
+        <p:blipFill>
+          <a:blip r:embed="rId2">
+            <a:clrChange>
+              <a:clrFrom>
+                <a:srgbClr val="FFFFFF"/>
+              </a:clrFrom>
+              <a:clrTo>
+                <a:srgbClr val="FFFFFF">
+                  <a:alpha val="0"/>
+                </a:srgbClr>
+              </a:clrTo>
+            </a:clrChange>
+            <a:extLst>
+              <a:ext uri="{28A0092B-C50C-407E-A947-70E740481C1C}">
+                <a14:useLocalDpi xmlns:a14="http://schemas.microsoft.com/office/drawing/2010/main" val="0"/>
+              </a:ext>
+            </a:extLst>
+          </a:blip>
+          <a:stretch>
+            <a:fillRect/>
+          </a:stretch>
+        </p:blipFill>
+        <p:spPr>
+          <a:xfrm>
+            <a:off x="99368" y="3842113"/>
+            <a:ext cx="8937128" cy="1819135"/>
+          </a:xfrm>
+        </p:spPr>
+      </p:pic>
+      <p:sp>
+        <p:nvSpPr>
+          <p:cNvPr id="5" name="Tekstvak 4"/>
+          <p:cNvSpPr txBox="1"/>
+          <p:nvPr/>
+        </p:nvSpPr>
+        <p:spPr>
+          <a:xfrm>
+            <a:off x="2339752" y="2420888"/>
+            <a:ext cx="4237891" cy="369332"/>
+          </a:xfrm>
+          <a:prstGeom prst="rect">
+            <a:avLst/>
+          </a:prstGeom>
+          <a:noFill/>
+        </p:spPr>
+        <p:style>
+          <a:lnRef idx="2">
+            <a:schemeClr val="dk1"/>
+          </a:lnRef>
+          <a:fillRef idx="1">
+            <a:schemeClr val="lt1"/>
+          </a:fillRef>
+          <a:effectRef idx="0">
+            <a:schemeClr val="dk1"/>
+          </a:effectRef>
+          <a:fontRef idx="minor">
+            <a:schemeClr val="dk1"/>
+          </a:fontRef>
+        </p:style>
+        <p:txBody>
+          <a:bodyPr wrap="none" rtlCol="0">
+            <a:spAutoFit/>
           </a:bodyPr>
           <a:lstStyle/>
           <a:p>
             <a:r>
-              <a:rPr lang="nl-BE" dirty="0" err="1" smtClean="0"/>
-              <a:t>Insert</a:t>
-            </a:r>
-            <a:r>
-              <a:rPr lang="nl-BE" dirty="0" smtClean="0"/>
-              <a:t> heel korte uitleg over </a:t>
-            </a:r>
-            <a:r>
-              <a:rPr lang="nl-BE" dirty="0" err="1" smtClean="0"/>
-              <a:t>milestones</a:t>
-            </a:r>
-            <a:endParaRPr lang="nl-BE" dirty="0"/>
-          </a:p>
-        </p:txBody>
-      </p:sp>
-      <p:sp>
-        <p:nvSpPr>
-          <p:cNvPr id="3" name="Tijdelijke aanduiding voor inhoud 2"/>
-          <p:cNvSpPr>
-            <a:spLocks noGrp="1"/>
-          </p:cNvSpPr>
-          <p:nvPr>
-            <p:ph idx="1"/>
-          </p:nvPr>
-        </p:nvSpPr>
-        <p:spPr/>
-        <p:txBody>
-          <a:bodyPr/>
-          <a:lstStyle/>
-          <a:p>
-            <a:endParaRPr lang="nl-BE"/>
+              <a:rPr lang="nl-NL" dirty="0" err="1" smtClean="0"/>
+              <a:t>BugReport</a:t>
+            </a:r>
+            <a:r>
+              <a:rPr lang="nl-NL" dirty="0" smtClean="0"/>
+              <a:t> calls Tag </a:t>
+            </a:r>
+            <a:r>
+              <a:rPr lang="nl-NL" dirty="0" err="1" smtClean="0"/>
+              <a:t>to</a:t>
+            </a:r>
+            <a:r>
+              <a:rPr lang="nl-NL" dirty="0" smtClean="0"/>
+              <a:t> </a:t>
+            </a:r>
+            <a:r>
+              <a:rPr lang="nl-NL" dirty="0" err="1" smtClean="0"/>
+              <a:t>execute</a:t>
+            </a:r>
+            <a:r>
+              <a:rPr lang="nl-NL" dirty="0" smtClean="0"/>
+              <a:t> </a:t>
+            </a:r>
+            <a:r>
+              <a:rPr lang="nl-NL" dirty="0" err="1" smtClean="0"/>
+              <a:t>the</a:t>
+            </a:r>
+            <a:r>
+              <a:rPr lang="nl-NL" dirty="0" smtClean="0"/>
+              <a:t> </a:t>
+            </a:r>
+            <a:r>
+              <a:rPr lang="nl-NL" dirty="0" err="1" smtClean="0"/>
+              <a:t>function</a:t>
+            </a:r>
+            <a:endParaRPr lang="nl-NL" dirty="0"/>
           </a:p>
         </p:txBody>
       </p:sp>
     </p:spTree>
     <p:extLst>
       <p:ext uri="{BB962C8B-B14F-4D97-AF65-F5344CB8AC3E}">
-        <p14:creationId xmlns:p14="http://schemas.microsoft.com/office/powerpoint/2010/main" val="378156031"/>
+        <p14:creationId xmlns:p14="http://schemas.microsoft.com/office/powerpoint/2010/main" val="1074460601"/>
       </p:ext>
     </p:extLst>
   </p:cSld>
@@ -6475,20 +6793,319 @@
         </p:nvSpPr>
         <p:spPr/>
         <p:txBody>
-          <a:bodyPr/>
+          <a:bodyPr>
+            <a:normAutofit/>
+          </a:bodyPr>
           <a:lstStyle/>
           <a:p>
             <a:r>
-              <a:rPr lang="nl-BE" dirty="0" smtClean="0"/>
-              <a:t>Mailbox system</a:t>
-            </a:r>
-            <a:endParaRPr lang="nl-BE" dirty="0"/>
+              <a:rPr lang="nl-BE" sz="3600" cap="small" dirty="0">
+                <a:ln w="18415" cmpd="sng">
+                  <a:solidFill>
+                    <a:schemeClr val="tx1">
+                      <a:alpha val="0"/>
+                    </a:schemeClr>
+                  </a:solidFill>
+                  <a:prstDash val="solid"/>
+                </a:ln>
+                <a:effectLst>
+                  <a:outerShdw blurRad="25400" dir="3600000" algn="tl" rotWithShape="0">
+                    <a:srgbClr val="000000">
+                      <a:alpha val="70000"/>
+                    </a:srgbClr>
+                  </a:outerShdw>
+                </a:effectLst>
+                <a:latin typeface="Sitka Text" pitchFamily="2" charset="0"/>
+              </a:rPr>
+              <a:t>State pattern: Concrete Example</a:t>
+            </a:r>
+          </a:p>
+        </p:txBody>
+      </p:sp>
+      <p:sp>
+        <p:nvSpPr>
+          <p:cNvPr id="5" name="Tekstvak 4"/>
+          <p:cNvSpPr txBox="1"/>
+          <p:nvPr/>
+        </p:nvSpPr>
+        <p:spPr>
+          <a:xfrm>
+            <a:off x="786408" y="1556792"/>
+            <a:ext cx="3456383" cy="923330"/>
+          </a:xfrm>
+          <a:prstGeom prst="rect">
+            <a:avLst/>
+          </a:prstGeom>
+          <a:noFill/>
+          <a:ln>
+            <a:noFill/>
+          </a:ln>
+        </p:spPr>
+        <p:style>
+          <a:lnRef idx="2">
+            <a:schemeClr val="dk1"/>
+          </a:lnRef>
+          <a:fillRef idx="1">
+            <a:schemeClr val="lt1"/>
+          </a:fillRef>
+          <a:effectRef idx="0">
+            <a:schemeClr val="dk1"/>
+          </a:effectRef>
+          <a:fontRef idx="minor">
+            <a:schemeClr val="dk1"/>
+          </a:fontRef>
+        </p:style>
+        <p:txBody>
+          <a:bodyPr wrap="square" rtlCol="0">
+            <a:spAutoFit/>
+          </a:bodyPr>
+          <a:lstStyle/>
+          <a:p>
+            <a:r>
+              <a:rPr lang="is-IS" i="1" dirty="0" smtClean="0">
+                <a:solidFill>
+                  <a:schemeClr val="tx1">
+                    <a:lumMod val="50000"/>
+                    <a:lumOff val="50000"/>
+                  </a:schemeClr>
+                </a:solidFill>
+              </a:rPr>
+              <a:t>“…</a:t>
+            </a:r>
+            <a:r>
+              <a:rPr lang="nl-NL" i="1" dirty="0" err="1" smtClean="0">
+                <a:solidFill>
+                  <a:schemeClr val="tx1">
+                    <a:lumMod val="50000"/>
+                    <a:lumOff val="50000"/>
+                  </a:schemeClr>
+                </a:solidFill>
+              </a:rPr>
+              <a:t>after</a:t>
+            </a:r>
+            <a:r>
+              <a:rPr lang="nl-NL" i="1" dirty="0" smtClean="0">
+                <a:solidFill>
+                  <a:schemeClr val="tx1">
+                    <a:lumMod val="50000"/>
+                    <a:lumOff val="50000"/>
+                  </a:schemeClr>
+                </a:solidFill>
+              </a:rPr>
+              <a:t> </a:t>
+            </a:r>
+            <a:r>
+              <a:rPr lang="nl-NL" i="1" dirty="0" err="1">
+                <a:solidFill>
+                  <a:schemeClr val="tx1">
+                    <a:lumMod val="50000"/>
+                    <a:lumOff val="50000"/>
+                  </a:schemeClr>
+                </a:solidFill>
+              </a:rPr>
+              <a:t>the</a:t>
+            </a:r>
+            <a:r>
+              <a:rPr lang="nl-NL" i="1" dirty="0">
+                <a:solidFill>
+                  <a:schemeClr val="tx1">
+                    <a:lumMod val="50000"/>
+                    <a:lumOff val="50000"/>
+                  </a:schemeClr>
+                </a:solidFill>
+              </a:rPr>
+              <a:t> first patch, </a:t>
+            </a:r>
+            <a:r>
+              <a:rPr lang="nl-NL" i="1" dirty="0" err="1">
+                <a:solidFill>
+                  <a:schemeClr val="tx1">
+                    <a:lumMod val="50000"/>
+                    <a:lumOff val="50000"/>
+                  </a:schemeClr>
+                </a:solidFill>
+              </a:rPr>
+              <a:t>the</a:t>
+            </a:r>
+            <a:r>
+              <a:rPr lang="nl-NL" i="1" dirty="0">
+                <a:solidFill>
+                  <a:schemeClr val="tx1">
+                    <a:lumMod val="50000"/>
+                    <a:lumOff val="50000"/>
+                  </a:schemeClr>
+                </a:solidFill>
+              </a:rPr>
+              <a:t> tag of </a:t>
+            </a:r>
+            <a:r>
+              <a:rPr lang="nl-NL" i="1" dirty="0" err="1">
+                <a:solidFill>
+                  <a:schemeClr val="tx1">
+                    <a:lumMod val="50000"/>
+                    <a:lumOff val="50000"/>
+                  </a:schemeClr>
+                </a:solidFill>
+              </a:rPr>
+              <a:t>the</a:t>
+            </a:r>
+            <a:r>
+              <a:rPr lang="nl-NL" i="1" dirty="0">
+                <a:solidFill>
+                  <a:schemeClr val="tx1">
+                    <a:lumMod val="50000"/>
+                    <a:lumOff val="50000"/>
+                  </a:schemeClr>
+                </a:solidFill>
+              </a:rPr>
+              <a:t> bug report at </a:t>
+            </a:r>
+            <a:r>
+              <a:rPr lang="nl-NL" i="1" dirty="0" err="1">
+                <a:solidFill>
+                  <a:schemeClr val="tx1">
+                    <a:lumMod val="50000"/>
+                    <a:lumOff val="50000"/>
+                  </a:schemeClr>
+                </a:solidFill>
+              </a:rPr>
+              <a:t>stake</a:t>
+            </a:r>
+            <a:r>
+              <a:rPr lang="nl-NL" i="1" dirty="0">
+                <a:solidFill>
+                  <a:schemeClr val="tx1">
+                    <a:lumMod val="50000"/>
+                    <a:lumOff val="50000"/>
+                  </a:schemeClr>
+                </a:solidFill>
+              </a:rPr>
+              <a:t> </a:t>
+            </a:r>
+            <a:r>
+              <a:rPr lang="nl-NL" i="1" dirty="0" err="1">
+                <a:solidFill>
+                  <a:schemeClr val="tx1">
+                    <a:lumMod val="50000"/>
+                    <a:lumOff val="50000"/>
+                  </a:schemeClr>
+                </a:solidFill>
+              </a:rPr>
+              <a:t>transitions</a:t>
+            </a:r>
+            <a:r>
+              <a:rPr lang="nl-NL" i="1" dirty="0">
+                <a:solidFill>
+                  <a:schemeClr val="tx1">
+                    <a:lumMod val="50000"/>
+                    <a:lumOff val="50000"/>
+                  </a:schemeClr>
+                </a:solidFill>
+              </a:rPr>
+              <a:t> </a:t>
+            </a:r>
+            <a:r>
+              <a:rPr lang="nl-NL" i="1" dirty="0" err="1">
+                <a:solidFill>
+                  <a:schemeClr val="tx1">
+                    <a:lumMod val="50000"/>
+                    <a:lumOff val="50000"/>
+                  </a:schemeClr>
+                </a:solidFill>
+              </a:rPr>
+              <a:t>from</a:t>
+            </a:r>
+            <a:r>
+              <a:rPr lang="nl-NL" i="1" dirty="0">
+                <a:solidFill>
+                  <a:schemeClr val="tx1">
+                    <a:lumMod val="50000"/>
+                    <a:lumOff val="50000"/>
+                  </a:schemeClr>
+                </a:solidFill>
+              </a:rPr>
+              <a:t> </a:t>
+            </a:r>
+            <a:r>
+              <a:rPr lang="nl-NL" i="1" dirty="0" err="1">
+                <a:solidFill>
+                  <a:schemeClr val="tx1">
+                    <a:lumMod val="50000"/>
+                    <a:lumOff val="50000"/>
+                  </a:schemeClr>
+                </a:solidFill>
+              </a:rPr>
+              <a:t>Assigned</a:t>
+            </a:r>
+            <a:r>
+              <a:rPr lang="nl-NL" i="1" dirty="0">
+                <a:solidFill>
+                  <a:schemeClr val="tx1">
+                    <a:lumMod val="50000"/>
+                    <a:lumOff val="50000"/>
+                  </a:schemeClr>
+                </a:solidFill>
+              </a:rPr>
+              <a:t> </a:t>
+            </a:r>
+            <a:r>
+              <a:rPr lang="nl-NL" i="1" dirty="0" err="1">
+                <a:solidFill>
+                  <a:schemeClr val="tx1">
+                    <a:lumMod val="50000"/>
+                    <a:lumOff val="50000"/>
+                  </a:schemeClr>
+                </a:solidFill>
+              </a:rPr>
+              <a:t>to</a:t>
+            </a:r>
+            <a:r>
+              <a:rPr lang="nl-NL" i="1" dirty="0">
+                <a:solidFill>
+                  <a:schemeClr val="tx1">
+                    <a:lumMod val="50000"/>
+                    <a:lumOff val="50000"/>
+                  </a:schemeClr>
+                </a:solidFill>
+              </a:rPr>
+              <a:t> </a:t>
+            </a:r>
+            <a:r>
+              <a:rPr lang="nl-NL" i="1" dirty="0" err="1" smtClean="0">
+                <a:solidFill>
+                  <a:schemeClr val="tx1">
+                    <a:lumMod val="50000"/>
+                    <a:lumOff val="50000"/>
+                  </a:schemeClr>
+                </a:solidFill>
+              </a:rPr>
+              <a:t>UnderReview</a:t>
+            </a:r>
+            <a:r>
+              <a:rPr lang="nl-NL" i="1" dirty="0" smtClean="0">
+                <a:solidFill>
+                  <a:schemeClr val="tx1">
+                    <a:lumMod val="50000"/>
+                    <a:lumOff val="50000"/>
+                  </a:schemeClr>
+                </a:solidFill>
+              </a:rPr>
+              <a:t>.”</a:t>
+            </a:r>
+            <a:endParaRPr lang="nl-NL" i="1" dirty="0">
+              <a:solidFill>
+                <a:schemeClr val="tx1">
+                  <a:lumMod val="50000"/>
+                  <a:lumOff val="50000"/>
+                </a:schemeClr>
+              </a:solidFill>
+            </a:endParaRPr>
           </a:p>
         </p:txBody>
       </p:sp>
       <p:pic>
         <p:nvPicPr>
-          <p:cNvPr id="6" name="Content Placeholder 5"/>
+          <p:cNvPr id="6" name="Tijdelijke aanduiding voor inhoud 5"/>
           <p:cNvPicPr>
             <a:picLocks noGrp="1" noChangeAspect="1"/>
           </p:cNvPicPr>
@@ -6498,6 +7115,16 @@
         </p:nvPicPr>
         <p:blipFill>
           <a:blip r:embed="rId2">
+            <a:clrChange>
+              <a:clrFrom>
+                <a:srgbClr val="FFFFFF"/>
+              </a:clrFrom>
+              <a:clrTo>
+                <a:srgbClr val="FFFFFF">
+                  <a:alpha val="0"/>
+                </a:srgbClr>
+              </a:clrTo>
+            </a:clrChange>
             <a:extLst>
               <a:ext uri="{28A0092B-C50C-407E-A947-70E740481C1C}">
                 <a14:useLocalDpi xmlns:a14="http://schemas.microsoft.com/office/drawing/2010/main" val="0"/>
@@ -6510,15 +7137,505 @@
         </p:blipFill>
         <p:spPr>
           <a:xfrm>
-            <a:off x="1043608" y="1268760"/>
-            <a:ext cx="6840760" cy="5555696"/>
+            <a:off x="457200" y="3140968"/>
+            <a:ext cx="8229600" cy="3117855"/>
           </a:xfrm>
         </p:spPr>
       </p:pic>
+      <p:sp>
+        <p:nvSpPr>
+          <p:cNvPr id="7" name="Tekstvak 6"/>
+          <p:cNvSpPr txBox="1"/>
+          <p:nvPr/>
+        </p:nvSpPr>
+        <p:spPr>
+          <a:xfrm>
+            <a:off x="457200" y="3140968"/>
+            <a:ext cx="658416" cy="360000"/>
+          </a:xfrm>
+          <a:prstGeom prst="rect">
+            <a:avLst/>
+          </a:prstGeom>
+          <a:solidFill>
+            <a:schemeClr val="tx2">
+              <a:lumMod val="60000"/>
+              <a:lumOff val="40000"/>
+            </a:schemeClr>
+          </a:solidFill>
+          <a:ln>
+            <a:noFill/>
+          </a:ln>
+        </p:spPr>
+        <p:txBody>
+          <a:bodyPr wrap="square" rtlCol="0">
+            <a:spAutoFit/>
+          </a:bodyPr>
+          <a:lstStyle/>
+          <a:p>
+            <a:pPr algn="ctr"/>
+            <a:r>
+              <a:rPr lang="nl-NL" sz="900" dirty="0" smtClean="0"/>
+              <a:t>:User</a:t>
+            </a:r>
+            <a:endParaRPr lang="nl-NL" sz="900" dirty="0"/>
+          </a:p>
+        </p:txBody>
+      </p:sp>
+      <p:sp>
+        <p:nvSpPr>
+          <p:cNvPr id="8" name="Tekstvak 7"/>
+          <p:cNvSpPr txBox="1"/>
+          <p:nvPr/>
+        </p:nvSpPr>
+        <p:spPr>
+          <a:xfrm>
+            <a:off x="4860032" y="1339820"/>
+            <a:ext cx="3384377" cy="1477328"/>
+          </a:xfrm>
+          <a:prstGeom prst="rect">
+            <a:avLst/>
+          </a:prstGeom>
+          <a:noFill/>
+        </p:spPr>
+        <p:txBody>
+          <a:bodyPr wrap="square" rtlCol="0">
+            <a:spAutoFit/>
+          </a:bodyPr>
+          <a:lstStyle/>
+          <a:p>
+            <a:r>
+              <a:rPr lang="nl-NL" i="1" dirty="0" smtClean="0">
+                <a:solidFill>
+                  <a:schemeClr val="tx1">
+                    <a:lumMod val="50000"/>
+                    <a:lumOff val="50000"/>
+                  </a:schemeClr>
+                </a:solidFill>
+              </a:rPr>
+              <a:t>“</a:t>
+            </a:r>
+            <a:r>
+              <a:rPr lang="nl-NL" i="1" dirty="0" err="1" smtClean="0">
+                <a:solidFill>
+                  <a:schemeClr val="tx1">
+                    <a:lumMod val="50000"/>
+                    <a:lumOff val="50000"/>
+                  </a:schemeClr>
+                </a:solidFill>
+              </a:rPr>
+              <a:t>When</a:t>
+            </a:r>
+            <a:r>
+              <a:rPr lang="nl-NL" i="1" dirty="0" smtClean="0">
+                <a:solidFill>
+                  <a:schemeClr val="tx1">
+                    <a:lumMod val="50000"/>
+                    <a:lumOff val="50000"/>
+                  </a:schemeClr>
+                </a:solidFill>
+              </a:rPr>
+              <a:t> </a:t>
+            </a:r>
+            <a:r>
+              <a:rPr lang="nl-NL" i="1" dirty="0">
+                <a:solidFill>
+                  <a:schemeClr val="tx1">
+                    <a:lumMod val="50000"/>
+                    <a:lumOff val="50000"/>
+                  </a:schemeClr>
+                </a:solidFill>
+              </a:rPr>
+              <a:t>a bug report is </a:t>
+            </a:r>
+            <a:r>
+              <a:rPr lang="nl-NL" i="1" dirty="0" err="1">
+                <a:solidFill>
+                  <a:schemeClr val="tx1">
+                    <a:lumMod val="50000"/>
+                    <a:lumOff val="50000"/>
+                  </a:schemeClr>
+                </a:solidFill>
+              </a:rPr>
+              <a:t>created</a:t>
+            </a:r>
+            <a:r>
+              <a:rPr lang="nl-NL" i="1" dirty="0">
+                <a:solidFill>
+                  <a:schemeClr val="tx1">
+                    <a:lumMod val="50000"/>
+                    <a:lumOff val="50000"/>
+                  </a:schemeClr>
+                </a:solidFill>
+              </a:rPr>
+              <a:t>, </a:t>
+            </a:r>
+            <a:r>
+              <a:rPr lang="nl-NL" i="1" dirty="0" err="1">
+                <a:solidFill>
+                  <a:schemeClr val="tx1">
+                    <a:lumMod val="50000"/>
+                    <a:lumOff val="50000"/>
+                  </a:schemeClr>
+                </a:solidFill>
+              </a:rPr>
+              <a:t>it</a:t>
+            </a:r>
+            <a:r>
+              <a:rPr lang="nl-NL" i="1" dirty="0">
+                <a:solidFill>
+                  <a:schemeClr val="tx1">
+                    <a:lumMod val="50000"/>
+                    <a:lumOff val="50000"/>
+                  </a:schemeClr>
+                </a:solidFill>
+              </a:rPr>
+              <a:t> </a:t>
+            </a:r>
+            <a:r>
+              <a:rPr lang="nl-NL" i="1" dirty="0" err="1">
+                <a:solidFill>
+                  <a:schemeClr val="tx1">
+                    <a:lumMod val="50000"/>
+                    <a:lumOff val="50000"/>
+                  </a:schemeClr>
+                </a:solidFill>
+              </a:rPr>
+              <a:t>can</a:t>
+            </a:r>
+            <a:r>
+              <a:rPr lang="nl-NL" i="1" dirty="0">
+                <a:solidFill>
+                  <a:schemeClr val="tx1">
+                    <a:lumMod val="50000"/>
+                    <a:lumOff val="50000"/>
+                  </a:schemeClr>
+                </a:solidFill>
+              </a:rPr>
+              <a:t> </a:t>
+            </a:r>
+            <a:r>
+              <a:rPr lang="nl-NL" i="1" dirty="0" err="1">
+                <a:solidFill>
+                  <a:schemeClr val="tx1">
+                    <a:lumMod val="50000"/>
+                    <a:lumOff val="50000"/>
+                  </a:schemeClr>
+                </a:solidFill>
+              </a:rPr>
+              <a:t>be</a:t>
+            </a:r>
+            <a:r>
+              <a:rPr lang="nl-NL" i="1" dirty="0">
+                <a:solidFill>
+                  <a:schemeClr val="tx1">
+                    <a:lumMod val="50000"/>
+                    <a:lumOff val="50000"/>
+                  </a:schemeClr>
+                </a:solidFill>
+              </a:rPr>
+              <a:t> </a:t>
+            </a:r>
+            <a:r>
+              <a:rPr lang="nl-NL" i="1" dirty="0" err="1">
+                <a:solidFill>
+                  <a:schemeClr val="tx1">
+                    <a:lumMod val="50000"/>
+                    <a:lumOff val="50000"/>
+                  </a:schemeClr>
+                </a:solidFill>
+              </a:rPr>
+              <a:t>marked</a:t>
+            </a:r>
+            <a:r>
+              <a:rPr lang="nl-NL" i="1" dirty="0">
+                <a:solidFill>
+                  <a:schemeClr val="tx1">
+                    <a:lumMod val="50000"/>
+                    <a:lumOff val="50000"/>
+                  </a:schemeClr>
+                </a:solidFill>
+              </a:rPr>
+              <a:t> as private</a:t>
+            </a:r>
+            <a:r>
+              <a:rPr lang="nl-NL" i="1" dirty="0" smtClean="0">
+                <a:solidFill>
+                  <a:schemeClr val="tx1">
+                    <a:lumMod val="50000"/>
+                    <a:lumOff val="50000"/>
+                  </a:schemeClr>
+                </a:solidFill>
+              </a:rPr>
+              <a:t>. </a:t>
+            </a:r>
+            <a:r>
+              <a:rPr lang="is-IS" i="1" dirty="0" smtClean="0">
+                <a:solidFill>
+                  <a:schemeClr val="tx1">
+                    <a:lumMod val="50000"/>
+                    <a:lumOff val="50000"/>
+                  </a:schemeClr>
+                </a:solidFill>
+              </a:rPr>
+              <a:t>… </a:t>
+            </a:r>
+            <a:r>
+              <a:rPr lang="nl-NL" i="1" dirty="0" err="1">
+                <a:solidFill>
+                  <a:schemeClr val="tx1">
+                    <a:lumMod val="50000"/>
+                    <a:lumOff val="50000"/>
+                  </a:schemeClr>
+                </a:solidFill>
+              </a:rPr>
+              <a:t>Once</a:t>
+            </a:r>
+            <a:r>
+              <a:rPr lang="nl-NL" i="1" dirty="0">
+                <a:solidFill>
+                  <a:schemeClr val="tx1">
+                    <a:lumMod val="50000"/>
+                    <a:lumOff val="50000"/>
+                  </a:schemeClr>
+                </a:solidFill>
+              </a:rPr>
+              <a:t> </a:t>
+            </a:r>
+            <a:r>
+              <a:rPr lang="nl-NL" i="1" dirty="0" err="1">
+                <a:solidFill>
+                  <a:schemeClr val="tx1">
+                    <a:lumMod val="50000"/>
+                    <a:lumOff val="50000"/>
+                  </a:schemeClr>
+                </a:solidFill>
+              </a:rPr>
+              <a:t>the</a:t>
+            </a:r>
+            <a:r>
+              <a:rPr lang="nl-NL" i="1" dirty="0">
+                <a:solidFill>
+                  <a:schemeClr val="tx1">
+                    <a:lumMod val="50000"/>
+                    <a:lumOff val="50000"/>
+                  </a:schemeClr>
+                </a:solidFill>
+              </a:rPr>
+              <a:t> first patch is </a:t>
+            </a:r>
+            <a:r>
+              <a:rPr lang="nl-NL" i="1" dirty="0" err="1">
+                <a:solidFill>
+                  <a:schemeClr val="tx1">
+                    <a:lumMod val="50000"/>
+                    <a:lumOff val="50000"/>
+                  </a:schemeClr>
+                </a:solidFill>
+              </a:rPr>
+              <a:t>submitted</a:t>
+            </a:r>
+            <a:r>
+              <a:rPr lang="nl-NL" i="1" dirty="0">
+                <a:solidFill>
+                  <a:schemeClr val="tx1">
+                    <a:lumMod val="50000"/>
+                    <a:lumOff val="50000"/>
+                  </a:schemeClr>
+                </a:solidFill>
+              </a:rPr>
+              <a:t> </a:t>
+            </a:r>
+            <a:r>
+              <a:rPr lang="nl-NL" i="1" dirty="0" err="1">
+                <a:solidFill>
+                  <a:schemeClr val="tx1">
+                    <a:lumMod val="50000"/>
+                    <a:lumOff val="50000"/>
+                  </a:schemeClr>
+                </a:solidFill>
+              </a:rPr>
+              <a:t>for</a:t>
+            </a:r>
+            <a:r>
+              <a:rPr lang="nl-NL" i="1" dirty="0">
+                <a:solidFill>
+                  <a:schemeClr val="tx1">
+                    <a:lumMod val="50000"/>
+                    <a:lumOff val="50000"/>
+                  </a:schemeClr>
+                </a:solidFill>
+              </a:rPr>
+              <a:t> </a:t>
+            </a:r>
+            <a:r>
+              <a:rPr lang="nl-NL" i="1" dirty="0" err="1">
+                <a:solidFill>
+                  <a:schemeClr val="tx1">
+                    <a:lumMod val="50000"/>
+                    <a:lumOff val="50000"/>
+                  </a:schemeClr>
+                </a:solidFill>
+              </a:rPr>
+              <a:t>the</a:t>
+            </a:r>
+            <a:r>
+              <a:rPr lang="nl-NL" i="1" dirty="0">
+                <a:solidFill>
+                  <a:schemeClr val="tx1">
+                    <a:lumMod val="50000"/>
+                    <a:lumOff val="50000"/>
+                  </a:schemeClr>
+                </a:solidFill>
+              </a:rPr>
+              <a:t> bug report, </a:t>
+            </a:r>
+            <a:r>
+              <a:rPr lang="nl-NL" i="1" dirty="0" err="1">
+                <a:solidFill>
+                  <a:schemeClr val="tx1">
+                    <a:lumMod val="50000"/>
+                    <a:lumOff val="50000"/>
+                  </a:schemeClr>
+                </a:solidFill>
+              </a:rPr>
+              <a:t>it</a:t>
+            </a:r>
+            <a:r>
+              <a:rPr lang="nl-NL" i="1" dirty="0">
+                <a:solidFill>
+                  <a:schemeClr val="tx1">
+                    <a:lumMod val="50000"/>
+                    <a:lumOff val="50000"/>
+                  </a:schemeClr>
+                </a:solidFill>
+              </a:rPr>
+              <a:t> is </a:t>
+            </a:r>
+            <a:r>
+              <a:rPr lang="nl-NL" i="1" dirty="0" err="1">
+                <a:solidFill>
+                  <a:schemeClr val="tx1">
+                    <a:lumMod val="50000"/>
+                    <a:lumOff val="50000"/>
+                  </a:schemeClr>
+                </a:solidFill>
+              </a:rPr>
+              <a:t>visible</a:t>
+            </a:r>
+            <a:r>
+              <a:rPr lang="nl-NL" i="1" dirty="0">
+                <a:solidFill>
+                  <a:schemeClr val="tx1">
+                    <a:lumMod val="50000"/>
+                    <a:lumOff val="50000"/>
+                  </a:schemeClr>
+                </a:solidFill>
+              </a:rPr>
+              <a:t> </a:t>
+            </a:r>
+            <a:r>
+              <a:rPr lang="nl-NL" i="1" dirty="0" err="1">
+                <a:solidFill>
+                  <a:schemeClr val="tx1">
+                    <a:lumMod val="50000"/>
+                    <a:lumOff val="50000"/>
+                  </a:schemeClr>
+                </a:solidFill>
+              </a:rPr>
+              <a:t>for</a:t>
+            </a:r>
+            <a:r>
+              <a:rPr lang="nl-NL" i="1" dirty="0">
+                <a:solidFill>
+                  <a:schemeClr val="tx1">
+                    <a:lumMod val="50000"/>
+                    <a:lumOff val="50000"/>
+                  </a:schemeClr>
+                </a:solidFill>
+              </a:rPr>
+              <a:t> </a:t>
+            </a:r>
+            <a:r>
+              <a:rPr lang="nl-NL" i="1" dirty="0" err="1">
+                <a:solidFill>
+                  <a:schemeClr val="tx1">
+                    <a:lumMod val="50000"/>
+                    <a:lumOff val="50000"/>
+                  </a:schemeClr>
+                </a:solidFill>
+              </a:rPr>
+              <a:t>all</a:t>
+            </a:r>
+            <a:r>
+              <a:rPr lang="nl-NL" i="1" dirty="0">
+                <a:solidFill>
+                  <a:schemeClr val="tx1">
+                    <a:lumMod val="50000"/>
+                    <a:lumOff val="50000"/>
+                  </a:schemeClr>
+                </a:solidFill>
+              </a:rPr>
+              <a:t> </a:t>
+            </a:r>
+            <a:r>
+              <a:rPr lang="nl-NL" i="1" dirty="0" err="1">
+                <a:solidFill>
+                  <a:schemeClr val="tx1">
+                    <a:lumMod val="50000"/>
+                    <a:lumOff val="50000"/>
+                  </a:schemeClr>
+                </a:solidFill>
+              </a:rPr>
+              <a:t>the</a:t>
+            </a:r>
+            <a:r>
+              <a:rPr lang="nl-NL" i="1" dirty="0">
+                <a:solidFill>
+                  <a:schemeClr val="tx1">
+                    <a:lumMod val="50000"/>
+                    <a:lumOff val="50000"/>
+                  </a:schemeClr>
+                </a:solidFill>
+              </a:rPr>
+              <a:t> users of </a:t>
+            </a:r>
+            <a:r>
+              <a:rPr lang="nl-NL" i="1" dirty="0" err="1">
+                <a:solidFill>
+                  <a:schemeClr val="tx1">
+                    <a:lumMod val="50000"/>
+                    <a:lumOff val="50000"/>
+                  </a:schemeClr>
+                </a:solidFill>
+              </a:rPr>
+              <a:t>BugTrap</a:t>
+            </a:r>
+            <a:r>
+              <a:rPr lang="nl-NL" i="1" dirty="0" smtClean="0">
+                <a:solidFill>
+                  <a:schemeClr val="tx1">
+                    <a:lumMod val="50000"/>
+                    <a:lumOff val="50000"/>
+                  </a:schemeClr>
+                </a:solidFill>
+              </a:rPr>
+              <a:t>.”</a:t>
+            </a:r>
+            <a:endParaRPr lang="nl-NL" i="1" dirty="0">
+              <a:solidFill>
+                <a:schemeClr val="tx1">
+                  <a:lumMod val="50000"/>
+                  <a:lumOff val="50000"/>
+                </a:schemeClr>
+              </a:solidFill>
+            </a:endParaRPr>
+          </a:p>
+        </p:txBody>
+      </p:sp>
     </p:spTree>
     <p:extLst>
       <p:ext uri="{BB962C8B-B14F-4D97-AF65-F5344CB8AC3E}">
-        <p14:creationId xmlns:p14="http://schemas.microsoft.com/office/powerpoint/2010/main" val="1319242908"/>
+        <p14:creationId xmlns:p14="http://schemas.microsoft.com/office/powerpoint/2010/main" val="269333384"/>
       </p:ext>
     </p:extLst>
   </p:cSld>
@@ -6560,29 +7677,399 @@
         </p:nvSpPr>
         <p:spPr/>
         <p:txBody>
-          <a:bodyPr/>
+          <a:bodyPr>
+            <a:normAutofit/>
+          </a:bodyPr>
           <a:lstStyle/>
           <a:p>
             <a:r>
-              <a:rPr lang="nl-BE" dirty="0" smtClean="0"/>
-              <a:t>Undo mechanism</a:t>
-            </a:r>
-            <a:endParaRPr lang="nl-BE" dirty="0"/>
+              <a:rPr lang="nl-NL" sz="3600" cap="small" dirty="0">
+                <a:ln w="18415" cmpd="sng">
+                  <a:solidFill>
+                    <a:schemeClr val="tx1">
+                      <a:alpha val="0"/>
+                    </a:schemeClr>
+                  </a:solidFill>
+                  <a:prstDash val="solid"/>
+                </a:ln>
+                <a:effectLst>
+                  <a:outerShdw blurRad="25400" dir="3600000" algn="tl" rotWithShape="0">
+                    <a:srgbClr val="000000">
+                      <a:alpha val="70000"/>
+                    </a:srgbClr>
+                  </a:outerShdw>
+                </a:effectLst>
+                <a:latin typeface="Sitka Text" pitchFamily="2" charset="0"/>
+              </a:rPr>
+              <a:t>Tag specifieke informatie</a:t>
+            </a:r>
+          </a:p>
+        </p:txBody>
+      </p:sp>
+      <p:sp>
+        <p:nvSpPr>
+          <p:cNvPr id="5" name="Tekstvak 4"/>
+          <p:cNvSpPr txBox="1"/>
+          <p:nvPr/>
+        </p:nvSpPr>
+        <p:spPr>
+          <a:xfrm>
+            <a:off x="5156224" y="1568559"/>
+            <a:ext cx="3525441" cy="1477328"/>
+          </a:xfrm>
+          <a:prstGeom prst="rect">
+            <a:avLst/>
+          </a:prstGeom>
+          <a:noFill/>
+        </p:spPr>
+        <p:txBody>
+          <a:bodyPr wrap="square" rtlCol="0">
+            <a:spAutoFit/>
+          </a:bodyPr>
+          <a:lstStyle/>
+          <a:p>
+            <a:r>
+              <a:rPr lang="nl-NL" i="1" dirty="0">
+                <a:solidFill>
+                  <a:schemeClr val="tx1">
+                    <a:lumMod val="50000"/>
+                    <a:lumOff val="50000"/>
+                  </a:schemeClr>
+                </a:solidFill>
+              </a:rPr>
+              <a:t>“As a </a:t>
+            </a:r>
+            <a:r>
+              <a:rPr lang="nl-NL" i="1" dirty="0" err="1">
+                <a:solidFill>
+                  <a:schemeClr val="tx1">
+                    <a:lumMod val="50000"/>
+                    <a:lumOff val="50000"/>
+                  </a:schemeClr>
+                </a:solidFill>
+              </a:rPr>
+              <a:t>final</a:t>
+            </a:r>
+            <a:r>
+              <a:rPr lang="nl-NL" i="1" dirty="0">
+                <a:solidFill>
+                  <a:schemeClr val="tx1">
+                    <a:lumMod val="50000"/>
+                    <a:lumOff val="50000"/>
+                  </a:schemeClr>
+                </a:solidFill>
+              </a:rPr>
+              <a:t> step, </a:t>
+            </a:r>
+            <a:r>
+              <a:rPr lang="nl-NL" i="1" dirty="0" err="1">
+                <a:solidFill>
+                  <a:schemeClr val="tx1">
+                    <a:lumMod val="50000"/>
+                    <a:lumOff val="50000"/>
+                  </a:schemeClr>
+                </a:solidFill>
+              </a:rPr>
+              <a:t>the</a:t>
+            </a:r>
+            <a:r>
+              <a:rPr lang="nl-NL" i="1" dirty="0">
+                <a:solidFill>
+                  <a:schemeClr val="tx1">
+                    <a:lumMod val="50000"/>
+                    <a:lumOff val="50000"/>
+                  </a:schemeClr>
+                </a:solidFill>
+              </a:rPr>
+              <a:t> </a:t>
+            </a:r>
+            <a:r>
+              <a:rPr lang="nl-NL" i="1" dirty="0" err="1">
+                <a:solidFill>
+                  <a:schemeClr val="tx1">
+                    <a:lumMod val="50000"/>
+                    <a:lumOff val="50000"/>
+                  </a:schemeClr>
+                </a:solidFill>
+              </a:rPr>
+              <a:t>creator</a:t>
+            </a:r>
+            <a:r>
+              <a:rPr lang="nl-NL" i="1" dirty="0">
+                <a:solidFill>
+                  <a:schemeClr val="tx1">
+                    <a:lumMod val="50000"/>
+                    <a:lumOff val="50000"/>
+                  </a:schemeClr>
+                </a:solidFill>
+              </a:rPr>
+              <a:t> of a </a:t>
+            </a:r>
+            <a:r>
+              <a:rPr lang="nl-NL" i="1" dirty="0" err="1">
+                <a:solidFill>
+                  <a:schemeClr val="tx1">
+                    <a:lumMod val="50000"/>
+                    <a:lumOff val="50000"/>
+                  </a:schemeClr>
+                </a:solidFill>
+              </a:rPr>
+              <a:t>resolved</a:t>
+            </a:r>
+            <a:r>
+              <a:rPr lang="nl-NL" i="1" dirty="0">
+                <a:solidFill>
+                  <a:schemeClr val="tx1">
+                    <a:lumMod val="50000"/>
+                    <a:lumOff val="50000"/>
+                  </a:schemeClr>
+                </a:solidFill>
+              </a:rPr>
+              <a:t> bug report </a:t>
+            </a:r>
+            <a:r>
+              <a:rPr lang="nl-NL" i="1" dirty="0" err="1">
+                <a:solidFill>
+                  <a:schemeClr val="tx1">
+                    <a:lumMod val="50000"/>
+                    <a:lumOff val="50000"/>
+                  </a:schemeClr>
+                </a:solidFill>
+              </a:rPr>
+              <a:t>can</a:t>
+            </a:r>
+            <a:r>
+              <a:rPr lang="nl-NL" i="1" dirty="0">
+                <a:solidFill>
+                  <a:schemeClr val="tx1">
+                    <a:lumMod val="50000"/>
+                    <a:lumOff val="50000"/>
+                  </a:schemeClr>
+                </a:solidFill>
+              </a:rPr>
+              <a:t> close </a:t>
+            </a:r>
+            <a:r>
+              <a:rPr lang="nl-NL" i="1" dirty="0" err="1">
+                <a:solidFill>
+                  <a:schemeClr val="tx1">
+                    <a:lumMod val="50000"/>
+                    <a:lumOff val="50000"/>
+                  </a:schemeClr>
+                </a:solidFill>
+              </a:rPr>
+              <a:t>it</a:t>
+            </a:r>
+            <a:r>
+              <a:rPr lang="nl-NL" i="1" dirty="0">
+                <a:solidFill>
+                  <a:schemeClr val="tx1">
+                    <a:lumMod val="50000"/>
+                    <a:lumOff val="50000"/>
+                  </a:schemeClr>
+                </a:solidFill>
+              </a:rPr>
+              <a:t> (i.e. </a:t>
+            </a:r>
+            <a:r>
+              <a:rPr lang="nl-NL" i="1" dirty="0" err="1">
+                <a:solidFill>
+                  <a:schemeClr val="tx1">
+                    <a:lumMod val="50000"/>
+                    <a:lumOff val="50000"/>
+                  </a:schemeClr>
+                </a:solidFill>
+              </a:rPr>
+              <a:t>assign</a:t>
+            </a:r>
+            <a:r>
+              <a:rPr lang="nl-NL" i="1" dirty="0">
+                <a:solidFill>
+                  <a:schemeClr val="tx1">
+                    <a:lumMod val="50000"/>
+                    <a:lumOff val="50000"/>
+                  </a:schemeClr>
+                </a:solidFill>
+              </a:rPr>
+              <a:t> </a:t>
+            </a:r>
+            <a:r>
+              <a:rPr lang="nl-NL" i="1" dirty="0" err="1">
+                <a:solidFill>
+                  <a:schemeClr val="tx1">
+                    <a:lumMod val="50000"/>
+                    <a:lumOff val="50000"/>
+                  </a:schemeClr>
+                </a:solidFill>
+              </a:rPr>
+              <a:t>the</a:t>
+            </a:r>
+            <a:r>
+              <a:rPr lang="nl-NL" i="1" dirty="0">
+                <a:solidFill>
+                  <a:schemeClr val="tx1">
+                    <a:lumMod val="50000"/>
+                    <a:lumOff val="50000"/>
+                  </a:schemeClr>
+                </a:solidFill>
+              </a:rPr>
+              <a:t> tag Closed) </a:t>
+            </a:r>
+            <a:r>
+              <a:rPr lang="nl-NL" i="1" dirty="0" err="1">
+                <a:solidFill>
+                  <a:schemeClr val="tx1">
+                    <a:lumMod val="50000"/>
+                    <a:lumOff val="50000"/>
+                  </a:schemeClr>
+                </a:solidFill>
+              </a:rPr>
+              <a:t>by</a:t>
+            </a:r>
+            <a:r>
+              <a:rPr lang="nl-NL" i="1" dirty="0">
+                <a:solidFill>
+                  <a:schemeClr val="tx1">
+                    <a:lumMod val="50000"/>
+                    <a:lumOff val="50000"/>
+                  </a:schemeClr>
+                </a:solidFill>
+              </a:rPr>
+              <a:t> </a:t>
+            </a:r>
+            <a:r>
+              <a:rPr lang="nl-NL" i="1" dirty="0" err="1">
+                <a:solidFill>
+                  <a:schemeClr val="tx1">
+                    <a:lumMod val="50000"/>
+                    <a:lumOff val="50000"/>
+                  </a:schemeClr>
+                </a:solidFill>
+              </a:rPr>
+              <a:t>specifying</a:t>
+            </a:r>
+            <a:r>
+              <a:rPr lang="nl-NL" i="1" dirty="0">
+                <a:solidFill>
+                  <a:schemeClr val="tx1">
+                    <a:lumMod val="50000"/>
+                    <a:lumOff val="50000"/>
+                  </a:schemeClr>
+                </a:solidFill>
+              </a:rPr>
+              <a:t> </a:t>
+            </a:r>
+            <a:r>
+              <a:rPr lang="nl-NL" i="1" dirty="0" err="1">
+                <a:solidFill>
+                  <a:schemeClr val="tx1">
+                    <a:lumMod val="50000"/>
+                    <a:lumOff val="50000"/>
+                  </a:schemeClr>
+                </a:solidFill>
+              </a:rPr>
+              <a:t>how</a:t>
+            </a:r>
+            <a:r>
+              <a:rPr lang="nl-NL" i="1" dirty="0">
+                <a:solidFill>
+                  <a:schemeClr val="tx1">
+                    <a:lumMod val="50000"/>
+                    <a:lumOff val="50000"/>
+                  </a:schemeClr>
+                </a:solidFill>
+              </a:rPr>
+              <a:t> </a:t>
+            </a:r>
+            <a:r>
+              <a:rPr lang="nl-NL" i="1" dirty="0" err="1">
+                <a:solidFill>
+                  <a:schemeClr val="tx1">
+                    <a:lumMod val="50000"/>
+                    <a:lumOff val="50000"/>
+                  </a:schemeClr>
+                </a:solidFill>
+              </a:rPr>
+              <a:t>satisfied</a:t>
+            </a:r>
+            <a:r>
+              <a:rPr lang="nl-NL" i="1" dirty="0">
+                <a:solidFill>
+                  <a:schemeClr val="tx1">
+                    <a:lumMod val="50000"/>
+                    <a:lumOff val="50000"/>
+                  </a:schemeClr>
+                </a:solidFill>
+              </a:rPr>
+              <a:t> he is </a:t>
+            </a:r>
+            <a:r>
+              <a:rPr lang="nl-NL" i="1" dirty="0" err="1">
+                <a:solidFill>
+                  <a:schemeClr val="tx1">
+                    <a:lumMod val="50000"/>
+                    <a:lumOff val="50000"/>
+                  </a:schemeClr>
+                </a:solidFill>
+              </a:rPr>
+              <a:t>with</a:t>
+            </a:r>
+            <a:r>
+              <a:rPr lang="nl-NL" i="1" dirty="0">
+                <a:solidFill>
+                  <a:schemeClr val="tx1">
+                    <a:lumMod val="50000"/>
+                    <a:lumOff val="50000"/>
+                  </a:schemeClr>
+                </a:solidFill>
+              </a:rPr>
+              <a:t> </a:t>
+            </a:r>
+            <a:r>
+              <a:rPr lang="nl-NL" i="1" dirty="0" err="1">
+                <a:solidFill>
+                  <a:schemeClr val="tx1">
+                    <a:lumMod val="50000"/>
+                    <a:lumOff val="50000"/>
+                  </a:schemeClr>
+                </a:solidFill>
+              </a:rPr>
+              <a:t>the</a:t>
+            </a:r>
+            <a:r>
+              <a:rPr lang="nl-NL" i="1" dirty="0">
+                <a:solidFill>
+                  <a:schemeClr val="tx1">
+                    <a:lumMod val="50000"/>
+                    <a:lumOff val="50000"/>
+                  </a:schemeClr>
+                </a:solidFill>
+              </a:rPr>
+              <a:t> solution.”</a:t>
+            </a:r>
           </a:p>
         </p:txBody>
       </p:sp>
       <p:pic>
         <p:nvPicPr>
-          <p:cNvPr id="4" name="Content Placeholder 3"/>
+          <p:cNvPr id="3" name="Afbeelding 2"/>
           <p:cNvPicPr>
-            <a:picLocks noGrp="1" noChangeAspect="1"/>
+            <a:picLocks noChangeAspect="1"/>
           </p:cNvPicPr>
-          <p:nvPr>
-            <p:ph idx="1"/>
-          </p:nvPr>
+          <p:nvPr/>
         </p:nvPicPr>
         <p:blipFill>
           <a:blip r:embed="rId2">
+            <a:clrChange>
+              <a:clrFrom>
+                <a:srgbClr val="FFFFFF"/>
+              </a:clrFrom>
+              <a:clrTo>
+                <a:srgbClr val="FFFFFF">
+                  <a:alpha val="0"/>
+                </a:srgbClr>
+              </a:clrTo>
+            </a:clrChange>
             <a:extLst>
               <a:ext uri="{28A0092B-C50C-407E-A947-70E740481C1C}">
                 <a14:useLocalDpi xmlns:a14="http://schemas.microsoft.com/office/drawing/2010/main" val="0"/>
@@ -6595,15 +8082,18 @@
         </p:blipFill>
         <p:spPr>
           <a:xfrm>
-            <a:off x="1259632" y="1196752"/>
-            <a:ext cx="6336704" cy="5553417"/>
+            <a:off x="107504" y="3259615"/>
+            <a:ext cx="8964488" cy="2617657"/>
           </a:xfrm>
+          <a:prstGeom prst="rect">
+            <a:avLst/>
+          </a:prstGeom>
         </p:spPr>
       </p:pic>
     </p:spTree>
     <p:extLst>
       <p:ext uri="{BB962C8B-B14F-4D97-AF65-F5344CB8AC3E}">
-        <p14:creationId xmlns:p14="http://schemas.microsoft.com/office/powerpoint/2010/main" val="1968202226"/>
+        <p14:creationId xmlns:p14="http://schemas.microsoft.com/office/powerpoint/2010/main" val="1938140659"/>
       </p:ext>
     </p:extLst>
   </p:cSld>
@@ -6646,49 +8136,23 @@
         <p:spPr/>
         <p:txBody>
           <a:bodyPr>
-            <a:normAutofit/>
+            <a:normAutofit fontScale="90000"/>
           </a:bodyPr>
           <a:lstStyle/>
           <a:p>
             <a:r>
-              <a:rPr lang="nl-BE" sz="3600" cap="small" dirty="0" smtClean="0">
-                <a:ln w="18415" cmpd="sng">
-                  <a:solidFill>
-                    <a:schemeClr val="tx1">
-                      <a:alpha val="0"/>
-                    </a:schemeClr>
-                  </a:solidFill>
-                  <a:prstDash val="solid"/>
-                </a:ln>
-                <a:effectLst>
-                  <a:outerShdw blurRad="25400" dir="3600000" algn="tl" rotWithShape="0">
-                    <a:srgbClr val="000000">
-                      <a:alpha val="70000"/>
-                    </a:srgbClr>
-                  </a:outerShdw>
-                </a:effectLst>
-                <a:latin typeface="Sitka Text" pitchFamily="2" charset="0"/>
-              </a:rPr>
-              <a:t>Extensibility of the system:</a:t>
-            </a:r>
-            <a:endParaRPr lang="nl-BE" sz="3600" cap="small" dirty="0">
-              <a:ln w="18415" cmpd="sng">
-                <a:solidFill>
-                  <a:schemeClr val="tx1">
-                    <a:alpha val="0"/>
-                  </a:schemeClr>
-                </a:solidFill>
-                <a:prstDash val="solid"/>
-              </a:ln>
-              <a:effectLst>
-                <a:outerShdw blurRad="25400" dir="3600000" algn="tl" rotWithShape="0">
-                  <a:srgbClr val="000000">
-                    <a:alpha val="70000"/>
-                  </a:srgbClr>
-                </a:outerShdw>
-              </a:effectLst>
-              <a:latin typeface="Sitka Text" pitchFamily="2" charset="0"/>
-            </a:endParaRPr>
+              <a:rPr lang="nl-BE" dirty="0" err="1" smtClean="0"/>
+              <a:t>Insert</a:t>
+            </a:r>
+            <a:r>
+              <a:rPr lang="nl-BE" dirty="0" smtClean="0"/>
+              <a:t> heel korte uitleg over </a:t>
+            </a:r>
+            <a:r>
+              <a:rPr lang="nl-BE" dirty="0" err="1" smtClean="0"/>
+              <a:t>milestones</a:t>
+            </a:r>
+            <a:endParaRPr lang="nl-BE" dirty="0"/>
           </a:p>
         </p:txBody>
       </p:sp>
@@ -6702,104 +8166,19 @@
             <p:ph idx="1"/>
           </p:nvPr>
         </p:nvSpPr>
-        <p:spPr>
-          <a:xfrm>
-            <a:off x="539552" y="1844824"/>
-            <a:ext cx="8229600" cy="4525963"/>
-          </a:xfrm>
-        </p:spPr>
-        <p:txBody>
-          <a:bodyPr>
-            <a:normAutofit/>
-          </a:bodyPr>
+        <p:spPr/>
+        <p:txBody>
+          <a:bodyPr/>
           <a:lstStyle/>
           <a:p>
-            <a:r>
-              <a:rPr lang="en-US" sz="2400" dirty="0" smtClean="0">
-                <a:latin typeface="Sitka Display" pitchFamily="2" charset="0"/>
-              </a:rPr>
-              <a:t>It’s easier to add use cases than last time</a:t>
-            </a:r>
-          </a:p>
-          <a:p>
-            <a:r>
-              <a:rPr lang="en-US" sz="2400" dirty="0" smtClean="0">
-                <a:latin typeface="Sitka Display" pitchFamily="2" charset="0"/>
-              </a:rPr>
-              <a:t>UI is still completely independent </a:t>
-            </a:r>
-          </a:p>
-          <a:p>
-            <a:r>
-              <a:rPr lang="en-US" sz="2400" dirty="0" smtClean="0">
-                <a:latin typeface="Sitka Display" pitchFamily="2" charset="0"/>
-              </a:rPr>
-              <a:t>Interface for the </a:t>
-            </a:r>
-            <a:r>
-              <a:rPr lang="en-US" sz="2400" dirty="0" err="1" smtClean="0">
-                <a:latin typeface="Sitka Display" pitchFamily="2" charset="0"/>
-              </a:rPr>
-              <a:t>Initializer</a:t>
-            </a:r>
-            <a:endParaRPr lang="en-US" sz="2400" dirty="0" smtClean="0">
-              <a:latin typeface="Sitka Display" pitchFamily="2" charset="0"/>
-            </a:endParaRPr>
-          </a:p>
-          <a:p>
-            <a:r>
-              <a:rPr lang="en-US" sz="2400" dirty="0" smtClean="0">
-                <a:latin typeface="Sitka Display" pitchFamily="2" charset="0"/>
-              </a:rPr>
-              <a:t>Adding constraints concerning tag</a:t>
-            </a:r>
-          </a:p>
-          <a:p>
-            <a:r>
-              <a:rPr lang="en-US" sz="2400" dirty="0" smtClean="0">
-                <a:latin typeface="Sitka Display" pitchFamily="2" charset="0"/>
-              </a:rPr>
-              <a:t>Adding new registration types = adding new observers</a:t>
-            </a:r>
-          </a:p>
-          <a:p>
-            <a:r>
-              <a:rPr lang="en-US" sz="2400" dirty="0" smtClean="0">
-                <a:latin typeface="Sitka Display" pitchFamily="2" charset="0"/>
-              </a:rPr>
-              <a:t>Search methods for bug reports</a:t>
-            </a:r>
-          </a:p>
-          <a:p>
-            <a:r>
-              <a:rPr lang="en-US" sz="2400" dirty="0" smtClean="0">
-                <a:latin typeface="Sitka Display" pitchFamily="2" charset="0"/>
-              </a:rPr>
-              <a:t>Adding new objects that could be undone</a:t>
-            </a:r>
-          </a:p>
-          <a:p>
-            <a:endParaRPr lang="en-US" sz="2400" dirty="0" smtClean="0">
-              <a:latin typeface="Sitka Display" pitchFamily="2" charset="0"/>
-            </a:endParaRPr>
-          </a:p>
-          <a:p>
-            <a:r>
-              <a:rPr lang="en-US" sz="2400" dirty="0" smtClean="0">
-                <a:latin typeface="Sitka Display" pitchFamily="2" charset="0"/>
-              </a:rPr>
-              <a:t>It was easy to implement the changes from iteration 2 -&gt; great extensibility of our code from iteration 1</a:t>
-            </a:r>
-          </a:p>
-          <a:p>
-            <a:endParaRPr lang="en-US" sz="2400" dirty="0"/>
+            <a:endParaRPr lang="nl-BE"/>
           </a:p>
         </p:txBody>
       </p:sp>
     </p:spTree>
     <p:extLst>
       <p:ext uri="{BB962C8B-B14F-4D97-AF65-F5344CB8AC3E}">
-        <p14:creationId xmlns:p14="http://schemas.microsoft.com/office/powerpoint/2010/main" val="2444210159"/>
+        <p14:creationId xmlns:p14="http://schemas.microsoft.com/office/powerpoint/2010/main" val="378156031"/>
       </p:ext>
     </p:extLst>
   </p:cSld>
@@ -6809,13 +8188,6 @@
   <p:transition>
     <p:fade/>
   </p:transition>
-  <p:timing>
-    <p:tnLst>
-      <p:par>
-        <p:cTn id="1" dur="indefinite" restart="never" nodeType="tmRoot"/>
-      </p:par>
-    </p:tnLst>
-  </p:timing>
 </p:sld>
 </file>
 

</xml_diff>

<commit_message>
changes in the pres it2
</commit_message>
<xml_diff>
--- a/Presentaties/Iteratie 2/SWOP Presentatie 2 Inhoud.pptx
+++ b/Presentaties/Iteratie 2/SWOP Presentatie 2 Inhoud.pptx
@@ -126,7 +126,7 @@
   </p:defaultTextStyle>
   <p:extLst>
     <p:ext uri="{EFAFB233-063F-42B5-8137-9DF3F51BA10A}">
-      <p15:sldGuideLst xmlns="" xmlns:p15="http://schemas.microsoft.com/office/powerpoint/2012/main">
+      <p15:sldGuideLst xmlns:p15="http://schemas.microsoft.com/office/powerpoint/2012/main" xmlns="">
         <p15:guide id="1" orient="horz" pos="2160">
           <p15:clr>
             <a:srgbClr val="A4A3A4"/>
@@ -368,7 +368,7 @@
             <a:fld id="{91663F60-0288-4BD7-9F87-79CFFEA98662}" type="slidenum">
               <a:rPr lang="nl-BE" smtClean="0"/>
               <a:pPr/>
-              <a:t>‹nr.›</a:t>
+              <a:t>‹Nr.›</a:t>
             </a:fld>
             <a:endParaRPr lang="nl-BE"/>
           </a:p>
@@ -377,7 +377,7 @@
     </p:spTree>
     <p:extLst>
       <p:ext uri="{BB962C8B-B14F-4D97-AF65-F5344CB8AC3E}">
-        <p14:creationId xmlns:p14="http://schemas.microsoft.com/office/powerpoint/2010/main" val="3963083300"/>
+        <p14:creationId xmlns:p14="http://schemas.microsoft.com/office/powerpoint/2010/main" xmlns="" val="3963083300"/>
       </p:ext>
     </p:extLst>
   </p:cSld>
@@ -543,7 +543,7 @@
             <a:fld id="{91663F60-0288-4BD7-9F87-79CFFEA98662}" type="slidenum">
               <a:rPr lang="nl-BE" smtClean="0"/>
               <a:pPr/>
-              <a:t>‹nr.›</a:t>
+              <a:t>‹Nr.›</a:t>
             </a:fld>
             <a:endParaRPr lang="nl-BE"/>
           </a:p>
@@ -552,7 +552,7 @@
     </p:spTree>
     <p:extLst>
       <p:ext uri="{BB962C8B-B14F-4D97-AF65-F5344CB8AC3E}">
-        <p14:creationId xmlns:p14="http://schemas.microsoft.com/office/powerpoint/2010/main" val="1367293728"/>
+        <p14:creationId xmlns:p14="http://schemas.microsoft.com/office/powerpoint/2010/main" xmlns="" val="1367293728"/>
       </p:ext>
     </p:extLst>
   </p:cSld>
@@ -728,7 +728,7 @@
             <a:fld id="{91663F60-0288-4BD7-9F87-79CFFEA98662}" type="slidenum">
               <a:rPr lang="nl-BE" smtClean="0"/>
               <a:pPr/>
-              <a:t>‹nr.›</a:t>
+              <a:t>‹Nr.›</a:t>
             </a:fld>
             <a:endParaRPr lang="nl-BE"/>
           </a:p>
@@ -737,7 +737,7 @@
     </p:spTree>
     <p:extLst>
       <p:ext uri="{BB962C8B-B14F-4D97-AF65-F5344CB8AC3E}">
-        <p14:creationId xmlns:p14="http://schemas.microsoft.com/office/powerpoint/2010/main" val="3320721104"/>
+        <p14:creationId xmlns:p14="http://schemas.microsoft.com/office/powerpoint/2010/main" xmlns="" val="3320721104"/>
       </p:ext>
     </p:extLst>
   </p:cSld>
@@ -903,7 +903,7 @@
             <a:fld id="{91663F60-0288-4BD7-9F87-79CFFEA98662}" type="slidenum">
               <a:rPr lang="nl-BE" smtClean="0"/>
               <a:pPr/>
-              <a:t>‹nr.›</a:t>
+              <a:t>‹Nr.›</a:t>
             </a:fld>
             <a:endParaRPr lang="nl-BE"/>
           </a:p>
@@ -912,7 +912,7 @@
     </p:spTree>
     <p:extLst>
       <p:ext uri="{BB962C8B-B14F-4D97-AF65-F5344CB8AC3E}">
-        <p14:creationId xmlns:p14="http://schemas.microsoft.com/office/powerpoint/2010/main" val="1971972017"/>
+        <p14:creationId xmlns:p14="http://schemas.microsoft.com/office/powerpoint/2010/main" xmlns="" val="1971972017"/>
       </p:ext>
     </p:extLst>
   </p:cSld>
@@ -1154,7 +1154,7 @@
             <a:fld id="{91663F60-0288-4BD7-9F87-79CFFEA98662}" type="slidenum">
               <a:rPr lang="nl-BE" smtClean="0"/>
               <a:pPr/>
-              <a:t>‹nr.›</a:t>
+              <a:t>‹Nr.›</a:t>
             </a:fld>
             <a:endParaRPr lang="nl-BE"/>
           </a:p>
@@ -1163,7 +1163,7 @@
     </p:spTree>
     <p:extLst>
       <p:ext uri="{BB962C8B-B14F-4D97-AF65-F5344CB8AC3E}">
-        <p14:creationId xmlns:p14="http://schemas.microsoft.com/office/powerpoint/2010/main" val="1541596771"/>
+        <p14:creationId xmlns:p14="http://schemas.microsoft.com/office/powerpoint/2010/main" xmlns="" val="1541596771"/>
       </p:ext>
     </p:extLst>
   </p:cSld>
@@ -1447,7 +1447,7 @@
             <a:fld id="{91663F60-0288-4BD7-9F87-79CFFEA98662}" type="slidenum">
               <a:rPr lang="nl-BE" smtClean="0"/>
               <a:pPr/>
-              <a:t>‹nr.›</a:t>
+              <a:t>‹Nr.›</a:t>
             </a:fld>
             <a:endParaRPr lang="nl-BE"/>
           </a:p>
@@ -1456,7 +1456,7 @@
     </p:spTree>
     <p:extLst>
       <p:ext uri="{BB962C8B-B14F-4D97-AF65-F5344CB8AC3E}">
-        <p14:creationId xmlns:p14="http://schemas.microsoft.com/office/powerpoint/2010/main" val="1047982118"/>
+        <p14:creationId xmlns:p14="http://schemas.microsoft.com/office/powerpoint/2010/main" xmlns="" val="1047982118"/>
       </p:ext>
     </p:extLst>
   </p:cSld>
@@ -1874,7 +1874,7 @@
             <a:fld id="{91663F60-0288-4BD7-9F87-79CFFEA98662}" type="slidenum">
               <a:rPr lang="nl-BE" smtClean="0"/>
               <a:pPr/>
-              <a:t>‹nr.›</a:t>
+              <a:t>‹Nr.›</a:t>
             </a:fld>
             <a:endParaRPr lang="nl-BE"/>
           </a:p>
@@ -1883,7 +1883,7 @@
     </p:spTree>
     <p:extLst>
       <p:ext uri="{BB962C8B-B14F-4D97-AF65-F5344CB8AC3E}">
-        <p14:creationId xmlns:p14="http://schemas.microsoft.com/office/powerpoint/2010/main" val="2185725893"/>
+        <p14:creationId xmlns:p14="http://schemas.microsoft.com/office/powerpoint/2010/main" xmlns="" val="2185725893"/>
       </p:ext>
     </p:extLst>
   </p:cSld>
@@ -1997,7 +1997,7 @@
             <a:fld id="{91663F60-0288-4BD7-9F87-79CFFEA98662}" type="slidenum">
               <a:rPr lang="nl-BE" smtClean="0"/>
               <a:pPr/>
-              <a:t>‹nr.›</a:t>
+              <a:t>‹Nr.›</a:t>
             </a:fld>
             <a:endParaRPr lang="nl-BE"/>
           </a:p>
@@ -2006,7 +2006,7 @@
     </p:spTree>
     <p:extLst>
       <p:ext uri="{BB962C8B-B14F-4D97-AF65-F5344CB8AC3E}">
-        <p14:creationId xmlns:p14="http://schemas.microsoft.com/office/powerpoint/2010/main" val="1565659618"/>
+        <p14:creationId xmlns:p14="http://schemas.microsoft.com/office/powerpoint/2010/main" xmlns="" val="1565659618"/>
       </p:ext>
     </p:extLst>
   </p:cSld>
@@ -2097,7 +2097,7 @@
             <a:fld id="{91663F60-0288-4BD7-9F87-79CFFEA98662}" type="slidenum">
               <a:rPr lang="nl-BE" smtClean="0"/>
               <a:pPr/>
-              <a:t>‹nr.›</a:t>
+              <a:t>‹Nr.›</a:t>
             </a:fld>
             <a:endParaRPr lang="nl-BE"/>
           </a:p>
@@ -2106,7 +2106,7 @@
     </p:spTree>
     <p:extLst>
       <p:ext uri="{BB962C8B-B14F-4D97-AF65-F5344CB8AC3E}">
-        <p14:creationId xmlns:p14="http://schemas.microsoft.com/office/powerpoint/2010/main" val="2302775655"/>
+        <p14:creationId xmlns:p14="http://schemas.microsoft.com/office/powerpoint/2010/main" xmlns="" val="2302775655"/>
       </p:ext>
     </p:extLst>
   </p:cSld>
@@ -2379,7 +2379,7 @@
             <a:fld id="{91663F60-0288-4BD7-9F87-79CFFEA98662}" type="slidenum">
               <a:rPr lang="nl-BE" smtClean="0"/>
               <a:pPr/>
-              <a:t>‹nr.›</a:t>
+              <a:t>‹Nr.›</a:t>
             </a:fld>
             <a:endParaRPr lang="nl-BE"/>
           </a:p>
@@ -2388,7 +2388,7 @@
     </p:spTree>
     <p:extLst>
       <p:ext uri="{BB962C8B-B14F-4D97-AF65-F5344CB8AC3E}">
-        <p14:creationId xmlns:p14="http://schemas.microsoft.com/office/powerpoint/2010/main" val="2384358470"/>
+        <p14:creationId xmlns:p14="http://schemas.microsoft.com/office/powerpoint/2010/main" xmlns="" val="2384358470"/>
       </p:ext>
     </p:extLst>
   </p:cSld>
@@ -2637,7 +2637,7 @@
             <a:fld id="{91663F60-0288-4BD7-9F87-79CFFEA98662}" type="slidenum">
               <a:rPr lang="nl-BE" smtClean="0"/>
               <a:pPr/>
-              <a:t>‹nr.›</a:t>
+              <a:t>‹Nr.›</a:t>
             </a:fld>
             <a:endParaRPr lang="nl-BE"/>
           </a:p>
@@ -2646,7 +2646,7 @@
     </p:spTree>
     <p:extLst>
       <p:ext uri="{BB962C8B-B14F-4D97-AF65-F5344CB8AC3E}">
-        <p14:creationId xmlns:p14="http://schemas.microsoft.com/office/powerpoint/2010/main" val="221485852"/>
+        <p14:creationId xmlns:p14="http://schemas.microsoft.com/office/powerpoint/2010/main" xmlns="" val="221485852"/>
       </p:ext>
     </p:extLst>
   </p:cSld>
@@ -2915,7 +2915,7 @@
             <a:fld id="{91663F60-0288-4BD7-9F87-79CFFEA98662}" type="slidenum">
               <a:rPr lang="nl-BE" smtClean="0"/>
               <a:pPr/>
-              <a:t>‹nr.›</a:t>
+              <a:t>‹Nr.›</a:t>
             </a:fld>
             <a:endParaRPr lang="nl-BE"/>
           </a:p>
@@ -2924,7 +2924,7 @@
     </p:spTree>
     <p:extLst>
       <p:ext uri="{BB962C8B-B14F-4D97-AF65-F5344CB8AC3E}">
-        <p14:creationId xmlns:p14="http://schemas.microsoft.com/office/powerpoint/2010/main" val="2268232388"/>
+        <p14:creationId xmlns:p14="http://schemas.microsoft.com/office/powerpoint/2010/main" xmlns="" val="2268232388"/>
       </p:ext>
     </p:extLst>
   </p:cSld>
@@ -3553,7 +3553,7 @@
     </p:spTree>
     <p:extLst>
       <p:ext uri="{BB962C8B-B14F-4D97-AF65-F5344CB8AC3E}">
-        <p14:creationId xmlns:p14="http://schemas.microsoft.com/office/powerpoint/2010/main" val="1089514898"/>
+        <p14:creationId xmlns:p14="http://schemas.microsoft.com/office/powerpoint/2010/main" xmlns="" val="1089514898"/>
       </p:ext>
     </p:extLst>
   </p:cSld>
@@ -3678,6 +3678,7 @@
                     <a:lumOff val="50000"/>
                   </a:schemeClr>
                 </a:solidFill>
+                <a:latin typeface="Sitka Banner" pitchFamily="2" charset="0"/>
               </a:rPr>
               <a:t>“…</a:t>
             </a:r>
@@ -3689,6 +3690,7 @@
                     <a:lumOff val="50000"/>
                   </a:schemeClr>
                 </a:solidFill>
+                <a:latin typeface="Sitka Banner" pitchFamily="2" charset="0"/>
               </a:rPr>
               <a:t>after</a:t>
             </a:r>
@@ -3700,6 +3702,7 @@
                     <a:lumOff val="50000"/>
                   </a:schemeClr>
                 </a:solidFill>
+                <a:latin typeface="Sitka Banner" pitchFamily="2" charset="0"/>
               </a:rPr>
               <a:t> </a:t>
             </a:r>
@@ -3711,6 +3714,7 @@
                     <a:lumOff val="50000"/>
                   </a:schemeClr>
                 </a:solidFill>
+                <a:latin typeface="Sitka Banner" pitchFamily="2" charset="0"/>
               </a:rPr>
               <a:t>the</a:t>
             </a:r>
@@ -3722,6 +3726,7 @@
                     <a:lumOff val="50000"/>
                   </a:schemeClr>
                 </a:solidFill>
+                <a:latin typeface="Sitka Banner" pitchFamily="2" charset="0"/>
               </a:rPr>
               <a:t> first patch, </a:t>
             </a:r>
@@ -3733,6 +3738,7 @@
                     <a:lumOff val="50000"/>
                   </a:schemeClr>
                 </a:solidFill>
+                <a:latin typeface="Sitka Banner" pitchFamily="2" charset="0"/>
               </a:rPr>
               <a:t>the</a:t>
             </a:r>
@@ -3744,6 +3750,7 @@
                     <a:lumOff val="50000"/>
                   </a:schemeClr>
                 </a:solidFill>
+                <a:latin typeface="Sitka Banner" pitchFamily="2" charset="0"/>
               </a:rPr>
               <a:t> tag of </a:t>
             </a:r>
@@ -3755,6 +3762,7 @@
                     <a:lumOff val="50000"/>
                   </a:schemeClr>
                 </a:solidFill>
+                <a:latin typeface="Sitka Banner" pitchFamily="2" charset="0"/>
               </a:rPr>
               <a:t>the</a:t>
             </a:r>
@@ -3766,6 +3774,7 @@
                     <a:lumOff val="50000"/>
                   </a:schemeClr>
                 </a:solidFill>
+                <a:latin typeface="Sitka Banner" pitchFamily="2" charset="0"/>
               </a:rPr>
               <a:t> bug report at </a:t>
             </a:r>
@@ -3777,6 +3786,7 @@
                     <a:lumOff val="50000"/>
                   </a:schemeClr>
                 </a:solidFill>
+                <a:latin typeface="Sitka Banner" pitchFamily="2" charset="0"/>
               </a:rPr>
               <a:t>stake</a:t>
             </a:r>
@@ -3788,6 +3798,7 @@
                     <a:lumOff val="50000"/>
                   </a:schemeClr>
                 </a:solidFill>
+                <a:latin typeface="Sitka Banner" pitchFamily="2" charset="0"/>
               </a:rPr>
               <a:t> </a:t>
             </a:r>
@@ -3799,6 +3810,7 @@
                     <a:lumOff val="50000"/>
                   </a:schemeClr>
                 </a:solidFill>
+                <a:latin typeface="Sitka Banner" pitchFamily="2" charset="0"/>
               </a:rPr>
               <a:t>transitions</a:t>
             </a:r>
@@ -3810,6 +3822,7 @@
                     <a:lumOff val="50000"/>
                   </a:schemeClr>
                 </a:solidFill>
+                <a:latin typeface="Sitka Banner" pitchFamily="2" charset="0"/>
               </a:rPr>
               <a:t> </a:t>
             </a:r>
@@ -3821,6 +3834,7 @@
                     <a:lumOff val="50000"/>
                   </a:schemeClr>
                 </a:solidFill>
+                <a:latin typeface="Sitka Banner" pitchFamily="2" charset="0"/>
               </a:rPr>
               <a:t>from</a:t>
             </a:r>
@@ -3832,6 +3846,7 @@
                     <a:lumOff val="50000"/>
                   </a:schemeClr>
                 </a:solidFill>
+                <a:latin typeface="Sitka Banner" pitchFamily="2" charset="0"/>
               </a:rPr>
               <a:t> </a:t>
             </a:r>
@@ -3843,6 +3858,7 @@
                     <a:lumOff val="50000"/>
                   </a:schemeClr>
                 </a:solidFill>
+                <a:latin typeface="Sitka Banner" pitchFamily="2" charset="0"/>
               </a:rPr>
               <a:t>Assigned</a:t>
             </a:r>
@@ -3854,6 +3870,7 @@
                     <a:lumOff val="50000"/>
                   </a:schemeClr>
                 </a:solidFill>
+                <a:latin typeface="Sitka Banner" pitchFamily="2" charset="0"/>
               </a:rPr>
               <a:t> </a:t>
             </a:r>
@@ -3865,6 +3882,7 @@
                     <a:lumOff val="50000"/>
                   </a:schemeClr>
                 </a:solidFill>
+                <a:latin typeface="Sitka Banner" pitchFamily="2" charset="0"/>
               </a:rPr>
               <a:t>to</a:t>
             </a:r>
@@ -3876,6 +3894,7 @@
                     <a:lumOff val="50000"/>
                   </a:schemeClr>
                 </a:solidFill>
+                <a:latin typeface="Sitka Banner" pitchFamily="2" charset="0"/>
               </a:rPr>
               <a:t> </a:t>
             </a:r>
@@ -3887,6 +3906,7 @@
                     <a:lumOff val="50000"/>
                   </a:schemeClr>
                 </a:solidFill>
+                <a:latin typeface="Sitka Banner" pitchFamily="2" charset="0"/>
               </a:rPr>
               <a:t>UnderReview</a:t>
             </a:r>
@@ -3898,6 +3918,7 @@
                     <a:lumOff val="50000"/>
                   </a:schemeClr>
                 </a:solidFill>
+                <a:latin typeface="Sitka Banner" pitchFamily="2" charset="0"/>
               </a:rPr>
               <a:t>.”</a:t>
             </a:r>
@@ -3908,6 +3929,7 @@
                   <a:lumOff val="50000"/>
                 </a:schemeClr>
               </a:solidFill>
+              <a:latin typeface="Sitka Banner" pitchFamily="2" charset="0"/>
             </a:endParaRPr>
           </a:p>
         </p:txBody>
@@ -3936,7 +3958,7 @@
             </a:clrChange>
             <a:extLst>
               <a:ext uri="{28A0092B-C50C-407E-A947-70E740481C1C}">
-                <a14:useLocalDpi xmlns:a14="http://schemas.microsoft.com/office/drawing/2010/main" val="0"/>
+                <a14:useLocalDpi xmlns:a14="http://schemas.microsoft.com/office/drawing/2010/main" xmlns="" val="0"/>
               </a:ext>
             </a:extLst>
           </a:blip>
@@ -4020,6 +4042,7 @@
                     <a:lumOff val="50000"/>
                   </a:schemeClr>
                 </a:solidFill>
+                <a:latin typeface="Sitka Banner" pitchFamily="2" charset="0"/>
               </a:rPr>
               <a:t>“</a:t>
             </a:r>
@@ -4031,6 +4054,7 @@
                     <a:lumOff val="50000"/>
                   </a:schemeClr>
                 </a:solidFill>
+                <a:latin typeface="Sitka Banner" pitchFamily="2" charset="0"/>
               </a:rPr>
               <a:t>When</a:t>
             </a:r>
@@ -4042,6 +4066,7 @@
                     <a:lumOff val="50000"/>
                   </a:schemeClr>
                 </a:solidFill>
+                <a:latin typeface="Sitka Banner" pitchFamily="2" charset="0"/>
               </a:rPr>
               <a:t> </a:t>
             </a:r>
@@ -4053,6 +4078,7 @@
                     <a:lumOff val="50000"/>
                   </a:schemeClr>
                 </a:solidFill>
+                <a:latin typeface="Sitka Banner" pitchFamily="2" charset="0"/>
               </a:rPr>
               <a:t>a bug report is </a:t>
             </a:r>
@@ -4064,6 +4090,7 @@
                     <a:lumOff val="50000"/>
                   </a:schemeClr>
                 </a:solidFill>
+                <a:latin typeface="Sitka Banner" pitchFamily="2" charset="0"/>
               </a:rPr>
               <a:t>created</a:t>
             </a:r>
@@ -4075,6 +4102,7 @@
                     <a:lumOff val="50000"/>
                   </a:schemeClr>
                 </a:solidFill>
+                <a:latin typeface="Sitka Banner" pitchFamily="2" charset="0"/>
               </a:rPr>
               <a:t>, </a:t>
             </a:r>
@@ -4086,6 +4114,7 @@
                     <a:lumOff val="50000"/>
                   </a:schemeClr>
                 </a:solidFill>
+                <a:latin typeface="Sitka Banner" pitchFamily="2" charset="0"/>
               </a:rPr>
               <a:t>it</a:t>
             </a:r>
@@ -4097,6 +4126,7 @@
                     <a:lumOff val="50000"/>
                   </a:schemeClr>
                 </a:solidFill>
+                <a:latin typeface="Sitka Banner" pitchFamily="2" charset="0"/>
               </a:rPr>
               <a:t> </a:t>
             </a:r>
@@ -4108,6 +4138,7 @@
                     <a:lumOff val="50000"/>
                   </a:schemeClr>
                 </a:solidFill>
+                <a:latin typeface="Sitka Banner" pitchFamily="2" charset="0"/>
               </a:rPr>
               <a:t>can</a:t>
             </a:r>
@@ -4119,6 +4150,7 @@
                     <a:lumOff val="50000"/>
                   </a:schemeClr>
                 </a:solidFill>
+                <a:latin typeface="Sitka Banner" pitchFamily="2" charset="0"/>
               </a:rPr>
               <a:t> </a:t>
             </a:r>
@@ -4130,6 +4162,7 @@
                     <a:lumOff val="50000"/>
                   </a:schemeClr>
                 </a:solidFill>
+                <a:latin typeface="Sitka Banner" pitchFamily="2" charset="0"/>
               </a:rPr>
               <a:t>be</a:t>
             </a:r>
@@ -4141,6 +4174,7 @@
                     <a:lumOff val="50000"/>
                   </a:schemeClr>
                 </a:solidFill>
+                <a:latin typeface="Sitka Banner" pitchFamily="2" charset="0"/>
               </a:rPr>
               <a:t> </a:t>
             </a:r>
@@ -4152,6 +4186,7 @@
                     <a:lumOff val="50000"/>
                   </a:schemeClr>
                 </a:solidFill>
+                <a:latin typeface="Sitka Banner" pitchFamily="2" charset="0"/>
               </a:rPr>
               <a:t>marked</a:t>
             </a:r>
@@ -4163,6 +4198,7 @@
                     <a:lumOff val="50000"/>
                   </a:schemeClr>
                 </a:solidFill>
+                <a:latin typeface="Sitka Banner" pitchFamily="2" charset="0"/>
               </a:rPr>
               <a:t> as private</a:t>
             </a:r>
@@ -4174,6 +4210,7 @@
                     <a:lumOff val="50000"/>
                   </a:schemeClr>
                 </a:solidFill>
+                <a:latin typeface="Sitka Banner" pitchFamily="2" charset="0"/>
               </a:rPr>
               <a:t>. </a:t>
             </a:r>
@@ -4185,6 +4222,7 @@
                     <a:lumOff val="50000"/>
                   </a:schemeClr>
                 </a:solidFill>
+                <a:latin typeface="Sitka Banner" pitchFamily="2" charset="0"/>
               </a:rPr>
               <a:t>… </a:t>
             </a:r>
@@ -4196,6 +4234,7 @@
                     <a:lumOff val="50000"/>
                   </a:schemeClr>
                 </a:solidFill>
+                <a:latin typeface="Sitka Banner" pitchFamily="2" charset="0"/>
               </a:rPr>
               <a:t>Once</a:t>
             </a:r>
@@ -4207,6 +4246,7 @@
                     <a:lumOff val="50000"/>
                   </a:schemeClr>
                 </a:solidFill>
+                <a:latin typeface="Sitka Banner" pitchFamily="2" charset="0"/>
               </a:rPr>
               <a:t> </a:t>
             </a:r>
@@ -4218,6 +4258,7 @@
                     <a:lumOff val="50000"/>
                   </a:schemeClr>
                 </a:solidFill>
+                <a:latin typeface="Sitka Banner" pitchFamily="2" charset="0"/>
               </a:rPr>
               <a:t>the</a:t>
             </a:r>
@@ -4229,6 +4270,7 @@
                     <a:lumOff val="50000"/>
                   </a:schemeClr>
                 </a:solidFill>
+                <a:latin typeface="Sitka Banner" pitchFamily="2" charset="0"/>
               </a:rPr>
               <a:t> first patch is </a:t>
             </a:r>
@@ -4240,6 +4282,7 @@
                     <a:lumOff val="50000"/>
                   </a:schemeClr>
                 </a:solidFill>
+                <a:latin typeface="Sitka Banner" pitchFamily="2" charset="0"/>
               </a:rPr>
               <a:t>submitted</a:t>
             </a:r>
@@ -4251,6 +4294,7 @@
                     <a:lumOff val="50000"/>
                   </a:schemeClr>
                 </a:solidFill>
+                <a:latin typeface="Sitka Banner" pitchFamily="2" charset="0"/>
               </a:rPr>
               <a:t> </a:t>
             </a:r>
@@ -4262,6 +4306,7 @@
                     <a:lumOff val="50000"/>
                   </a:schemeClr>
                 </a:solidFill>
+                <a:latin typeface="Sitka Banner" pitchFamily="2" charset="0"/>
               </a:rPr>
               <a:t>for</a:t>
             </a:r>
@@ -4273,6 +4318,7 @@
                     <a:lumOff val="50000"/>
                   </a:schemeClr>
                 </a:solidFill>
+                <a:latin typeface="Sitka Banner" pitchFamily="2" charset="0"/>
               </a:rPr>
               <a:t> </a:t>
             </a:r>
@@ -4284,6 +4330,7 @@
                     <a:lumOff val="50000"/>
                   </a:schemeClr>
                 </a:solidFill>
+                <a:latin typeface="Sitka Banner" pitchFamily="2" charset="0"/>
               </a:rPr>
               <a:t>the</a:t>
             </a:r>
@@ -4295,6 +4342,7 @@
                     <a:lumOff val="50000"/>
                   </a:schemeClr>
                 </a:solidFill>
+                <a:latin typeface="Sitka Banner" pitchFamily="2" charset="0"/>
               </a:rPr>
               <a:t> bug report, </a:t>
             </a:r>
@@ -4306,6 +4354,7 @@
                     <a:lumOff val="50000"/>
                   </a:schemeClr>
                 </a:solidFill>
+                <a:latin typeface="Sitka Banner" pitchFamily="2" charset="0"/>
               </a:rPr>
               <a:t>it</a:t>
             </a:r>
@@ -4317,6 +4366,7 @@
                     <a:lumOff val="50000"/>
                   </a:schemeClr>
                 </a:solidFill>
+                <a:latin typeface="Sitka Banner" pitchFamily="2" charset="0"/>
               </a:rPr>
               <a:t> is </a:t>
             </a:r>
@@ -4328,6 +4378,7 @@
                     <a:lumOff val="50000"/>
                   </a:schemeClr>
                 </a:solidFill>
+                <a:latin typeface="Sitka Banner" pitchFamily="2" charset="0"/>
               </a:rPr>
               <a:t>visible</a:t>
             </a:r>
@@ -4339,6 +4390,7 @@
                     <a:lumOff val="50000"/>
                   </a:schemeClr>
                 </a:solidFill>
+                <a:latin typeface="Sitka Banner" pitchFamily="2" charset="0"/>
               </a:rPr>
               <a:t> </a:t>
             </a:r>
@@ -4350,6 +4402,7 @@
                     <a:lumOff val="50000"/>
                   </a:schemeClr>
                 </a:solidFill>
+                <a:latin typeface="Sitka Banner" pitchFamily="2" charset="0"/>
               </a:rPr>
               <a:t>for</a:t>
             </a:r>
@@ -4361,6 +4414,7 @@
                     <a:lumOff val="50000"/>
                   </a:schemeClr>
                 </a:solidFill>
+                <a:latin typeface="Sitka Banner" pitchFamily="2" charset="0"/>
               </a:rPr>
               <a:t> </a:t>
             </a:r>
@@ -4372,6 +4426,7 @@
                     <a:lumOff val="50000"/>
                   </a:schemeClr>
                 </a:solidFill>
+                <a:latin typeface="Sitka Banner" pitchFamily="2" charset="0"/>
               </a:rPr>
               <a:t>all</a:t>
             </a:r>
@@ -4383,6 +4438,7 @@
                     <a:lumOff val="50000"/>
                   </a:schemeClr>
                 </a:solidFill>
+                <a:latin typeface="Sitka Banner" pitchFamily="2" charset="0"/>
               </a:rPr>
               <a:t> </a:t>
             </a:r>
@@ -4394,6 +4450,7 @@
                     <a:lumOff val="50000"/>
                   </a:schemeClr>
                 </a:solidFill>
+                <a:latin typeface="Sitka Banner" pitchFamily="2" charset="0"/>
               </a:rPr>
               <a:t>the</a:t>
             </a:r>
@@ -4405,6 +4462,7 @@
                     <a:lumOff val="50000"/>
                   </a:schemeClr>
                 </a:solidFill>
+                <a:latin typeface="Sitka Banner" pitchFamily="2" charset="0"/>
               </a:rPr>
               <a:t> users of </a:t>
             </a:r>
@@ -4416,6 +4474,7 @@
                     <a:lumOff val="50000"/>
                   </a:schemeClr>
                 </a:solidFill>
+                <a:latin typeface="Sitka Banner" pitchFamily="2" charset="0"/>
               </a:rPr>
               <a:t>BugTrap</a:t>
             </a:r>
@@ -4427,6 +4486,7 @@
                     <a:lumOff val="50000"/>
                   </a:schemeClr>
                 </a:solidFill>
+                <a:latin typeface="Sitka Banner" pitchFamily="2" charset="0"/>
               </a:rPr>
               <a:t>.”</a:t>
             </a:r>
@@ -4437,6 +4497,7 @@
                   <a:lumOff val="50000"/>
                 </a:schemeClr>
               </a:solidFill>
+              <a:latin typeface="Sitka Banner" pitchFamily="2" charset="0"/>
             </a:endParaRPr>
           </a:p>
         </p:txBody>
@@ -4444,7 +4505,7 @@
     </p:spTree>
     <p:extLst>
       <p:ext uri="{BB962C8B-B14F-4D97-AF65-F5344CB8AC3E}">
-        <p14:creationId xmlns:p14="http://schemas.microsoft.com/office/powerpoint/2010/main" val="269333384"/>
+        <p14:creationId xmlns:p14="http://schemas.microsoft.com/office/powerpoint/2010/main" xmlns="" val="269333384"/>
       </p:ext>
     </p:extLst>
   </p:cSld>
@@ -4510,8 +4571,47 @@
                 </a:effectLst>
                 <a:latin typeface="Sitka Text" pitchFamily="2" charset="0"/>
               </a:rPr>
-              <a:t>Tag specifieke informatie</a:t>
-            </a:r>
+              <a:t>Tag </a:t>
+            </a:r>
+            <a:r>
+              <a:rPr lang="nl-NL" sz="3600" cap="small" dirty="0" smtClean="0">
+                <a:ln w="18415" cmpd="sng">
+                  <a:solidFill>
+                    <a:schemeClr val="tx1">
+                      <a:alpha val="0"/>
+                    </a:schemeClr>
+                  </a:solidFill>
+                  <a:prstDash val="solid"/>
+                </a:ln>
+                <a:effectLst>
+                  <a:outerShdw blurRad="25400" dir="3600000" algn="tl" rotWithShape="0">
+                    <a:srgbClr val="000000">
+                      <a:alpha val="70000"/>
+                    </a:srgbClr>
+                  </a:outerShdw>
+                </a:effectLst>
+                <a:latin typeface="Sitka Text" pitchFamily="2" charset="0"/>
+              </a:rPr>
+              <a:t>specific infromation</a:t>
+            </a:r>
+            <a:endParaRPr lang="nl-NL" sz="3600" cap="small" dirty="0">
+              <a:ln w="18415" cmpd="sng">
+                <a:solidFill>
+                  <a:schemeClr val="tx1">
+                    <a:alpha val="0"/>
+                  </a:schemeClr>
+                </a:solidFill>
+                <a:prstDash val="solid"/>
+              </a:ln>
+              <a:effectLst>
+                <a:outerShdw blurRad="25400" dir="3600000" algn="tl" rotWithShape="0">
+                  <a:srgbClr val="000000">
+                    <a:alpha val="70000"/>
+                  </a:srgbClr>
+                </a:outerShdw>
+              </a:effectLst>
+              <a:latin typeface="Sitka Text" pitchFamily="2" charset="0"/>
+            </a:endParaRPr>
           </a:p>
         </p:txBody>
       </p:sp>
@@ -4523,8 +4623,8 @@
         </p:nvSpPr>
         <p:spPr>
           <a:xfrm>
-            <a:off x="5156224" y="1568559"/>
-            <a:ext cx="3525441" cy="1477328"/>
+            <a:off x="2809280" y="1580599"/>
+            <a:ext cx="3525441" cy="1200329"/>
           </a:xfrm>
           <a:prstGeom prst="rect">
             <a:avLst/>
@@ -4545,6 +4645,7 @@
                     <a:lumOff val="50000"/>
                   </a:schemeClr>
                 </a:solidFill>
+                <a:latin typeface="Sitka Banner" pitchFamily="2" charset="0"/>
               </a:rPr>
               <a:t>“As a </a:t>
             </a:r>
@@ -4556,6 +4657,7 @@
                     <a:lumOff val="50000"/>
                   </a:schemeClr>
                 </a:solidFill>
+                <a:latin typeface="Sitka Banner" pitchFamily="2" charset="0"/>
               </a:rPr>
               <a:t>final</a:t>
             </a:r>
@@ -4567,6 +4669,7 @@
                     <a:lumOff val="50000"/>
                   </a:schemeClr>
                 </a:solidFill>
+                <a:latin typeface="Sitka Banner" pitchFamily="2" charset="0"/>
               </a:rPr>
               <a:t> step, </a:t>
             </a:r>
@@ -4578,6 +4681,7 @@
                     <a:lumOff val="50000"/>
                   </a:schemeClr>
                 </a:solidFill>
+                <a:latin typeface="Sitka Banner" pitchFamily="2" charset="0"/>
               </a:rPr>
               <a:t>the</a:t>
             </a:r>
@@ -4589,6 +4693,7 @@
                     <a:lumOff val="50000"/>
                   </a:schemeClr>
                 </a:solidFill>
+                <a:latin typeface="Sitka Banner" pitchFamily="2" charset="0"/>
               </a:rPr>
               <a:t> </a:t>
             </a:r>
@@ -4600,6 +4705,7 @@
                     <a:lumOff val="50000"/>
                   </a:schemeClr>
                 </a:solidFill>
+                <a:latin typeface="Sitka Banner" pitchFamily="2" charset="0"/>
               </a:rPr>
               <a:t>creator</a:t>
             </a:r>
@@ -4611,6 +4717,7 @@
                     <a:lumOff val="50000"/>
                   </a:schemeClr>
                 </a:solidFill>
+                <a:latin typeface="Sitka Banner" pitchFamily="2" charset="0"/>
               </a:rPr>
               <a:t> of a </a:t>
             </a:r>
@@ -4622,6 +4729,7 @@
                     <a:lumOff val="50000"/>
                   </a:schemeClr>
                 </a:solidFill>
+                <a:latin typeface="Sitka Banner" pitchFamily="2" charset="0"/>
               </a:rPr>
               <a:t>resolved</a:t>
             </a:r>
@@ -4633,6 +4741,7 @@
                     <a:lumOff val="50000"/>
                   </a:schemeClr>
                 </a:solidFill>
+                <a:latin typeface="Sitka Banner" pitchFamily="2" charset="0"/>
               </a:rPr>
               <a:t> bug report </a:t>
             </a:r>
@@ -4644,6 +4753,7 @@
                     <a:lumOff val="50000"/>
                   </a:schemeClr>
                 </a:solidFill>
+                <a:latin typeface="Sitka Banner" pitchFamily="2" charset="0"/>
               </a:rPr>
               <a:t>can</a:t>
             </a:r>
@@ -4655,6 +4765,7 @@
                     <a:lumOff val="50000"/>
                   </a:schemeClr>
                 </a:solidFill>
+                <a:latin typeface="Sitka Banner" pitchFamily="2" charset="0"/>
               </a:rPr>
               <a:t> close </a:t>
             </a:r>
@@ -4666,6 +4777,7 @@
                     <a:lumOff val="50000"/>
                   </a:schemeClr>
                 </a:solidFill>
+                <a:latin typeface="Sitka Banner" pitchFamily="2" charset="0"/>
               </a:rPr>
               <a:t>it</a:t>
             </a:r>
@@ -4677,6 +4789,7 @@
                     <a:lumOff val="50000"/>
                   </a:schemeClr>
                 </a:solidFill>
+                <a:latin typeface="Sitka Banner" pitchFamily="2" charset="0"/>
               </a:rPr>
               <a:t> (i.e. </a:t>
             </a:r>
@@ -4688,6 +4801,7 @@
                     <a:lumOff val="50000"/>
                   </a:schemeClr>
                 </a:solidFill>
+                <a:latin typeface="Sitka Banner" pitchFamily="2" charset="0"/>
               </a:rPr>
               <a:t>assign</a:t>
             </a:r>
@@ -4699,6 +4813,7 @@
                     <a:lumOff val="50000"/>
                   </a:schemeClr>
                 </a:solidFill>
+                <a:latin typeface="Sitka Banner" pitchFamily="2" charset="0"/>
               </a:rPr>
               <a:t> </a:t>
             </a:r>
@@ -4710,6 +4825,7 @@
                     <a:lumOff val="50000"/>
                   </a:schemeClr>
                 </a:solidFill>
+                <a:latin typeface="Sitka Banner" pitchFamily="2" charset="0"/>
               </a:rPr>
               <a:t>the</a:t>
             </a:r>
@@ -4721,6 +4837,7 @@
                     <a:lumOff val="50000"/>
                   </a:schemeClr>
                 </a:solidFill>
+                <a:latin typeface="Sitka Banner" pitchFamily="2" charset="0"/>
               </a:rPr>
               <a:t> tag Closed) </a:t>
             </a:r>
@@ -4732,6 +4849,7 @@
                     <a:lumOff val="50000"/>
                   </a:schemeClr>
                 </a:solidFill>
+                <a:latin typeface="Sitka Banner" pitchFamily="2" charset="0"/>
               </a:rPr>
               <a:t>by</a:t>
             </a:r>
@@ -4743,6 +4861,7 @@
                     <a:lumOff val="50000"/>
                   </a:schemeClr>
                 </a:solidFill>
+                <a:latin typeface="Sitka Banner" pitchFamily="2" charset="0"/>
               </a:rPr>
               <a:t> </a:t>
             </a:r>
@@ -4754,6 +4873,7 @@
                     <a:lumOff val="50000"/>
                   </a:schemeClr>
                 </a:solidFill>
+                <a:latin typeface="Sitka Banner" pitchFamily="2" charset="0"/>
               </a:rPr>
               <a:t>specifying</a:t>
             </a:r>
@@ -4765,6 +4885,7 @@
                     <a:lumOff val="50000"/>
                   </a:schemeClr>
                 </a:solidFill>
+                <a:latin typeface="Sitka Banner" pitchFamily="2" charset="0"/>
               </a:rPr>
               <a:t> </a:t>
             </a:r>
@@ -4776,6 +4897,7 @@
                     <a:lumOff val="50000"/>
                   </a:schemeClr>
                 </a:solidFill>
+                <a:latin typeface="Sitka Banner" pitchFamily="2" charset="0"/>
               </a:rPr>
               <a:t>how</a:t>
             </a:r>
@@ -4787,6 +4909,7 @@
                     <a:lumOff val="50000"/>
                   </a:schemeClr>
                 </a:solidFill>
+                <a:latin typeface="Sitka Banner" pitchFamily="2" charset="0"/>
               </a:rPr>
               <a:t> </a:t>
             </a:r>
@@ -4798,6 +4921,7 @@
                     <a:lumOff val="50000"/>
                   </a:schemeClr>
                 </a:solidFill>
+                <a:latin typeface="Sitka Banner" pitchFamily="2" charset="0"/>
               </a:rPr>
               <a:t>satisfied</a:t>
             </a:r>
@@ -4809,6 +4933,7 @@
                     <a:lumOff val="50000"/>
                   </a:schemeClr>
                 </a:solidFill>
+                <a:latin typeface="Sitka Banner" pitchFamily="2" charset="0"/>
               </a:rPr>
               <a:t> he is </a:t>
             </a:r>
@@ -4820,6 +4945,7 @@
                     <a:lumOff val="50000"/>
                   </a:schemeClr>
                 </a:solidFill>
+                <a:latin typeface="Sitka Banner" pitchFamily="2" charset="0"/>
               </a:rPr>
               <a:t>with</a:t>
             </a:r>
@@ -4831,6 +4957,7 @@
                     <a:lumOff val="50000"/>
                   </a:schemeClr>
                 </a:solidFill>
+                <a:latin typeface="Sitka Banner" pitchFamily="2" charset="0"/>
               </a:rPr>
               <a:t> </a:t>
             </a:r>
@@ -4842,6 +4969,7 @@
                     <a:lumOff val="50000"/>
                   </a:schemeClr>
                 </a:solidFill>
+                <a:latin typeface="Sitka Banner" pitchFamily="2" charset="0"/>
               </a:rPr>
               <a:t>the</a:t>
             </a:r>
@@ -4853,6 +4981,7 @@
                     <a:lumOff val="50000"/>
                   </a:schemeClr>
                 </a:solidFill>
+                <a:latin typeface="Sitka Banner" pitchFamily="2" charset="0"/>
               </a:rPr>
               <a:t> solution.”</a:t>
             </a:r>
@@ -4881,7 +5010,7 @@
             </a:clrChange>
             <a:extLst>
               <a:ext uri="{28A0092B-C50C-407E-A947-70E740481C1C}">
-                <a14:useLocalDpi xmlns:a14="http://schemas.microsoft.com/office/drawing/2010/main" val="0"/>
+                <a14:useLocalDpi xmlns:a14="http://schemas.microsoft.com/office/drawing/2010/main" xmlns="" val="0"/>
               </a:ext>
             </a:extLst>
           </a:blip>
@@ -4891,7 +5020,7 @@
         </p:blipFill>
         <p:spPr>
           <a:xfrm>
-            <a:off x="107504" y="3259615"/>
+            <a:off x="107504" y="3403631"/>
             <a:ext cx="8964488" cy="2617657"/>
           </a:xfrm>
           <a:prstGeom prst="rect">
@@ -4902,7 +5031,7 @@
     </p:spTree>
     <p:extLst>
       <p:ext uri="{BB962C8B-B14F-4D97-AF65-F5344CB8AC3E}">
-        <p14:creationId xmlns:p14="http://schemas.microsoft.com/office/powerpoint/2010/main" val="1938140659"/>
+        <p14:creationId xmlns:p14="http://schemas.microsoft.com/office/powerpoint/2010/main" xmlns="" val="1938140659"/>
       </p:ext>
     </p:extLst>
   </p:cSld>
@@ -5024,8 +5153,8 @@
         </p:nvSpPr>
         <p:spPr>
           <a:xfrm>
-            <a:off x="457200" y="1600200"/>
-            <a:ext cx="8229600" cy="4525963"/>
+            <a:off x="395536" y="2060848"/>
+            <a:ext cx="4186808" cy="3672408"/>
           </a:xfrm>
         </p:spPr>
         <p:txBody>
@@ -5038,51 +5167,33 @@
               <a:buNone/>
             </a:pPr>
             <a:r>
-              <a:rPr lang="nl-BE" sz="2800" dirty="0" err="1" smtClean="0">
-                <a:latin typeface="Sitka Display" pitchFamily="2" charset="0"/>
-              </a:rPr>
-              <a:t>Milestone</a:t>
-            </a:r>
-            <a:r>
-              <a:rPr lang="nl-BE" sz="2800" dirty="0" smtClean="0">
-                <a:latin typeface="Sitka Display" pitchFamily="2" charset="0"/>
-              </a:rPr>
-              <a:t> = apart object</a:t>
+              <a:rPr lang="nl-BE" sz="2000" dirty="0" smtClean="0">
+                <a:latin typeface="Sitka Banner" pitchFamily="2" charset="0"/>
+              </a:rPr>
+              <a:t>Milestone = apart object</a:t>
             </a:r>
             <a:br>
-              <a:rPr lang="nl-BE" sz="2800" dirty="0" smtClean="0">
-                <a:latin typeface="Sitka Display" pitchFamily="2" charset="0"/>
+              <a:rPr lang="nl-BE" sz="2000" dirty="0" smtClean="0">
+                <a:latin typeface="Sitka Banner" pitchFamily="2" charset="0"/>
               </a:rPr>
             </a:br>
             <a:r>
-              <a:rPr lang="nl-BE" sz="2800" dirty="0" smtClean="0">
-                <a:latin typeface="Sitka Display" pitchFamily="2" charset="0"/>
+              <a:rPr lang="nl-BE" sz="2000" dirty="0" smtClean="0">
+                <a:latin typeface="Sitka Banner" pitchFamily="2" charset="0"/>
               </a:rPr>
               <a:t>Toegewezen aan project, </a:t>
             </a:r>
             <a:r>
-              <a:rPr lang="nl-BE" sz="2800" dirty="0" err="1" smtClean="0">
-                <a:latin typeface="Sitka Display" pitchFamily="2" charset="0"/>
-              </a:rPr>
-              <a:t>subsystem</a:t>
-            </a:r>
-            <a:r>
-              <a:rPr lang="nl-BE" sz="2800" dirty="0" smtClean="0">
-                <a:latin typeface="Sitka Display" pitchFamily="2" charset="0"/>
-              </a:rPr>
-              <a:t> of bug report (Target </a:t>
-            </a:r>
-            <a:r>
-              <a:rPr lang="nl-BE" sz="2800" dirty="0" err="1" smtClean="0">
-                <a:latin typeface="Sitka Display" pitchFamily="2" charset="0"/>
-              </a:rPr>
-              <a:t>milestone</a:t>
-            </a:r>
-            <a:r>
-              <a:rPr lang="nl-BE" sz="2800" dirty="0" smtClean="0">
-                <a:latin typeface="Sitka Display" pitchFamily="2" charset="0"/>
-              </a:rPr>
-              <a:t>)</a:t>
+              <a:rPr lang="nl-BE" sz="2000" dirty="0" smtClean="0">
+                <a:latin typeface="Sitka Banner" pitchFamily="2" charset="0"/>
+              </a:rPr>
+              <a:t>subsystem </a:t>
+            </a:r>
+            <a:r>
+              <a:rPr lang="nl-BE" sz="2000" dirty="0" smtClean="0">
+                <a:latin typeface="Sitka Banner" pitchFamily="2" charset="0"/>
+              </a:rPr>
+              <a:t>of bug report (Target milestone)</a:t>
             </a:r>
           </a:p>
           <a:p>
@@ -5090,80 +5201,40 @@
               <a:buNone/>
             </a:pPr>
             <a:r>
-              <a:rPr lang="nl-BE" sz="2800" dirty="0" smtClean="0">
-                <a:latin typeface="Sitka Display" pitchFamily="2" charset="0"/>
-              </a:rPr>
-              <a:t>Apart object voor target </a:t>
-            </a:r>
-            <a:r>
-              <a:rPr lang="nl-BE" sz="2800" dirty="0" err="1" smtClean="0">
-                <a:latin typeface="Sitka Display" pitchFamily="2" charset="0"/>
-              </a:rPr>
-              <a:t>milestone</a:t>
-            </a:r>
-            <a:r>
-              <a:rPr lang="nl-BE" sz="2800" dirty="0" smtClean="0">
-                <a:latin typeface="Sitka Display" pitchFamily="2" charset="0"/>
-              </a:rPr>
-              <a:t> </a:t>
-            </a:r>
-            <a:r>
-              <a:rPr lang="nl-BE" sz="2800" dirty="0" smtClean="0">
-                <a:latin typeface="Sitka Display" pitchFamily="2" charset="0"/>
-                <a:sym typeface="Wingdings" panose="05000000000000000000" pitchFamily="2" charset="2"/>
-              </a:rPr>
-              <a:t> is optioneel, wordt altijd geïnitialiseerd met gegeven </a:t>
-            </a:r>
-            <a:r>
-              <a:rPr lang="nl-BE" sz="2800" dirty="0" err="1" smtClean="0">
-                <a:latin typeface="Sitka Display" pitchFamily="2" charset="0"/>
-                <a:sym typeface="Wingdings" panose="05000000000000000000" pitchFamily="2" charset="2"/>
-              </a:rPr>
-              <a:t>milestone</a:t>
-            </a:r>
-            <a:r>
-              <a:rPr lang="nl-BE" sz="2800" dirty="0" smtClean="0">
-                <a:latin typeface="Sitka Display" pitchFamily="2" charset="0"/>
-                <a:sym typeface="Wingdings" panose="05000000000000000000" pitchFamily="2" charset="2"/>
-              </a:rPr>
-              <a:t> (</a:t>
-            </a:r>
-            <a:r>
-              <a:rPr lang="nl-BE" sz="2800" dirty="0" smtClean="0">
-                <a:latin typeface="Sitka Display"/>
-                <a:ea typeface="Cambria Math"/>
-                <a:sym typeface="Wingdings" panose="05000000000000000000" pitchFamily="2" charset="2"/>
-              </a:rPr>
-              <a:t>≠</a:t>
-            </a:r>
-            <a:r>
-              <a:rPr lang="nl-BE" sz="2800" dirty="0" smtClean="0">
-                <a:latin typeface="Cambria Math"/>
-                <a:ea typeface="Cambria Math"/>
-                <a:sym typeface="Wingdings" panose="05000000000000000000" pitchFamily="2" charset="2"/>
-              </a:rPr>
-              <a:t> </a:t>
-            </a:r>
-            <a:r>
-              <a:rPr lang="nl-BE" sz="2800" dirty="0" smtClean="0">
-                <a:latin typeface="Sitka Display"/>
-                <a:ea typeface="Cambria Math"/>
-                <a:sym typeface="Wingdings" panose="05000000000000000000" pitchFamily="2" charset="2"/>
-              </a:rPr>
-              <a:t>“M0”)</a:t>
-            </a:r>
+              <a:rPr lang="nl-BE" sz="2000" dirty="0" smtClean="0">
+                <a:latin typeface="Sitka Banner" pitchFamily="2" charset="0"/>
+              </a:rPr>
+              <a:t>Apart object voor target milestone </a:t>
+            </a:r>
+            <a:endParaRPr lang="nl-BE" sz="2000" dirty="0" smtClean="0">
+              <a:latin typeface="Sitka Banner" pitchFamily="2" charset="0"/>
+            </a:endParaRPr>
           </a:p>
           <a:p>
             <a:pPr marL="0" indent="0">
               <a:buNone/>
             </a:pPr>
             <a:r>
-              <a:rPr lang="nl-BE" sz="2800" dirty="0" smtClean="0">
-                <a:latin typeface="Sitka Display"/>
+              <a:rPr lang="nl-BE" sz="2000" dirty="0" smtClean="0">
+                <a:latin typeface="Sitka Banner" pitchFamily="2" charset="0"/>
+                <a:sym typeface="Wingdings" panose="05000000000000000000" pitchFamily="2" charset="2"/>
+              </a:rPr>
+              <a:t> </a:t>
+            </a:r>
+            <a:r>
+              <a:rPr lang="nl-BE" sz="2000" dirty="0" smtClean="0">
+                <a:latin typeface="Sitka Banner" pitchFamily="2" charset="0"/>
+                <a:sym typeface="Wingdings" panose="05000000000000000000" pitchFamily="2" charset="2"/>
+              </a:rPr>
+              <a:t>is optioneel, wordt altijd geïnitialiseerd met gegeven milestone (</a:t>
+            </a:r>
+            <a:r>
+              <a:rPr lang="nl-BE" sz="2000" dirty="0" smtClean="0">
+                <a:latin typeface="Sitka Banner" pitchFamily="2" charset="0"/>
                 <a:ea typeface="Cambria Math"/>
                 <a:sym typeface="Wingdings" panose="05000000000000000000" pitchFamily="2" charset="2"/>
               </a:rPr>
-              <a:t>Container  nodig voor constraints</a:t>
+              <a:t>≠ “M0”)</a:t>
             </a:r>
           </a:p>
           <a:p>
@@ -5171,38 +5242,37 @@
               <a:buNone/>
             </a:pPr>
             <a:r>
-              <a:rPr lang="nl-BE" sz="2800" dirty="0" smtClean="0">
-                <a:latin typeface="Sitka Display"/>
+              <a:rPr lang="nl-BE" sz="2000" dirty="0" smtClean="0">
+                <a:latin typeface="Sitka Banner" pitchFamily="2" charset="0"/>
                 <a:ea typeface="Cambria Math"/>
                 <a:sym typeface="Wingdings" panose="05000000000000000000" pitchFamily="2" charset="2"/>
               </a:rPr>
-              <a:t>Helper  checken van constraints</a:t>
-            </a:r>
-            <a:endParaRPr lang="nl-BE" sz="2800" dirty="0" smtClean="0">
-              <a:latin typeface="Sitka Display" pitchFamily="2" charset="0"/>
-            </a:endParaRPr>
+              <a:t>Container  nodig voor constraints</a:t>
+            </a:r>
           </a:p>
           <a:p>
             <a:pPr marL="0" indent="0">
               <a:buNone/>
             </a:pPr>
-            <a:endParaRPr lang="nl-BE" sz="2800" dirty="0" smtClean="0">
-              <a:latin typeface="Sitka Display" pitchFamily="2" charset="0"/>
+            <a:r>
+              <a:rPr lang="nl-BE" sz="2000" dirty="0" smtClean="0">
+                <a:latin typeface="Sitka Banner" pitchFamily="2" charset="0"/>
+                <a:ea typeface="Cambria Math"/>
+                <a:sym typeface="Wingdings" panose="05000000000000000000" pitchFamily="2" charset="2"/>
+              </a:rPr>
+              <a:t>Helper  checken van </a:t>
+            </a:r>
+            <a:r>
+              <a:rPr lang="nl-BE" sz="2000" dirty="0" smtClean="0">
+                <a:latin typeface="Sitka Banner" pitchFamily="2" charset="0"/>
+                <a:ea typeface="Cambria Math"/>
+                <a:sym typeface="Wingdings" panose="05000000000000000000" pitchFamily="2" charset="2"/>
+              </a:rPr>
+              <a:t>constraints</a:t>
+            </a:r>
+            <a:endParaRPr lang="nl-BE" sz="2000" dirty="0" smtClean="0">
+              <a:latin typeface="Sitka Banner" pitchFamily="2" charset="0"/>
             </a:endParaRPr>
-          </a:p>
-          <a:p>
-            <a:pPr marL="0" indent="0">
-              <a:buNone/>
-            </a:pPr>
-            <a:endParaRPr lang="nl-BE" sz="2400" dirty="0" smtClean="0">
-              <a:latin typeface="Sitka Display" pitchFamily="2" charset="0"/>
-            </a:endParaRPr>
-          </a:p>
-          <a:p>
-            <a:pPr marL="0" indent="0">
-              <a:buNone/>
-            </a:pPr>
-            <a:endParaRPr lang="nl-BE" sz="2800" dirty="0"/>
           </a:p>
         </p:txBody>
       </p:sp>
@@ -5215,7 +5285,7 @@
           <p:nvPr/>
         </p:nvPicPr>
         <p:blipFill>
-          <a:blip r:embed="rId2">
+          <a:blip r:embed="rId2" cstate="print">
             <a:clrChange>
               <a:clrFrom>
                 <a:srgbClr val="FFFFFF"/>
@@ -5228,7 +5298,7 @@
             </a:clrChange>
             <a:extLst>
               <a:ext uri="{28A0092B-C50C-407E-A947-70E740481C1C}">
-                <a14:useLocalDpi xmlns:a14="http://schemas.microsoft.com/office/drawing/2010/main" val="0"/>
+                <a14:useLocalDpi xmlns:a14="http://schemas.microsoft.com/office/drawing/2010/main" xmlns="" val="0"/>
               </a:ext>
             </a:extLst>
           </a:blip>
@@ -5239,7 +5309,7 @@
         </p:blipFill>
         <p:spPr bwMode="auto">
           <a:xfrm>
-            <a:off x="4724400" y="3153544"/>
+            <a:off x="4572000" y="1772816"/>
             <a:ext cx="4391025" cy="3657600"/>
           </a:xfrm>
           <a:prstGeom prst="rect">
@@ -5248,7 +5318,7 @@
           <a:noFill/>
           <a:extLst>
             <a:ext uri="{909E8E84-426E-40DD-AFC4-6F175D3DCCD1}">
-              <a14:hiddenFill xmlns:a14="http://schemas.microsoft.com/office/drawing/2010/main">
+              <a14:hiddenFill xmlns:a14="http://schemas.microsoft.com/office/drawing/2010/main" xmlns="">
                 <a:solidFill>
                   <a:srgbClr val="FFFFFF"/>
                 </a:solidFill>
@@ -5260,7 +5330,7 @@
     </p:spTree>
     <p:extLst>
       <p:ext uri="{BB962C8B-B14F-4D97-AF65-F5344CB8AC3E}">
-        <p14:creationId xmlns:p14="http://schemas.microsoft.com/office/powerpoint/2010/main" val="378156031"/>
+        <p14:creationId xmlns:p14="http://schemas.microsoft.com/office/powerpoint/2010/main" xmlns="" val="378156031"/>
       </p:ext>
     </p:extLst>
   </p:cSld>
@@ -5327,7 +5397,7 @@
           <a:blip r:embed="rId2" cstate="print">
             <a:extLst>
               <a:ext uri="{28A0092B-C50C-407E-A947-70E740481C1C}">
-                <a14:useLocalDpi xmlns:a14="http://schemas.microsoft.com/office/drawing/2010/main" val="0"/>
+                <a14:useLocalDpi xmlns:a14="http://schemas.microsoft.com/office/drawing/2010/main" xmlns="" val="0"/>
               </a:ext>
             </a:extLst>
           </a:blip>
@@ -5345,7 +5415,7 @@
     </p:spTree>
     <p:extLst>
       <p:ext uri="{BB962C8B-B14F-4D97-AF65-F5344CB8AC3E}">
-        <p14:creationId xmlns:p14="http://schemas.microsoft.com/office/powerpoint/2010/main" val="1319242908"/>
+        <p14:creationId xmlns:p14="http://schemas.microsoft.com/office/powerpoint/2010/main" xmlns="" val="1319242908"/>
       </p:ext>
     </p:extLst>
   </p:cSld>
@@ -5412,7 +5482,7 @@
           <a:blip r:embed="rId2" cstate="print">
             <a:extLst>
               <a:ext uri="{28A0092B-C50C-407E-A947-70E740481C1C}">
-                <a14:useLocalDpi xmlns:a14="http://schemas.microsoft.com/office/drawing/2010/main" val="0"/>
+                <a14:useLocalDpi xmlns:a14="http://schemas.microsoft.com/office/drawing/2010/main" xmlns="" val="0"/>
               </a:ext>
             </a:extLst>
           </a:blip>
@@ -5430,7 +5500,7 @@
     </p:spTree>
     <p:extLst>
       <p:ext uri="{BB962C8B-B14F-4D97-AF65-F5344CB8AC3E}">
-        <p14:creationId xmlns:p14="http://schemas.microsoft.com/office/powerpoint/2010/main" val="1968202226"/>
+        <p14:creationId xmlns:p14="http://schemas.microsoft.com/office/powerpoint/2010/main" xmlns="" val="1968202226"/>
       </p:ext>
     </p:extLst>
   </p:cSld>
@@ -5531,27 +5601,36 @@
         </p:nvSpPr>
         <p:spPr>
           <a:xfrm>
-            <a:off x="539552" y="1844824"/>
+            <a:off x="539552" y="1556792"/>
             <a:ext cx="8229600" cy="4525963"/>
           </a:xfrm>
         </p:spPr>
         <p:txBody>
           <a:bodyPr>
-            <a:normAutofit/>
+            <a:normAutofit lnSpcReduction="10000"/>
           </a:bodyPr>
           <a:lstStyle/>
           <a:p>
             <a:r>
               <a:rPr lang="en-US" sz="2400" dirty="0" smtClean="0">
-                <a:latin typeface="Sitka Display" pitchFamily="2" charset="0"/>
-              </a:rPr>
-              <a:t>It’s easier to add use cases than last time</a:t>
-            </a:r>
-          </a:p>
-          <a:p>
+                <a:latin typeface="Sitka Banner" pitchFamily="2" charset="0"/>
+              </a:rPr>
+              <a:t>Addin</a:t>
+            </a:r>
             <a:r>
               <a:rPr lang="en-US" sz="2400" dirty="0" smtClean="0">
-                <a:latin typeface="Sitka Display" pitchFamily="2" charset="0"/>
+                <a:latin typeface="Sitka Banner" pitchFamily="2" charset="0"/>
+              </a:rPr>
+              <a:t>g use cases</a:t>
+            </a:r>
+            <a:endParaRPr lang="en-US" sz="2400" dirty="0" smtClean="0">
+              <a:latin typeface="Sitka Banner" pitchFamily="2" charset="0"/>
+            </a:endParaRPr>
+          </a:p>
+          <a:p>
+            <a:r>
+              <a:rPr lang="en-US" sz="2400" dirty="0" smtClean="0">
+                <a:latin typeface="Sitka Banner" pitchFamily="2" charset="0"/>
               </a:rPr>
               <a:t>UI is still completely independent </a:t>
             </a:r>
@@ -5559,24 +5638,24 @@
           <a:p>
             <a:r>
               <a:rPr lang="en-US" sz="2400" dirty="0" smtClean="0">
-                <a:latin typeface="Sitka Display" pitchFamily="2" charset="0"/>
+                <a:latin typeface="Sitka Banner" pitchFamily="2" charset="0"/>
               </a:rPr>
               <a:t>Interface for the </a:t>
             </a:r>
             <a:r>
               <a:rPr lang="en-US" sz="2400" dirty="0" err="1" smtClean="0">
-                <a:latin typeface="Sitka Display" pitchFamily="2" charset="0"/>
+                <a:latin typeface="Sitka Banner" pitchFamily="2" charset="0"/>
               </a:rPr>
               <a:t>Initializer</a:t>
             </a:r>
             <a:endParaRPr lang="en-US" sz="2400" dirty="0" smtClean="0">
-              <a:latin typeface="Sitka Display" pitchFamily="2" charset="0"/>
+              <a:latin typeface="Sitka Banner" pitchFamily="2" charset="0"/>
             </a:endParaRPr>
           </a:p>
           <a:p>
             <a:r>
               <a:rPr lang="en-US" sz="2400" dirty="0" smtClean="0">
-                <a:latin typeface="Sitka Display" pitchFamily="2" charset="0"/>
+                <a:latin typeface="Sitka Banner" pitchFamily="2" charset="0"/>
               </a:rPr>
               <a:t>Adding constraints concerning tag</a:t>
             </a:r>
@@ -5584,15 +5663,27 @@
           <a:p>
             <a:r>
               <a:rPr lang="en-US" sz="2400" dirty="0" smtClean="0">
-                <a:latin typeface="Sitka Display" pitchFamily="2" charset="0"/>
-              </a:rPr>
-              <a:t>Adding new registration types = adding new observers</a:t>
-            </a:r>
-          </a:p>
-          <a:p>
+                <a:latin typeface="Sitka Banner" pitchFamily="2" charset="0"/>
+              </a:rPr>
+              <a:t>Adding new registration </a:t>
+            </a:r>
             <a:r>
               <a:rPr lang="en-US" sz="2400" dirty="0" smtClean="0">
-                <a:latin typeface="Sitka Display" pitchFamily="2" charset="0"/>
+                <a:latin typeface="Sitka Banner" pitchFamily="2" charset="0"/>
+              </a:rPr>
+              <a:t>types (for mailboxes) </a:t>
+            </a:r>
+            <a:r>
+              <a:rPr lang="en-US" sz="2400" dirty="0" smtClean="0">
+                <a:latin typeface="Sitka Banner" pitchFamily="2" charset="0"/>
+              </a:rPr>
+              <a:t>= adding new observers</a:t>
+            </a:r>
+          </a:p>
+          <a:p>
+            <a:r>
+              <a:rPr lang="en-US" sz="2400" dirty="0" smtClean="0">
+                <a:latin typeface="Sitka Banner" pitchFamily="2" charset="0"/>
               </a:rPr>
               <a:t>Search methods for bug reports</a:t>
             </a:r>
@@ -5600,33 +5691,35 @@
           <a:p>
             <a:r>
               <a:rPr lang="en-US" sz="2400" dirty="0" smtClean="0">
-                <a:latin typeface="Sitka Display" pitchFamily="2" charset="0"/>
+                <a:latin typeface="Sitka Banner" pitchFamily="2" charset="0"/>
               </a:rPr>
               <a:t>Adding new objects that could be undone</a:t>
             </a:r>
           </a:p>
           <a:p>
             <a:endParaRPr lang="en-US" sz="2400" dirty="0" smtClean="0">
-              <a:latin typeface="Sitka Display" pitchFamily="2" charset="0"/>
+              <a:latin typeface="Sitka Banner" pitchFamily="2" charset="0"/>
             </a:endParaRPr>
           </a:p>
           <a:p>
             <a:r>
               <a:rPr lang="en-US" sz="2400" dirty="0" smtClean="0">
-                <a:latin typeface="Sitka Display" pitchFamily="2" charset="0"/>
+                <a:latin typeface="Sitka Banner" pitchFamily="2" charset="0"/>
               </a:rPr>
               <a:t>It was easy to implement the changes from iteration 2 -&gt; great extensibility of our code from iteration 1</a:t>
             </a:r>
           </a:p>
           <a:p>
-            <a:endParaRPr lang="en-US" sz="2400" dirty="0"/>
+            <a:endParaRPr lang="en-US" sz="2400" dirty="0">
+              <a:latin typeface="Sitka Banner" pitchFamily="2" charset="0"/>
+            </a:endParaRPr>
           </a:p>
         </p:txBody>
       </p:sp>
     </p:spTree>
     <p:extLst>
       <p:ext uri="{BB962C8B-B14F-4D97-AF65-F5344CB8AC3E}">
-        <p14:creationId xmlns:p14="http://schemas.microsoft.com/office/powerpoint/2010/main" val="2444210159"/>
+        <p14:creationId xmlns:p14="http://schemas.microsoft.com/office/powerpoint/2010/main" xmlns="" val="2444210159"/>
       </p:ext>
     </p:extLst>
   </p:cSld>
@@ -5774,7 +5867,12 @@
             <p:ph idx="1"/>
           </p:nvPr>
         </p:nvSpPr>
-        <p:spPr/>
+        <p:spPr>
+          <a:xfrm>
+            <a:off x="518864" y="1600200"/>
+            <a:ext cx="8229600" cy="4525963"/>
+          </a:xfrm>
+        </p:spPr>
         <p:txBody>
           <a:bodyPr>
             <a:normAutofit/>
@@ -5783,40 +5881,40 @@
           <a:p>
             <a:r>
               <a:rPr lang="nl-BE" sz="2400" dirty="0" smtClean="0">
-                <a:latin typeface="Sitka Display" pitchFamily="2" charset="0"/>
-              </a:rPr>
-              <a:t>MailboxService creates Observers</a:t>
+                <a:latin typeface="Sitka Banner" pitchFamily="2" charset="0"/>
+              </a:rPr>
+              <a:t>Mailbox creates Observers, could be a task of the MailboxService</a:t>
             </a:r>
             <a:endParaRPr lang="nl-BE" sz="2000" dirty="0" smtClean="0">
-              <a:latin typeface="Sitka Display" pitchFamily="2" charset="0"/>
+              <a:latin typeface="Sitka Banner" pitchFamily="2" charset="0"/>
             </a:endParaRPr>
           </a:p>
           <a:p>
-            <a:endParaRPr lang="nl-BE" sz="2400" dirty="0"/>
+            <a:endParaRPr lang="nl-BE" sz="2400" dirty="0">
+              <a:latin typeface="Sitka Banner" pitchFamily="2" charset="0"/>
+            </a:endParaRPr>
           </a:p>
           <a:p>
             <a:r>
               <a:rPr lang="nl-BE" sz="2400" dirty="0" smtClean="0">
-                <a:latin typeface="Sitka Display" pitchFamily="2" charset="0"/>
-              </a:rPr>
-              <a:t>Milestone improvements in the code and structure</a:t>
+                <a:latin typeface="Sitka Banner" pitchFamily="2" charset="0"/>
+              </a:rPr>
+              <a:t>Milestone: </a:t>
+            </a:r>
+            <a:r>
+              <a:rPr lang="nl-BE" sz="2400" dirty="0" smtClean="0">
+                <a:latin typeface="Sitka Banner" pitchFamily="2" charset="0"/>
+              </a:rPr>
+              <a:t>improvements in the code and </a:t>
+            </a:r>
+            <a:r>
+              <a:rPr lang="nl-BE" sz="2400" dirty="0" smtClean="0">
+                <a:latin typeface="Sitka Banner" pitchFamily="2" charset="0"/>
+              </a:rPr>
+              <a:t>structure</a:t>
             </a:r>
             <a:endParaRPr lang="nl-BE" sz="2000" dirty="0" smtClean="0">
-              <a:latin typeface="Sitka Display" pitchFamily="2" charset="0"/>
-            </a:endParaRPr>
-          </a:p>
-          <a:p>
-            <a:endParaRPr lang="nl-BE" sz="2400" dirty="0"/>
-          </a:p>
-          <a:p>
-            <a:r>
-              <a:rPr lang="nl-BE" sz="2400" dirty="0" smtClean="0">
-                <a:latin typeface="Sitka Display" pitchFamily="2" charset="0"/>
-              </a:rPr>
-              <a:t>Setters &amp; Getters</a:t>
-            </a:r>
-            <a:endParaRPr lang="nl-BE" sz="2000" dirty="0" smtClean="0">
-              <a:latin typeface="Sitka Display" pitchFamily="2" charset="0"/>
+              <a:latin typeface="Sitka Banner" pitchFamily="2" charset="0"/>
             </a:endParaRPr>
           </a:p>
         </p:txBody>
@@ -5824,7 +5922,7 @@
     </p:spTree>
     <p:extLst>
       <p:ext uri="{BB962C8B-B14F-4D97-AF65-F5344CB8AC3E}">
-        <p14:creationId xmlns:p14="http://schemas.microsoft.com/office/powerpoint/2010/main" val="674970378"/>
+        <p14:creationId xmlns:p14="http://schemas.microsoft.com/office/powerpoint/2010/main" xmlns="" val="674970378"/>
       </p:ext>
     </p:extLst>
   </p:cSld>
@@ -5989,7 +6087,7 @@
     </p:spTree>
     <p:extLst>
       <p:ext uri="{BB962C8B-B14F-4D97-AF65-F5344CB8AC3E}">
-        <p14:creationId xmlns:p14="http://schemas.microsoft.com/office/powerpoint/2010/main" val="996989477"/>
+        <p14:creationId xmlns:p14="http://schemas.microsoft.com/office/powerpoint/2010/main" xmlns="" val="996989477"/>
       </p:ext>
     </p:extLst>
   </p:cSld>
@@ -6099,7 +6197,7 @@
           <a:blip r:embed="rId2" cstate="print">
             <a:extLst>
               <a:ext uri="{28A0092B-C50C-407E-A947-70E740481C1C}">
-                <a14:useLocalDpi xmlns:a14="http://schemas.microsoft.com/office/drawing/2010/main" val="0"/>
+                <a14:useLocalDpi xmlns:a14="http://schemas.microsoft.com/office/drawing/2010/main" xmlns="" val="0"/>
               </a:ext>
             </a:extLst>
           </a:blip>
@@ -6117,7 +6215,7 @@
     </p:spTree>
     <p:extLst>
       <p:ext uri="{BB962C8B-B14F-4D97-AF65-F5344CB8AC3E}">
-        <p14:creationId xmlns:p14="http://schemas.microsoft.com/office/powerpoint/2010/main" val="3176464878"/>
+        <p14:creationId xmlns:p14="http://schemas.microsoft.com/office/powerpoint/2010/main" xmlns="" val="3176464878"/>
       </p:ext>
     </p:extLst>
   </p:cSld>
@@ -6225,7 +6323,7 @@
           <a:blip r:embed="rId2" cstate="print">
             <a:extLst>
               <a:ext uri="{28A0092B-C50C-407E-A947-70E740481C1C}">
-                <a14:useLocalDpi xmlns:a14="http://schemas.microsoft.com/office/drawing/2010/main" val="0"/>
+                <a14:useLocalDpi xmlns:a14="http://schemas.microsoft.com/office/drawing/2010/main" xmlns="" val="0"/>
               </a:ext>
             </a:extLst>
           </a:blip>
@@ -6243,7 +6341,7 @@
           <a:noFill/>
           <a:extLst>
             <a:ext uri="{909E8E84-426E-40DD-AFC4-6F175D3DCCD1}">
-              <a14:hiddenFill xmlns:a14="http://schemas.microsoft.com/office/drawing/2010/main">
+              <a14:hiddenFill xmlns:a14="http://schemas.microsoft.com/office/drawing/2010/main" xmlns="">
                 <a:solidFill>
                   <a:srgbClr val="FFFFFF"/>
                 </a:solidFill>
@@ -6255,7 +6353,7 @@
     </p:spTree>
     <p:extLst>
       <p:ext uri="{BB962C8B-B14F-4D97-AF65-F5344CB8AC3E}">
-        <p14:creationId xmlns:p14="http://schemas.microsoft.com/office/powerpoint/2010/main" val="3405605565"/>
+        <p14:creationId xmlns:p14="http://schemas.microsoft.com/office/powerpoint/2010/main" xmlns="" val="3405605565"/>
       </p:ext>
     </p:extLst>
   </p:cSld>
@@ -6365,7 +6463,7 @@
           <p:nvPr/>
         </p:nvPicPr>
         <p:blipFill>
-          <a:blip r:embed="rId2">
+          <a:blip r:embed="rId2" cstate="print">
             <a:clrChange>
               <a:clrFrom>
                 <a:srgbClr val="FFFFFF"/>
@@ -6378,7 +6476,7 @@
             </a:clrChange>
             <a:extLst>
               <a:ext uri="{28A0092B-C50C-407E-A947-70E740481C1C}">
-                <a14:useLocalDpi xmlns:a14="http://schemas.microsoft.com/office/drawing/2010/main" val="0"/>
+                <a14:useLocalDpi xmlns:a14="http://schemas.microsoft.com/office/drawing/2010/main" xmlns="" val="0"/>
               </a:ext>
             </a:extLst>
           </a:blip>
@@ -6398,7 +6496,7 @@
           <a:noFill/>
           <a:extLst>
             <a:ext uri="{909E8E84-426E-40DD-AFC4-6F175D3DCCD1}">
-              <a14:hiddenFill xmlns:a14="http://schemas.microsoft.com/office/drawing/2010/main">
+              <a14:hiddenFill xmlns:a14="http://schemas.microsoft.com/office/drawing/2010/main" xmlns="">
                 <a:solidFill>
                   <a:srgbClr val="FFFFFF"/>
                 </a:solidFill>
@@ -6410,7 +6508,7 @@
     </p:spTree>
     <p:extLst>
       <p:ext uri="{BB962C8B-B14F-4D97-AF65-F5344CB8AC3E}">
-        <p14:creationId xmlns:p14="http://schemas.microsoft.com/office/powerpoint/2010/main" val="597274065"/>
+        <p14:creationId xmlns:p14="http://schemas.microsoft.com/office/powerpoint/2010/main" xmlns="" val="597274065"/>
       </p:ext>
     </p:extLst>
   </p:cSld>
@@ -6453,7 +6551,7 @@
         <p:spPr/>
         <p:txBody>
           <a:bodyPr>
-            <a:normAutofit/>
+            <a:normAutofit fontScale="90000"/>
           </a:bodyPr>
           <a:lstStyle/>
           <a:p>
@@ -6848,7 +6946,7 @@
     </p:spTree>
     <p:extLst>
       <p:ext uri="{BB962C8B-B14F-4D97-AF65-F5344CB8AC3E}">
-        <p14:creationId xmlns:p14="http://schemas.microsoft.com/office/powerpoint/2010/main" val="1581702792"/>
+        <p14:creationId xmlns:p14="http://schemas.microsoft.com/office/powerpoint/2010/main" xmlns="" val="1581702792"/>
       </p:ext>
     </p:extLst>
   </p:cSld>
@@ -6895,7 +6993,7 @@
             <p:ph idx="1"/>
             <p:extLst>
               <p:ext uri="{D42A27DB-BD31-4B8C-83A1-F6EECF244321}">
-                <p14:modId xmlns:p14="http://schemas.microsoft.com/office/powerpoint/2010/main" val="3072315139"/>
+                <p14:modId xmlns:p14="http://schemas.microsoft.com/office/powerpoint/2010/main" xmlns="" val="3072315139"/>
               </p:ext>
             </p:extLst>
           </p:nvPr>
@@ -6914,28 +7012,28 @@
                 <a:gridCol w="2057400">
                   <a:extLst>
                     <a:ext uri="{9D8B030D-6E8A-4147-A177-3AD203B41FA5}">
-                      <a16:colId xmlns:a16="http://schemas.microsoft.com/office/drawing/2014/main" xmlns="" val="4022630451"/>
+                      <a16:colId xmlns="" xmlns:a16="http://schemas.microsoft.com/office/drawing/2014/main" val="4022630451"/>
                     </a:ext>
                   </a:extLst>
                 </a:gridCol>
                 <a:gridCol w="2057400">
                   <a:extLst>
                     <a:ext uri="{9D8B030D-6E8A-4147-A177-3AD203B41FA5}">
-                      <a16:colId xmlns:a16="http://schemas.microsoft.com/office/drawing/2014/main" xmlns="" val="1276862258"/>
+                      <a16:colId xmlns="" xmlns:a16="http://schemas.microsoft.com/office/drawing/2014/main" val="1276862258"/>
                     </a:ext>
                   </a:extLst>
                 </a:gridCol>
                 <a:gridCol w="2057400">
                   <a:extLst>
                     <a:ext uri="{9D8B030D-6E8A-4147-A177-3AD203B41FA5}">
-                      <a16:colId xmlns:a16="http://schemas.microsoft.com/office/drawing/2014/main" xmlns="" val="670422697"/>
+                      <a16:colId xmlns="" xmlns:a16="http://schemas.microsoft.com/office/drawing/2014/main" val="670422697"/>
                     </a:ext>
                   </a:extLst>
                 </a:gridCol>
                 <a:gridCol w="2057400">
                   <a:extLst>
                     <a:ext uri="{9D8B030D-6E8A-4147-A177-3AD203B41FA5}">
-                      <a16:colId xmlns:a16="http://schemas.microsoft.com/office/drawing/2014/main" xmlns="" val="3836214712"/>
+                      <a16:colId xmlns="" xmlns:a16="http://schemas.microsoft.com/office/drawing/2014/main" val="3836214712"/>
                     </a:ext>
                   </a:extLst>
                 </a:gridCol>
@@ -7007,7 +7105,7 @@
                 </a:tc>
                 <a:extLst>
                   <a:ext uri="{0D108BD9-81ED-4DB2-BD59-A6C34878D82A}">
-                    <a16:rowId xmlns:a16="http://schemas.microsoft.com/office/drawing/2014/main" xmlns="" val="2789307922"/>
+                    <a16:rowId xmlns="" xmlns:a16="http://schemas.microsoft.com/office/drawing/2014/main" val="2789307922"/>
                   </a:ext>
                 </a:extLst>
               </a:tr>
@@ -7123,7 +7221,7 @@
                 </a:tc>
                 <a:extLst>
                   <a:ext uri="{0D108BD9-81ED-4DB2-BD59-A6C34878D82A}">
-                    <a16:rowId xmlns:a16="http://schemas.microsoft.com/office/drawing/2014/main" xmlns="" val="3498730236"/>
+                    <a16:rowId xmlns="" xmlns:a16="http://schemas.microsoft.com/office/drawing/2014/main" val="3498730236"/>
                   </a:ext>
                 </a:extLst>
               </a:tr>
@@ -7194,7 +7292,7 @@
                 </a:tc>
                 <a:extLst>
                   <a:ext uri="{0D108BD9-81ED-4DB2-BD59-A6C34878D82A}">
-                    <a16:rowId xmlns:a16="http://schemas.microsoft.com/office/drawing/2014/main" xmlns="" val="4013628509"/>
+                    <a16:rowId xmlns="" xmlns:a16="http://schemas.microsoft.com/office/drawing/2014/main" val="4013628509"/>
                   </a:ext>
                 </a:extLst>
               </a:tr>
@@ -7269,7 +7367,7 @@
                 </a:tc>
                 <a:extLst>
                   <a:ext uri="{0D108BD9-81ED-4DB2-BD59-A6C34878D82A}">
-                    <a16:rowId xmlns:a16="http://schemas.microsoft.com/office/drawing/2014/main" xmlns="" val="1545046261"/>
+                    <a16:rowId xmlns="" xmlns:a16="http://schemas.microsoft.com/office/drawing/2014/main" val="1545046261"/>
                   </a:ext>
                 </a:extLst>
               </a:tr>
@@ -7360,7 +7458,7 @@
     </p:spTree>
     <p:extLst>
       <p:ext uri="{BB962C8B-B14F-4D97-AF65-F5344CB8AC3E}">
-        <p14:creationId xmlns:p14="http://schemas.microsoft.com/office/powerpoint/2010/main" val="152465229"/>
+        <p14:creationId xmlns:p14="http://schemas.microsoft.com/office/powerpoint/2010/main" xmlns="" val="152465229"/>
       </p:ext>
     </p:extLst>
   </p:cSld>
@@ -7470,7 +7568,7 @@
           <p:nvPr/>
         </p:nvPicPr>
         <p:blipFill>
-          <a:blip r:embed="rId2">
+          <a:blip r:embed="rId2" cstate="print">
             <a:clrChange>
               <a:clrFrom>
                 <a:srgbClr val="FFFFFF"/>
@@ -7483,7 +7581,7 @@
             </a:clrChange>
             <a:extLst>
               <a:ext uri="{28A0092B-C50C-407E-A947-70E740481C1C}">
-                <a14:useLocalDpi xmlns:a14="http://schemas.microsoft.com/office/drawing/2010/main" val="0"/>
+                <a14:useLocalDpi xmlns:a14="http://schemas.microsoft.com/office/drawing/2010/main" xmlns="" val="0"/>
               </a:ext>
             </a:extLst>
           </a:blip>
@@ -7503,7 +7601,7 @@
           <a:noFill/>
           <a:extLst>
             <a:ext uri="{909E8E84-426E-40DD-AFC4-6F175D3DCCD1}">
-              <a14:hiddenFill xmlns:a14="http://schemas.microsoft.com/office/drawing/2010/main">
+              <a14:hiddenFill xmlns:a14="http://schemas.microsoft.com/office/drawing/2010/main" xmlns="">
                 <a:solidFill>
                   <a:srgbClr val="FFFFFF"/>
                 </a:solidFill>
@@ -7521,7 +7619,7 @@
         <p:spPr>
           <a:xfrm>
             <a:off x="5220072" y="1094834"/>
-            <a:ext cx="3744416" cy="2352973"/>
+            <a:ext cx="3744416" cy="2290227"/>
           </a:xfrm>
           <a:prstGeom prst="roundRect">
             <a:avLst>
@@ -7552,98 +7650,80 @@
           </a:bodyPr>
           <a:lstStyle/>
           <a:p>
-            <a:pPr marL="342900" indent="-342900">
-              <a:buFont typeface="Arial" panose="020B0604020202020204" pitchFamily="34" charset="0"/>
+            <a:pPr marL="285750" indent="-285750">
+              <a:buFont typeface="Arial" pitchFamily="34" charset="0"/>
               <a:buChar char="•"/>
             </a:pPr>
             <a:r>
-              <a:rPr lang="nl-BE" sz="2400" dirty="0" smtClean="0">
-                <a:latin typeface="Sitka Display" pitchFamily="2" charset="0"/>
-              </a:rPr>
-              <a:t>Onderscheid van </a:t>
-            </a:r>
-            <a:r>
-              <a:rPr lang="nl-BE" sz="2400" dirty="0" err="1" smtClean="0">
-                <a:latin typeface="Sitka Display" pitchFamily="2" charset="0"/>
-              </a:rPr>
-              <a:t>use</a:t>
-            </a:r>
-            <a:r>
-              <a:rPr lang="nl-BE" sz="2400" dirty="0" smtClean="0">
-                <a:latin typeface="Sitka Display" pitchFamily="2" charset="0"/>
-              </a:rPr>
-              <a:t> cases in aparte packages</a:t>
-            </a:r>
-            <a:endParaRPr lang="nl-BE" sz="2400" dirty="0" smtClean="0">
-              <a:latin typeface="Sitka Display" pitchFamily="2" charset="0"/>
+              <a:rPr lang="nl-BE" sz="2000" dirty="0" smtClean="0">
+                <a:latin typeface="Sitka Banner" pitchFamily="2" charset="0"/>
+              </a:rPr>
+              <a:t>Onderscheid van use cases in aparte </a:t>
+            </a:r>
+            <a:r>
+              <a:rPr lang="nl-BE" sz="2000" dirty="0" smtClean="0">
+                <a:latin typeface="Sitka Banner" pitchFamily="2" charset="0"/>
+              </a:rPr>
+              <a:t>packages</a:t>
+            </a:r>
+            <a:endParaRPr lang="nl-BE" sz="2000" dirty="0" smtClean="0">
+              <a:latin typeface="Sitka Banner" pitchFamily="2" charset="0"/>
             </a:endParaRPr>
           </a:p>
           <a:p>
             <a:pPr marL="285750" indent="-285750">
-              <a:buFont typeface="Arial" panose="020B0604020202020204" pitchFamily="34" charset="0"/>
+              <a:buFont typeface="Arial" pitchFamily="34" charset="0"/>
               <a:buChar char="•"/>
             </a:pPr>
             <a:r>
-              <a:rPr lang="nl-BE" sz="2400" dirty="0" smtClean="0">
-                <a:latin typeface="Sitka Display" pitchFamily="2" charset="0"/>
-              </a:rPr>
-              <a:t>Uitbreiding van </a:t>
-            </a:r>
-            <a:r>
-              <a:rPr lang="nl-BE" sz="2400" dirty="0" err="1" smtClean="0">
-                <a:latin typeface="Sitka Display" pitchFamily="2" charset="0"/>
-              </a:rPr>
-              <a:t>domeinlaag</a:t>
-            </a:r>
-            <a:r>
-              <a:rPr lang="nl-BE" sz="2400" dirty="0" smtClean="0">
-                <a:latin typeface="Sitka Display" pitchFamily="2" charset="0"/>
-              </a:rPr>
-              <a:t>: Mailbox, </a:t>
-            </a:r>
-            <a:r>
-              <a:rPr lang="nl-BE" sz="2400" dirty="0" err="1" smtClean="0">
-                <a:latin typeface="Sitka Display" pitchFamily="2" charset="0"/>
+              <a:rPr lang="nl-BE" sz="2000" dirty="0" smtClean="0">
+                <a:latin typeface="Sitka Banner" pitchFamily="2" charset="0"/>
+              </a:rPr>
+              <a:t>Uitbreiding </a:t>
+            </a:r>
+            <a:r>
+              <a:rPr lang="nl-BE" sz="2000" dirty="0" smtClean="0">
+                <a:latin typeface="Sitka Banner" pitchFamily="2" charset="0"/>
+              </a:rPr>
+              <a:t>van domeinlaag: Mailbox, </a:t>
+            </a:r>
+            <a:r>
+              <a:rPr lang="nl-BE" sz="2000" dirty="0" smtClean="0">
+                <a:latin typeface="Sitka Banner" pitchFamily="2" charset="0"/>
               </a:rPr>
               <a:t>Milestone</a:t>
             </a:r>
-            <a:endParaRPr lang="nl-BE" sz="2400" dirty="0" smtClean="0">
-              <a:latin typeface="Sitka Display" pitchFamily="2" charset="0"/>
-            </a:endParaRPr>
           </a:p>
           <a:p>
             <a:pPr marL="285750" indent="-285750">
-              <a:buFont typeface="Arial" panose="020B0604020202020204" pitchFamily="34" charset="0"/>
+              <a:buFont typeface="Arial" pitchFamily="34" charset="0"/>
               <a:buChar char="•"/>
             </a:pPr>
             <a:r>
-              <a:rPr lang="nl-BE" sz="2400" dirty="0" smtClean="0">
-                <a:latin typeface="Sitka Display" pitchFamily="2" charset="0"/>
+              <a:rPr lang="nl-BE" sz="2000" dirty="0" smtClean="0">
+                <a:latin typeface="Sitka Banner" pitchFamily="2" charset="0"/>
               </a:rPr>
               <a:t>Uitbreiding </a:t>
             </a:r>
             <a:r>
-              <a:rPr lang="nl-BE" sz="2400" dirty="0" err="1" smtClean="0">
-                <a:latin typeface="Sitka Display" pitchFamily="2" charset="0"/>
-              </a:rPr>
-              <a:t>domeinlaag</a:t>
-            </a:r>
-            <a:r>
-              <a:rPr lang="nl-BE" sz="2400" dirty="0" smtClean="0">
-                <a:latin typeface="Sitka Display" pitchFamily="2" charset="0"/>
-              </a:rPr>
-              <a:t> toegevoegd zoals in de eerste iteratie</a:t>
-            </a:r>
-            <a:endParaRPr lang="nl-BE" sz="2400" dirty="0">
-              <a:latin typeface="Sitka Display" pitchFamily="2" charset="0"/>
-            </a:endParaRPr>
+              <a:rPr lang="nl-BE" sz="2000" dirty="0" smtClean="0">
+                <a:latin typeface="Sitka Banner" pitchFamily="2" charset="0"/>
+              </a:rPr>
+              <a:t>domeinlaag toegevoegd zoals in de eerste </a:t>
+            </a:r>
+            <a:r>
+              <a:rPr lang="nl-BE" sz="2000" dirty="0" smtClean="0">
+                <a:latin typeface="Sitka Banner" pitchFamily="2" charset="0"/>
+              </a:rPr>
+              <a:t>iteratie</a:t>
+            </a:r>
           </a:p>
         </p:txBody>
       </p:sp>
     </p:spTree>
     <p:extLst>
       <p:ext uri="{BB962C8B-B14F-4D97-AF65-F5344CB8AC3E}">
-        <p14:creationId xmlns:p14="http://schemas.microsoft.com/office/powerpoint/2010/main" val="4238244720"/>
+        <p14:creationId xmlns:p14="http://schemas.microsoft.com/office/powerpoint/2010/main" xmlns="" val="4238244720"/>
       </p:ext>
     </p:extLst>
   </p:cSld>
@@ -7813,7 +7893,7 @@
         </p:spPr>
         <p:txBody>
           <a:bodyPr>
-            <a:normAutofit/>
+            <a:normAutofit lnSpcReduction="10000"/>
           </a:bodyPr>
           <a:lstStyle/>
           <a:p>
@@ -7948,7 +8028,7 @@
     </p:spTree>
     <p:extLst>
       <p:ext uri="{BB962C8B-B14F-4D97-AF65-F5344CB8AC3E}">
-        <p14:creationId xmlns:p14="http://schemas.microsoft.com/office/powerpoint/2010/main" val="983478496"/>
+        <p14:creationId xmlns:p14="http://schemas.microsoft.com/office/powerpoint/2010/main" xmlns="" val="983478496"/>
       </p:ext>
     </p:extLst>
   </p:cSld>
@@ -8378,8 +8458,8 @@
         </p:nvSpPr>
         <p:spPr>
           <a:xfrm>
-            <a:off x="3484364" y="2775347"/>
-            <a:ext cx="2175272" cy="461665"/>
+            <a:off x="3347864" y="2924944"/>
+            <a:ext cx="2520280" cy="461665"/>
           </a:xfrm>
           <a:prstGeom prst="rect">
             <a:avLst/>
@@ -8408,7 +8488,9 @@
           <a:p>
             <a:pPr algn="ctr"/>
             <a:r>
-              <a:rPr lang="nl-NL" sz="2400" b="1" dirty="0"/>
+              <a:rPr lang="nl-NL" sz="2400" b="1" dirty="0">
+                <a:latin typeface="Sitka Banner" pitchFamily="2" charset="0"/>
+              </a:rPr>
               <a:t>Tags zijn STATES</a:t>
             </a:r>
           </a:p>
@@ -8422,7 +8504,7 @@
         </p:nvSpPr>
         <p:spPr>
           <a:xfrm>
-            <a:off x="2487810" y="4050507"/>
+            <a:off x="2487810" y="3861048"/>
             <a:ext cx="4168378" cy="646331"/>
           </a:xfrm>
           <a:prstGeom prst="rect">
@@ -8438,15 +8520,21 @@
           <a:p>
             <a:pPr algn="ctr"/>
             <a:r>
-              <a:rPr lang="nl-NL" dirty="0"/>
+              <a:rPr lang="nl-NL" dirty="0">
+                <a:latin typeface="Sitka Banner" pitchFamily="2" charset="0"/>
+              </a:rPr>
               <a:t>Het gedrag van </a:t>
             </a:r>
             <a:r>
-              <a:rPr lang="nl-NL" dirty="0" err="1"/>
+              <a:rPr lang="nl-NL" dirty="0" err="1">
+                <a:latin typeface="Sitka Banner" pitchFamily="2" charset="0"/>
+              </a:rPr>
               <a:t>Bugreport</a:t>
             </a:r>
             <a:r>
-              <a:rPr lang="nl-NL" dirty="0"/>
+              <a:rPr lang="nl-NL" dirty="0">
+                <a:latin typeface="Sitka Banner" pitchFamily="2" charset="0"/>
+              </a:rPr>
               <a:t> is afhankelijk van de tag die toegekend is.</a:t>
             </a:r>
           </a:p>
@@ -8455,7 +8543,7 @@
     </p:spTree>
     <p:extLst>
       <p:ext uri="{BB962C8B-B14F-4D97-AF65-F5344CB8AC3E}">
-        <p14:creationId xmlns:p14="http://schemas.microsoft.com/office/powerpoint/2010/main" val="467284758"/>
+        <p14:creationId xmlns:p14="http://schemas.microsoft.com/office/powerpoint/2010/main" xmlns="" val="467284758"/>
       </p:ext>
     </p:extLst>
   </p:cSld>
@@ -8566,7 +8654,7 @@
             </a:clrChange>
             <a:extLst>
               <a:ext uri="{28A0092B-C50C-407E-A947-70E740481C1C}">
-                <a14:useLocalDpi xmlns:a14="http://schemas.microsoft.com/office/drawing/2010/main" val="0"/>
+                <a14:useLocalDpi xmlns:a14="http://schemas.microsoft.com/office/drawing/2010/main" xmlns="" val="0"/>
               </a:ext>
             </a:extLst>
           </a:blip>
@@ -8633,7 +8721,7 @@
     </p:spTree>
     <p:extLst>
       <p:ext uri="{BB962C8B-B14F-4D97-AF65-F5344CB8AC3E}">
-        <p14:creationId xmlns:p14="http://schemas.microsoft.com/office/powerpoint/2010/main" val="307230627"/>
+        <p14:creationId xmlns:p14="http://schemas.microsoft.com/office/powerpoint/2010/main" xmlns="" val="307230627"/>
       </p:ext>
     </p:extLst>
   </p:cSld>
@@ -8758,7 +8846,7 @@
             </a:clrChange>
             <a:extLst>
               <a:ext uri="{28A0092B-C50C-407E-A947-70E740481C1C}">
-                <a14:useLocalDpi xmlns:a14="http://schemas.microsoft.com/office/drawing/2010/main" val="0"/>
+                <a14:useLocalDpi xmlns:a14="http://schemas.microsoft.com/office/drawing/2010/main" xmlns="" val="0"/>
               </a:ext>
             </a:extLst>
           </a:blip>
@@ -8768,7 +8856,7 @@
         </p:blipFill>
         <p:spPr>
           <a:xfrm>
-            <a:off x="99368" y="3842113"/>
+            <a:off x="99368" y="3626089"/>
             <a:ext cx="8937128" cy="1819135"/>
           </a:xfrm>
         </p:spPr>
@@ -8781,8 +8869,8 @@
         </p:nvSpPr>
         <p:spPr>
           <a:xfrm>
-            <a:off x="2339752" y="2420888"/>
-            <a:ext cx="4237891" cy="369332"/>
+            <a:off x="2577704" y="2420888"/>
+            <a:ext cx="3988592" cy="369332"/>
           </a:xfrm>
           <a:prstGeom prst="rect">
             <a:avLst/>
@@ -8810,49 +8898,69 @@
           <a:lstStyle/>
           <a:p>
             <a:r>
-              <a:rPr lang="nl-NL" dirty="0" err="1" smtClean="0"/>
+              <a:rPr lang="nl-NL" dirty="0" err="1" smtClean="0">
+                <a:latin typeface="Sitka Banner" pitchFamily="2" charset="0"/>
+              </a:rPr>
               <a:t>BugReport</a:t>
             </a:r>
             <a:r>
-              <a:rPr lang="nl-NL" dirty="0" smtClean="0"/>
+              <a:rPr lang="nl-NL" dirty="0" smtClean="0">
+                <a:latin typeface="Sitka Banner" pitchFamily="2" charset="0"/>
+              </a:rPr>
               <a:t> calls Tag </a:t>
             </a:r>
             <a:r>
-              <a:rPr lang="nl-NL" dirty="0" err="1" smtClean="0"/>
+              <a:rPr lang="nl-NL" dirty="0" err="1" smtClean="0">
+                <a:latin typeface="Sitka Banner" pitchFamily="2" charset="0"/>
+              </a:rPr>
               <a:t>to</a:t>
             </a:r>
             <a:r>
-              <a:rPr lang="nl-NL" dirty="0" smtClean="0"/>
+              <a:rPr lang="nl-NL" dirty="0" smtClean="0">
+                <a:latin typeface="Sitka Banner" pitchFamily="2" charset="0"/>
+              </a:rPr>
               <a:t> </a:t>
             </a:r>
             <a:r>
-              <a:rPr lang="nl-NL" dirty="0" err="1" smtClean="0"/>
+              <a:rPr lang="nl-NL" dirty="0" err="1" smtClean="0">
+                <a:latin typeface="Sitka Banner" pitchFamily="2" charset="0"/>
+              </a:rPr>
               <a:t>execute</a:t>
             </a:r>
             <a:r>
-              <a:rPr lang="nl-NL" dirty="0" smtClean="0"/>
+              <a:rPr lang="nl-NL" dirty="0" smtClean="0">
+                <a:latin typeface="Sitka Banner" pitchFamily="2" charset="0"/>
+              </a:rPr>
               <a:t> </a:t>
             </a:r>
             <a:r>
-              <a:rPr lang="nl-NL" dirty="0" err="1" smtClean="0"/>
+              <a:rPr lang="nl-NL" dirty="0" err="1" smtClean="0">
+                <a:latin typeface="Sitka Banner" pitchFamily="2" charset="0"/>
+              </a:rPr>
               <a:t>the</a:t>
             </a:r>
             <a:r>
-              <a:rPr lang="nl-NL" dirty="0" smtClean="0"/>
+              <a:rPr lang="nl-NL" dirty="0" smtClean="0">
+                <a:latin typeface="Sitka Banner" pitchFamily="2" charset="0"/>
+              </a:rPr>
               <a:t> </a:t>
             </a:r>
             <a:r>
-              <a:rPr lang="nl-NL" dirty="0" err="1" smtClean="0"/>
+              <a:rPr lang="nl-NL" dirty="0" err="1" smtClean="0">
+                <a:latin typeface="Sitka Banner" pitchFamily="2" charset="0"/>
+              </a:rPr>
               <a:t>function</a:t>
             </a:r>
-            <a:endParaRPr lang="nl-NL" dirty="0"/>
+            <a:endParaRPr lang="nl-NL" dirty="0">
+              <a:latin typeface="Sitka Banner" pitchFamily="2" charset="0"/>
+            </a:endParaRPr>
           </a:p>
         </p:txBody>
       </p:sp>
     </p:spTree>
     <p:extLst>
       <p:ext uri="{BB962C8B-B14F-4D97-AF65-F5344CB8AC3E}">
-        <p14:creationId xmlns:p14="http://schemas.microsoft.com/office/powerpoint/2010/main" val="1074460601"/>
+        <p14:creationId xmlns:p14="http://schemas.microsoft.com/office/powerpoint/2010/main" xmlns="" val="1074460601"/>
       </p:ext>
     </p:extLst>
   </p:cSld>

</xml_diff>

<commit_message>
Added Feedback for iteration 2
</commit_message>
<xml_diff>
--- a/Presentaties/Iteratie 2/SWOP Presentatie 2 Inhoud.pptx
+++ b/Presentaties/Iteratie 2/SWOP Presentatie 2 Inhoud.pptx
@@ -126,7 +126,7 @@
   </p:defaultTextStyle>
   <p:extLst>
     <p:ext uri="{EFAFB233-063F-42B5-8137-9DF3F51BA10A}">
-      <p15:sldGuideLst xmlns="" xmlns:p15="http://schemas.microsoft.com/office/powerpoint/2012/main">
+      <p15:sldGuideLst xmlns:p15="http://schemas.microsoft.com/office/powerpoint/2012/main" xmlns="">
         <p15:guide id="1" orient="horz" pos="2160">
           <p15:clr>
             <a:srgbClr val="A4A3A4"/>
@@ -3256,7 +3256,7 @@
                 </a:effectLst>
                 <a:latin typeface="Sitka Text" pitchFamily="2" charset="0"/>
               </a:rPr>
-              <a:t>Software-ontwerp</a:t>
+              <a:t>Software-development</a:t>
             </a:r>
             <a:endParaRPr lang="nl-BE" sz="5400" cap="small" dirty="0">
               <a:ln w="18415" cmpd="sng">
@@ -3535,7 +3535,20 @@
                 </a:effectLst>
                 <a:latin typeface="Sitka Text" pitchFamily="2" charset="0"/>
               </a:rPr>
-              <a:t>Presentatie: Iteratie 2</a:t>
+              <a:t>Presentation: Iteration </a:t>
+            </a:r>
+            <a:r>
+              <a:rPr lang="nl-BE" sz="2700" cap="small" dirty="0" smtClean="0">
+                <a:effectLst>
+                  <a:outerShdw blurRad="50800" dist="38100" dir="5400000" algn="t" rotWithShape="0">
+                    <a:prstClr val="black">
+                      <a:alpha val="40000"/>
+                    </a:prstClr>
+                  </a:outerShdw>
+                </a:effectLst>
+                <a:latin typeface="Sitka Text" pitchFamily="2" charset="0"/>
+              </a:rPr>
+              <a:t>2</a:t>
             </a:r>
             <a:endParaRPr lang="en-GB" sz="2700" cap="small" dirty="0">
               <a:effectLst>
@@ -4211,19 +4224,7 @@
                 </a:solidFill>
                 <a:latin typeface="Sitka Banner" pitchFamily="2" charset="0"/>
               </a:rPr>
-              <a:t>. </a:t>
-            </a:r>
-            <a:r>
-              <a:rPr lang="nl-NL" i="1" dirty="0" smtClean="0">
-                <a:solidFill>
-                  <a:schemeClr val="tx1">
-                    <a:lumMod val="75000"/>
-                    <a:lumOff val="25000"/>
-                  </a:schemeClr>
-                </a:solidFill>
-                <a:latin typeface="Sitka Banner" pitchFamily="2" charset="0"/>
-              </a:rPr>
-              <a:t>[</a:t>
+              <a:t>. [</a:t>
             </a:r>
             <a:r>
               <a:rPr lang="is-IS" i="1" dirty="0" smtClean="0">
@@ -5211,13 +5212,7 @@
               <a:rPr lang="en-US" sz="2000" dirty="0" smtClean="0">
                 <a:latin typeface="Sitka Banner" pitchFamily="2" charset="0"/>
               </a:rPr>
-              <a:t>Separate class for target milestone</a:t>
-            </a:r>
-            <a:r>
-              <a:rPr lang="en-US" sz="2000" dirty="0" smtClean="0">
-                <a:latin typeface="Sitka Banner" pitchFamily="2" charset="0"/>
-              </a:rPr>
-              <a:t> </a:t>
+              <a:t>Separate class for target milestone </a:t>
             </a:r>
             <a:br>
               <a:rPr lang="en-US" sz="2000" dirty="0" smtClean="0">
@@ -5229,14 +5224,7 @@
                 <a:latin typeface="Sitka Banner" pitchFamily="2" charset="0"/>
                 <a:sym typeface="Wingdings" panose="05000000000000000000" pitchFamily="2" charset="2"/>
               </a:rPr>
-              <a:t> optional</a:t>
-            </a:r>
-            <a:r>
-              <a:rPr lang="en-US" sz="2000" dirty="0" smtClean="0">
-                <a:latin typeface="Sitka Banner" pitchFamily="2" charset="0"/>
-                <a:sym typeface="Wingdings" panose="05000000000000000000" pitchFamily="2" charset="2"/>
-              </a:rPr>
-              <a:t>, always initialized with a specific milestone (</a:t>
+              <a:t> optional, always initialized with a specific milestone (</a:t>
             </a:r>
             <a:r>
               <a:rPr lang="en-US" sz="2000" dirty="0" smtClean="0">
@@ -5254,15 +5242,7 @@
                 <a:ea typeface="Cambria Math"/>
                 <a:sym typeface="Wingdings" panose="05000000000000000000" pitchFamily="2" charset="2"/>
               </a:rPr>
-              <a:t>Container  needed </a:t>
-            </a:r>
-            <a:r>
-              <a:rPr lang="en-US" sz="2000" dirty="0" smtClean="0">
-                <a:latin typeface="Sitka Banner" pitchFamily="2" charset="0"/>
-                <a:ea typeface="Cambria Math"/>
-                <a:sym typeface="Wingdings" panose="05000000000000000000" pitchFamily="2" charset="2"/>
-              </a:rPr>
-              <a:t>for checkers</a:t>
+              <a:t>Container  needed for checkers</a:t>
             </a:r>
           </a:p>
           <a:p>
@@ -5430,28 +5410,7 @@
                 </a:effectLst>
                 <a:latin typeface="Sitka Text" pitchFamily="2" charset="0"/>
               </a:rPr>
-              <a:t>S</a:t>
-            </a:r>
-            <a:r>
-              <a:rPr lang="nl-BE" sz="3600" cap="small" dirty="0" smtClean="0">
-                <a:ln w="18415" cmpd="sng">
-                  <a:solidFill>
-                    <a:schemeClr val="tx1">
-                      <a:alpha val="0"/>
-                    </a:schemeClr>
-                  </a:solidFill>
-                  <a:prstDash val="solid"/>
-                </a:ln>
-                <a:effectLst>
-                  <a:outerShdw blurRad="25400" dir="3600000" algn="tl" rotWithShape="0">
-                    <a:srgbClr val="000000">
-                      <a:alpha val="70000"/>
-                    </a:srgbClr>
-                  </a:outerShdw>
-                </a:effectLst>
-                <a:latin typeface="Sitka Text" pitchFamily="2" charset="0"/>
-              </a:rPr>
-              <a:t>ystem</a:t>
+              <a:t>System</a:t>
             </a:r>
             <a:endParaRPr lang="nl-BE" sz="3600" cap="small" dirty="0">
               <a:ln w="18415" cmpd="sng">
@@ -5581,24 +5540,6 @@
               </a:rPr>
               <a:t>Undo mechanism</a:t>
             </a:r>
-            <a:endParaRPr lang="nl-BE" sz="3600" cap="small" dirty="0">
-              <a:ln w="18415" cmpd="sng">
-                <a:solidFill>
-                  <a:schemeClr val="tx1">
-                    <a:alpha val="0"/>
-                  </a:schemeClr>
-                </a:solidFill>
-                <a:prstDash val="solid"/>
-              </a:ln>
-              <a:effectLst>
-                <a:outerShdw blurRad="25400" dir="3600000" algn="tl" rotWithShape="0">
-                  <a:srgbClr val="000000">
-                    <a:alpha val="70000"/>
-                  </a:srgbClr>
-                </a:outerShdw>
-              </a:effectLst>
-              <a:latin typeface="Sitka Text" pitchFamily="2" charset="0"/>
-            </a:endParaRPr>
           </a:p>
         </p:txBody>
       </p:sp>
@@ -5789,14 +5730,26 @@
               <a:rPr lang="en-US" sz="2400" dirty="0" smtClean="0">
                 <a:latin typeface="Sitka Banner" pitchFamily="2" charset="0"/>
               </a:rPr>
-              <a:t>Adding constraints concerning tag</a:t>
-            </a:r>
-          </a:p>
-          <a:p>
+              <a:t>Adding constraints </a:t>
+            </a:r>
             <a:r>
               <a:rPr lang="en-US" sz="2400" dirty="0" smtClean="0">
                 <a:latin typeface="Sitka Banner" pitchFamily="2" charset="0"/>
               </a:rPr>
+              <a:t>to a specific </a:t>
+            </a:r>
+            <a:r>
+              <a:rPr lang="en-US" sz="2400" dirty="0" smtClean="0">
+                <a:latin typeface="Sitka Banner" pitchFamily="2" charset="0"/>
+              </a:rPr>
+              <a:t>tag</a:t>
+            </a:r>
+          </a:p>
+          <a:p>
+            <a:r>
+              <a:rPr lang="en-US" sz="2400" dirty="0" smtClean="0">
+                <a:latin typeface="Sitka Banner" pitchFamily="2" charset="0"/>
+              </a:rPr>
               <a:t>Adding new registration types (for mailboxes) = adding new observers</a:t>
             </a:r>
           </a:p>
@@ -5805,18 +5758,14 @@
               <a:rPr lang="en-US" sz="2400" dirty="0" smtClean="0">
                 <a:latin typeface="Sitka Banner" pitchFamily="2" charset="0"/>
               </a:rPr>
-              <a:t>Search methods for bug reports</a:t>
-            </a:r>
-          </a:p>
-          <a:p>
+              <a:t>Search methods for bug </a:t>
+            </a:r>
             <a:r>
               <a:rPr lang="en-US" sz="2400" dirty="0" smtClean="0">
                 <a:latin typeface="Sitka Banner" pitchFamily="2" charset="0"/>
               </a:rPr>
-              <a:t>Adding new objects that could be undone</a:t>
-            </a:r>
-          </a:p>
-          <a:p>
+              <a:t>reports = strategy pattern</a:t>
+            </a:r>
             <a:endParaRPr lang="en-US" sz="2400" dirty="0" smtClean="0">
               <a:latin typeface="Sitka Banner" pitchFamily="2" charset="0"/>
             </a:endParaRPr>
@@ -5826,25 +5775,20 @@
               <a:rPr lang="en-US" sz="2400" dirty="0" smtClean="0">
                 <a:latin typeface="Sitka Banner" pitchFamily="2" charset="0"/>
               </a:rPr>
-              <a:t>Little </a:t>
-            </a:r>
+              <a:t>Adding new objects that could be undone</a:t>
+            </a:r>
+          </a:p>
+          <a:p>
+            <a:endParaRPr lang="en-US" sz="2400" dirty="0" smtClean="0">
+              <a:latin typeface="Sitka Banner" pitchFamily="2" charset="0"/>
+            </a:endParaRPr>
+          </a:p>
+          <a:p>
             <a:r>
               <a:rPr lang="en-US" sz="2400" dirty="0" smtClean="0">
                 <a:latin typeface="Sitka Banner" pitchFamily="2" charset="0"/>
               </a:rPr>
-              <a:t>changes were needed to implement </a:t>
-            </a:r>
-            <a:r>
-              <a:rPr lang="en-US" sz="2400" dirty="0" smtClean="0">
-                <a:latin typeface="Sitka Banner" pitchFamily="2" charset="0"/>
-              </a:rPr>
-              <a:t>iteration </a:t>
-            </a:r>
-            <a:r>
-              <a:rPr lang="en-US" sz="2400" dirty="0" smtClean="0">
-                <a:latin typeface="Sitka Banner" pitchFamily="2" charset="0"/>
-              </a:rPr>
-              <a:t>2 -&gt; great extensibility of our code from iteration 1</a:t>
+              <a:t>Little changes were needed to implement iteration 2 -&gt; great extensibility of our code from iteration 1</a:t>
             </a:r>
           </a:p>
           <a:p>
@@ -6231,6 +6175,27 @@
           <a:lstStyle/>
           <a:p>
             <a:r>
+              <a:rPr lang="nl-BE" sz="3600" cap="small" dirty="0" err="1" smtClean="0">
+                <a:ln w="18415" cmpd="sng">
+                  <a:solidFill>
+                    <a:schemeClr val="tx1">
+                      <a:alpha val="0"/>
+                    </a:schemeClr>
+                  </a:solidFill>
+                  <a:prstDash val="solid"/>
+                </a:ln>
+                <a:effectLst>
+                  <a:outerShdw blurRad="25400" dir="3600000" algn="tl" rotWithShape="0">
+                    <a:srgbClr val="000000">
+                      <a:alpha val="70000"/>
+                    </a:srgbClr>
+                  </a:outerShdw>
+                </a:effectLst>
+                <a:latin typeface="Sitka Text" pitchFamily="2" charset="0"/>
+              </a:rPr>
+              <a:t>Questions</a:t>
+            </a:r>
+            <a:r>
               <a:rPr lang="nl-BE" sz="3600" cap="small" dirty="0" smtClean="0">
                 <a:ln w="18415" cmpd="sng">
                   <a:solidFill>
@@ -6249,7 +6214,7 @@
                 </a:effectLst>
                 <a:latin typeface="Sitka Text" pitchFamily="2" charset="0"/>
               </a:rPr>
-              <a:t>Vragen?</a:t>
+              <a:t>?</a:t>
             </a:r>
             <a:endParaRPr lang="nl-BE" sz="3600" cap="small" dirty="0">
               <a:ln w="18415" cmpd="sng">
@@ -6331,15 +6296,7 @@
               <a:srgbClr val="FFFFFF"/>
             </a:contourClr>
           </a:sp3d>
-          <a:extLst>
-            <a:ext uri="{909E8E84-426E-40DD-AFC4-6F175D3DCCD1}">
-              <a14:hiddenFill xmlns:a14="http://schemas.microsoft.com/office/drawing/2010/main">
-                <a:solidFill>
-                  <a:srgbClr val="FFFFFF"/>
-                </a:solidFill>
-              </a14:hiddenFill>
-            </a:ext>
-          </a:extLst>
+          <a:extLst/>
         </p:spPr>
       </p:pic>
     </p:spTree>
@@ -6816,43 +6773,7 @@
                 </a:effectLst>
                 <a:latin typeface="Sitka Banner" pitchFamily="2" charset="0"/>
               </a:rPr>
-              <a:t>31h</a:t>
-            </a:r>
-            <a:r>
-              <a:rPr lang="nl-BE" sz="2400" dirty="0" smtClean="0">
-                <a:solidFill>
-                  <a:schemeClr val="accent4">
-                    <a:lumMod val="50000"/>
-                  </a:schemeClr>
-                </a:solidFill>
-                <a:effectLst>
-                  <a:outerShdw blurRad="76200" dist="38100" dir="5400000" algn="t" rotWithShape="0">
-                    <a:prstClr val="black">
-                      <a:alpha val="27000"/>
-                    </a:prstClr>
-                  </a:outerShdw>
-                </a:effectLst>
-                <a:latin typeface="Sitka Banner" pitchFamily="2" charset="0"/>
-              </a:rPr>
-              <a:t>	Individual Work: 	</a:t>
-            </a:r>
-            <a:r>
-              <a:rPr lang="nl-BE" sz="2400" dirty="0" smtClean="0">
-                <a:solidFill>
-                  <a:schemeClr val="accent4">
-                    <a:lumMod val="50000"/>
-                  </a:schemeClr>
-                </a:solidFill>
-                <a:effectLst>
-                  <a:outerShdw blurRad="76200" dist="38100" dir="5400000" algn="t" rotWithShape="0">
-                    <a:prstClr val="black">
-                      <a:alpha val="27000"/>
-                    </a:prstClr>
-                  </a:outerShdw>
-                </a:effectLst>
-                <a:latin typeface="Sitka Banner" pitchFamily="2" charset="0"/>
-              </a:rPr>
-              <a:t>20h	</a:t>
+              <a:t>31h	Individual Work: 	20h	</a:t>
             </a:r>
             <a:r>
               <a:rPr lang="nl-BE" sz="2400" dirty="0" err="1" smtClean="0">
@@ -6982,10 +6903,10 @@
                 </a:effectLst>
                 <a:latin typeface="Sitka Banner" pitchFamily="2" charset="0"/>
               </a:rPr>
-              <a:t>31h</a:t>
-            </a:r>
-            <a:r>
-              <a:rPr lang="nl-BE" sz="2400" dirty="0" smtClean="0">
+              <a:t>31h	Individual Work: 	23h	</a:t>
+            </a:r>
+            <a:r>
+              <a:rPr lang="nl-BE" sz="2400" dirty="0" err="1" smtClean="0">
                 <a:solidFill>
                   <a:schemeClr val="accent4">
                     <a:lumMod val="50000"/>
@@ -7000,7 +6921,7 @@
                 </a:effectLst>
                 <a:latin typeface="Sitka Banner" pitchFamily="2" charset="0"/>
               </a:rPr>
-              <a:t>	Individual Work: 	</a:t>
+              <a:t>Study</a:t>
             </a:r>
             <a:r>
               <a:rPr lang="nl-BE" sz="2400" dirty="0" smtClean="0">
@@ -7018,8 +6939,24 @@
                 </a:effectLst>
                 <a:latin typeface="Sitka Banner" pitchFamily="2" charset="0"/>
               </a:rPr>
-              <a:t>23h</a:t>
-            </a:r>
+              <a:t>:	6h</a:t>
+            </a:r>
+          </a:p>
+          <a:p>
+            <a:pPr marL="0" indent="0">
+              <a:buNone/>
+            </a:pPr>
+            <a:r>
+              <a:rPr lang="nl-BE" sz="2700" b="1" cap="small" dirty="0" smtClean="0">
+                <a:latin typeface="Sitka Display" pitchFamily="2" charset="0"/>
+              </a:rPr>
+              <a:t>Tom Houben</a:t>
+            </a:r>
+          </a:p>
+          <a:p>
+            <a:pPr marL="0" indent="0">
+              <a:buNone/>
+            </a:pPr>
             <a:r>
               <a:rPr lang="nl-BE" sz="2400" dirty="0" smtClean="0">
                 <a:solidFill>
@@ -7036,10 +6973,10 @@
                 </a:effectLst>
                 <a:latin typeface="Sitka Banner" pitchFamily="2" charset="0"/>
               </a:rPr>
-              <a:t>	</a:t>
-            </a:r>
-            <a:r>
-              <a:rPr lang="nl-BE" sz="2400" dirty="0" err="1" smtClean="0">
+              <a:t>Group work:  </a:t>
+            </a:r>
+            <a:r>
+              <a:rPr lang="nl-BE" sz="2400" dirty="0">
                 <a:solidFill>
                   <a:schemeClr val="accent4">
                     <a:lumMod val="50000"/>
@@ -7054,7 +6991,7 @@
                 </a:effectLst>
                 <a:latin typeface="Sitka Banner" pitchFamily="2" charset="0"/>
               </a:rPr>
-              <a:t>Study</a:t>
+              <a:t>	</a:t>
             </a:r>
             <a:r>
               <a:rPr lang="nl-BE" sz="2400" dirty="0" smtClean="0">
@@ -7072,41 +7009,10 @@
                 </a:effectLst>
                 <a:latin typeface="Sitka Banner" pitchFamily="2" charset="0"/>
               </a:rPr>
-              <a:t>:	6h</a:t>
-            </a:r>
-            <a:endParaRPr lang="nl-BE" sz="2400" dirty="0" smtClean="0">
-              <a:solidFill>
-                <a:schemeClr val="accent4">
-                  <a:lumMod val="50000"/>
-                </a:schemeClr>
-              </a:solidFill>
-              <a:effectLst>
-                <a:outerShdw blurRad="76200" dist="38100" dir="5400000" algn="t" rotWithShape="0">
-                  <a:prstClr val="black">
-                    <a:alpha val="27000"/>
-                  </a:prstClr>
-                </a:outerShdw>
-              </a:effectLst>
-              <a:latin typeface="Sitka Banner" pitchFamily="2" charset="0"/>
-            </a:endParaRPr>
-          </a:p>
-          <a:p>
-            <a:pPr marL="0" indent="0">
-              <a:buNone/>
-            </a:pPr>
-            <a:r>
-              <a:rPr lang="nl-BE" sz="2700" b="1" cap="small" dirty="0" smtClean="0">
-                <a:latin typeface="Sitka Display" pitchFamily="2" charset="0"/>
-              </a:rPr>
-              <a:t>Tom Houben</a:t>
-            </a:r>
-          </a:p>
-          <a:p>
-            <a:pPr marL="0" indent="0">
-              <a:buNone/>
-            </a:pPr>
-            <a:r>
-              <a:rPr lang="nl-BE" sz="2400" dirty="0" smtClean="0">
+              <a:t>31h	Individual Work: 	15h	</a:t>
+            </a:r>
+            <a:r>
+              <a:rPr lang="nl-BE" sz="2400" dirty="0" err="1" smtClean="0">
                 <a:solidFill>
                   <a:schemeClr val="accent4">
                     <a:lumMod val="50000"/>
@@ -7121,10 +7027,10 @@
                 </a:effectLst>
                 <a:latin typeface="Sitka Banner" pitchFamily="2" charset="0"/>
               </a:rPr>
-              <a:t>Group work:  </a:t>
-            </a:r>
-            <a:r>
-              <a:rPr lang="nl-BE" sz="2400" dirty="0">
+              <a:t>Study</a:t>
+            </a:r>
+            <a:r>
+              <a:rPr lang="nl-BE" sz="2400" dirty="0" smtClean="0">
                 <a:solidFill>
                   <a:schemeClr val="accent4">
                     <a:lumMod val="50000"/>
@@ -7139,8 +7045,33 @@
                 </a:effectLst>
                 <a:latin typeface="Sitka Banner" pitchFamily="2" charset="0"/>
               </a:rPr>
-              <a:t>	</a:t>
-            </a:r>
+              <a:t>:	4h</a:t>
+            </a:r>
+          </a:p>
+          <a:p>
+            <a:pPr marL="0" indent="0">
+              <a:buNone/>
+            </a:pPr>
+            <a:r>
+              <a:rPr lang="nl-BE" sz="2700" b="1" cap="small" dirty="0" smtClean="0">
+                <a:latin typeface="Sitka Display" pitchFamily="2" charset="0"/>
+              </a:rPr>
+              <a:t>Tri </a:t>
+            </a:r>
+            <a:r>
+              <a:rPr lang="nl-BE" sz="2700" b="1" cap="small" dirty="0" err="1" smtClean="0">
+                <a:latin typeface="Sitka Display" pitchFamily="2" charset="0"/>
+              </a:rPr>
+              <a:t>Tran</a:t>
+            </a:r>
+            <a:endParaRPr lang="nl-BE" sz="2700" b="1" cap="small" dirty="0" smtClean="0">
+              <a:latin typeface="Sitka Display" pitchFamily="2" charset="0"/>
+            </a:endParaRPr>
+          </a:p>
+          <a:p>
+            <a:pPr marL="0" indent="0">
+              <a:buNone/>
+            </a:pPr>
             <a:r>
               <a:rPr lang="nl-BE" sz="2400" dirty="0" smtClean="0">
                 <a:solidFill>
@@ -7157,10 +7088,10 @@
                 </a:effectLst>
                 <a:latin typeface="Sitka Banner" pitchFamily="2" charset="0"/>
               </a:rPr>
-              <a:t>31h</a:t>
-            </a:r>
-            <a:r>
-              <a:rPr lang="nl-BE" sz="2400" dirty="0" smtClean="0">
+              <a:t>Group work: </a:t>
+            </a:r>
+            <a:r>
+              <a:rPr lang="nl-BE" sz="2400" dirty="0">
                 <a:solidFill>
                   <a:schemeClr val="accent4">
                     <a:lumMod val="50000"/>
@@ -7175,7 +7106,7 @@
                 </a:effectLst>
                 <a:latin typeface="Sitka Banner" pitchFamily="2" charset="0"/>
               </a:rPr>
-              <a:t>	Individual Work: 	</a:t>
+              <a:t>	</a:t>
             </a:r>
             <a:r>
               <a:rPr lang="nl-BE" sz="2400" dirty="0" smtClean="0">
@@ -7193,7 +7124,7 @@
                 </a:effectLst>
                 <a:latin typeface="Sitka Banner" pitchFamily="2" charset="0"/>
               </a:rPr>
-              <a:t>15h	</a:t>
+              <a:t>31h	Individual Work: 	51h	</a:t>
             </a:r>
             <a:r>
               <a:rPr lang="nl-BE" sz="2400" dirty="0" err="1" smtClean="0">
@@ -7229,189 +7160,8 @@
                 </a:effectLst>
                 <a:latin typeface="Sitka Banner" pitchFamily="2" charset="0"/>
               </a:rPr>
-              <a:t>:	4h</a:t>
-            </a:r>
-            <a:endParaRPr lang="nl-BE" sz="2400" dirty="0" smtClean="0">
-              <a:solidFill>
-                <a:schemeClr val="accent4">
-                  <a:lumMod val="50000"/>
-                </a:schemeClr>
-              </a:solidFill>
-              <a:effectLst>
-                <a:outerShdw blurRad="76200" dist="38100" dir="5400000" algn="t" rotWithShape="0">
-                  <a:prstClr val="black">
-                    <a:alpha val="27000"/>
-                  </a:prstClr>
-                </a:outerShdw>
-              </a:effectLst>
-              <a:latin typeface="Sitka Banner" pitchFamily="2" charset="0"/>
-            </a:endParaRPr>
-          </a:p>
-          <a:p>
-            <a:pPr marL="0" indent="0">
-              <a:buNone/>
-            </a:pPr>
-            <a:r>
-              <a:rPr lang="nl-BE" sz="2700" b="1" cap="small" dirty="0" smtClean="0">
-                <a:latin typeface="Sitka Display" pitchFamily="2" charset="0"/>
-              </a:rPr>
-              <a:t>Tri </a:t>
-            </a:r>
-            <a:r>
-              <a:rPr lang="nl-BE" sz="2700" b="1" cap="small" dirty="0" err="1" smtClean="0">
-                <a:latin typeface="Sitka Display" pitchFamily="2" charset="0"/>
-              </a:rPr>
-              <a:t>Tran</a:t>
-            </a:r>
-            <a:endParaRPr lang="nl-BE" sz="2700" b="1" cap="small" dirty="0" smtClean="0">
-              <a:latin typeface="Sitka Display" pitchFamily="2" charset="0"/>
-            </a:endParaRPr>
-          </a:p>
-          <a:p>
-            <a:pPr marL="0" indent="0">
-              <a:buNone/>
-            </a:pPr>
-            <a:r>
-              <a:rPr lang="nl-BE" sz="2400" dirty="0" smtClean="0">
-                <a:solidFill>
-                  <a:schemeClr val="accent4">
-                    <a:lumMod val="50000"/>
-                  </a:schemeClr>
-                </a:solidFill>
-                <a:effectLst>
-                  <a:outerShdw blurRad="76200" dist="38100" dir="5400000" algn="t" rotWithShape="0">
-                    <a:prstClr val="black">
-                      <a:alpha val="27000"/>
-                    </a:prstClr>
-                  </a:outerShdw>
-                </a:effectLst>
-                <a:latin typeface="Sitka Banner" pitchFamily="2" charset="0"/>
-              </a:rPr>
-              <a:t>Group work: </a:t>
-            </a:r>
-            <a:r>
-              <a:rPr lang="nl-BE" sz="2400" dirty="0">
-                <a:solidFill>
-                  <a:schemeClr val="accent4">
-                    <a:lumMod val="50000"/>
-                  </a:schemeClr>
-                </a:solidFill>
-                <a:effectLst>
-                  <a:outerShdw blurRad="76200" dist="38100" dir="5400000" algn="t" rotWithShape="0">
-                    <a:prstClr val="black">
-                      <a:alpha val="27000"/>
-                    </a:prstClr>
-                  </a:outerShdw>
-                </a:effectLst>
-                <a:latin typeface="Sitka Banner" pitchFamily="2" charset="0"/>
-              </a:rPr>
-              <a:t>	</a:t>
-            </a:r>
-            <a:r>
-              <a:rPr lang="nl-BE" sz="2400" dirty="0" smtClean="0">
-                <a:solidFill>
-                  <a:schemeClr val="accent4">
-                    <a:lumMod val="50000"/>
-                  </a:schemeClr>
-                </a:solidFill>
-                <a:effectLst>
-                  <a:outerShdw blurRad="76200" dist="38100" dir="5400000" algn="t" rotWithShape="0">
-                    <a:prstClr val="black">
-                      <a:alpha val="27000"/>
-                    </a:prstClr>
-                  </a:outerShdw>
-                </a:effectLst>
-                <a:latin typeface="Sitka Banner" pitchFamily="2" charset="0"/>
-              </a:rPr>
-              <a:t>31h</a:t>
-            </a:r>
-            <a:r>
-              <a:rPr lang="nl-BE" sz="2400" dirty="0" smtClean="0">
-                <a:solidFill>
-                  <a:schemeClr val="accent4">
-                    <a:lumMod val="50000"/>
-                  </a:schemeClr>
-                </a:solidFill>
-                <a:effectLst>
-                  <a:outerShdw blurRad="76200" dist="38100" dir="5400000" algn="t" rotWithShape="0">
-                    <a:prstClr val="black">
-                      <a:alpha val="27000"/>
-                    </a:prstClr>
-                  </a:outerShdw>
-                </a:effectLst>
-                <a:latin typeface="Sitka Banner" pitchFamily="2" charset="0"/>
-              </a:rPr>
-              <a:t>	Individual Work: 	</a:t>
-            </a:r>
-            <a:r>
-              <a:rPr lang="nl-BE" sz="2400" dirty="0" smtClean="0">
-                <a:solidFill>
-                  <a:schemeClr val="accent4">
-                    <a:lumMod val="50000"/>
-                  </a:schemeClr>
-                </a:solidFill>
-                <a:effectLst>
-                  <a:outerShdw blurRad="76200" dist="38100" dir="5400000" algn="t" rotWithShape="0">
-                    <a:prstClr val="black">
-                      <a:alpha val="27000"/>
-                    </a:prstClr>
-                  </a:outerShdw>
-                </a:effectLst>
-                <a:latin typeface="Sitka Banner" pitchFamily="2" charset="0"/>
-              </a:rPr>
-              <a:t>51h	</a:t>
-            </a:r>
-            <a:r>
-              <a:rPr lang="nl-BE" sz="2400" dirty="0" err="1" smtClean="0">
-                <a:solidFill>
-                  <a:schemeClr val="accent4">
-                    <a:lumMod val="50000"/>
-                  </a:schemeClr>
-                </a:solidFill>
-                <a:effectLst>
-                  <a:outerShdw blurRad="76200" dist="38100" dir="5400000" algn="t" rotWithShape="0">
-                    <a:prstClr val="black">
-                      <a:alpha val="27000"/>
-                    </a:prstClr>
-                  </a:outerShdw>
-                </a:effectLst>
-                <a:latin typeface="Sitka Banner" pitchFamily="2" charset="0"/>
-              </a:rPr>
-              <a:t>Study</a:t>
-            </a:r>
-            <a:r>
-              <a:rPr lang="nl-BE" sz="2400" dirty="0" smtClean="0">
-                <a:solidFill>
-                  <a:schemeClr val="accent4">
-                    <a:lumMod val="50000"/>
-                  </a:schemeClr>
-                </a:solidFill>
-                <a:effectLst>
-                  <a:outerShdw blurRad="76200" dist="38100" dir="5400000" algn="t" rotWithShape="0">
-                    <a:prstClr val="black">
-                      <a:alpha val="27000"/>
-                    </a:prstClr>
-                  </a:outerShdw>
-                </a:effectLst>
-                <a:latin typeface="Sitka Banner" pitchFamily="2" charset="0"/>
-              </a:rPr>
               <a:t>:	14h</a:t>
             </a:r>
-            <a:endParaRPr lang="nl-BE" sz="2400" dirty="0" smtClean="0">
-              <a:solidFill>
-                <a:schemeClr val="accent4">
-                  <a:lumMod val="50000"/>
-                </a:schemeClr>
-              </a:solidFill>
-              <a:effectLst>
-                <a:outerShdw blurRad="76200" dist="38100" dir="5400000" algn="t" rotWithShape="0">
-                  <a:prstClr val="black">
-                    <a:alpha val="27000"/>
-                  </a:prstClr>
-                </a:outerShdw>
-              </a:effectLst>
-              <a:latin typeface="Sitka Banner" pitchFamily="2" charset="0"/>
-            </a:endParaRPr>
           </a:p>
           <a:p>
             <a:pPr marL="0" indent="0">
@@ -7490,28 +7240,28 @@
                 <a:gridCol w="2057400">
                   <a:extLst>
                     <a:ext uri="{9D8B030D-6E8A-4147-A177-3AD203B41FA5}">
-                      <a16:colId xmlns:a16="http://schemas.microsoft.com/office/drawing/2014/main" xmlns="" val="4022630451"/>
+                      <a16:colId xmlns="" xmlns:a16="http://schemas.microsoft.com/office/drawing/2014/main" val="4022630451"/>
                     </a:ext>
                   </a:extLst>
                 </a:gridCol>
                 <a:gridCol w="2057400">
                   <a:extLst>
                     <a:ext uri="{9D8B030D-6E8A-4147-A177-3AD203B41FA5}">
-                      <a16:colId xmlns:a16="http://schemas.microsoft.com/office/drawing/2014/main" xmlns="" val="1276862258"/>
+                      <a16:colId xmlns="" xmlns:a16="http://schemas.microsoft.com/office/drawing/2014/main" val="1276862258"/>
                     </a:ext>
                   </a:extLst>
                 </a:gridCol>
                 <a:gridCol w="2057400">
                   <a:extLst>
                     <a:ext uri="{9D8B030D-6E8A-4147-A177-3AD203B41FA5}">
-                      <a16:colId xmlns:a16="http://schemas.microsoft.com/office/drawing/2014/main" xmlns="" val="670422697"/>
+                      <a16:colId xmlns="" xmlns:a16="http://schemas.microsoft.com/office/drawing/2014/main" val="670422697"/>
                     </a:ext>
                   </a:extLst>
                 </a:gridCol>
                 <a:gridCol w="2057400">
                   <a:extLst>
                     <a:ext uri="{9D8B030D-6E8A-4147-A177-3AD203B41FA5}">
-                      <a16:colId xmlns:a16="http://schemas.microsoft.com/office/drawing/2014/main" xmlns="" val="3836214712"/>
+                      <a16:colId xmlns="" xmlns:a16="http://schemas.microsoft.com/office/drawing/2014/main" val="3836214712"/>
                     </a:ext>
                   </a:extLst>
                 </a:gridCol>
@@ -7583,7 +7333,7 @@
                 </a:tc>
                 <a:extLst>
                   <a:ext uri="{0D108BD9-81ED-4DB2-BD59-A6C34878D82A}">
-                    <a16:rowId xmlns:a16="http://schemas.microsoft.com/office/drawing/2014/main" xmlns="" val="2789307922"/>
+                    <a16:rowId xmlns="" xmlns:a16="http://schemas.microsoft.com/office/drawing/2014/main" val="2789307922"/>
                   </a:ext>
                 </a:extLst>
               </a:tr>
@@ -7723,7 +7473,7 @@
                 </a:tc>
                 <a:extLst>
                   <a:ext uri="{0D108BD9-81ED-4DB2-BD59-A6C34878D82A}">
-                    <a16:rowId xmlns:a16="http://schemas.microsoft.com/office/drawing/2014/main" xmlns="" val="3498730236"/>
+                    <a16:rowId xmlns="" xmlns:a16="http://schemas.microsoft.com/office/drawing/2014/main" val="3498730236"/>
                   </a:ext>
                 </a:extLst>
               </a:tr>
@@ -7826,7 +7576,7 @@
                 </a:tc>
                 <a:extLst>
                   <a:ext uri="{0D108BD9-81ED-4DB2-BD59-A6C34878D82A}">
-                    <a16:rowId xmlns:a16="http://schemas.microsoft.com/office/drawing/2014/main" xmlns="" val="4013628509"/>
+                    <a16:rowId xmlns="" xmlns:a16="http://schemas.microsoft.com/office/drawing/2014/main" val="4013628509"/>
                   </a:ext>
                 </a:extLst>
               </a:tr>
@@ -7933,7 +7683,7 @@
                 </a:tc>
                 <a:extLst>
                   <a:ext uri="{0D108BD9-81ED-4DB2-BD59-A6C34878D82A}">
-                    <a16:rowId xmlns:a16="http://schemas.microsoft.com/office/drawing/2014/main" xmlns="" val="1545046261"/>
+                    <a16:rowId xmlns="" xmlns:a16="http://schemas.microsoft.com/office/drawing/2014/main" val="1545046261"/>
                   </a:ext>
                 </a:extLst>
               </a:tr>
@@ -8268,9 +8018,6 @@
               </a:rPr>
               <a:t> user type</a:t>
             </a:r>
-            <a:endParaRPr lang="nl-BE" sz="2400" dirty="0" smtClean="0">
-              <a:latin typeface="Sitka Banner" pitchFamily="2" charset="0"/>
-            </a:endParaRPr>
           </a:p>
           <a:p>
             <a:pPr marL="285750" indent="-285750">
@@ -8358,9 +8105,6 @@
               </a:rPr>
               <a:t> iteration 1</a:t>
             </a:r>
-            <a:endParaRPr lang="nl-BE" sz="2400" dirty="0" smtClean="0">
-              <a:latin typeface="Sitka Banner" pitchFamily="2" charset="0"/>
-            </a:endParaRPr>
           </a:p>
         </p:txBody>
       </p:sp>

</xml_diff>